<commit_message>
Added lesson #9 presentation
</commit_message>
<xml_diff>
--- a/Presentation/lesson-09.pptx
+++ b/Presentation/lesson-09.pptx
@@ -5,11 +5,31 @@
     <p:sldMasterId id="2147483648" r:id="rId1"/>
   </p:sldMasterIdLst>
   <p:notesMasterIdLst>
-    <p:notesMasterId r:id="rId4"/>
+    <p:notesMasterId r:id="rId24"/>
   </p:notesMasterIdLst>
   <p:sldIdLst>
     <p:sldId id="256" r:id="rId2"/>
     <p:sldId id="257" r:id="rId3"/>
+    <p:sldId id="258" r:id="rId4"/>
+    <p:sldId id="275" r:id="rId5"/>
+    <p:sldId id="268" r:id="rId6"/>
+    <p:sldId id="259" r:id="rId7"/>
+    <p:sldId id="270" r:id="rId8"/>
+    <p:sldId id="269" r:id="rId9"/>
+    <p:sldId id="276" r:id="rId10"/>
+    <p:sldId id="277" r:id="rId11"/>
+    <p:sldId id="260" r:id="rId12"/>
+    <p:sldId id="261" r:id="rId13"/>
+    <p:sldId id="262" r:id="rId14"/>
+    <p:sldId id="263" r:id="rId15"/>
+    <p:sldId id="264" r:id="rId16"/>
+    <p:sldId id="265" r:id="rId17"/>
+    <p:sldId id="266" r:id="rId18"/>
+    <p:sldId id="267" r:id="rId19"/>
+    <p:sldId id="271" r:id="rId20"/>
+    <p:sldId id="272" r:id="rId21"/>
+    <p:sldId id="273" r:id="rId22"/>
+    <p:sldId id="274" r:id="rId23"/>
   </p:sldIdLst>
   <p:sldSz cx="9144000" cy="6858000" type="screen4x3"/>
   <p:notesSz cx="6858000" cy="9144000"/>
@@ -193,7 +213,7 @@
           <a:p>
             <a:fld id="{B24A7054-7FFB-49F4-A126-5DF6E687FF53}" type="datetimeFigureOut">
               <a:rPr lang="ru-RU" smtClean="0"/>
-              <a:t>28.08.2012</a:t>
+              <a:t>29.08.2012</a:t>
             </a:fld>
             <a:endParaRPr lang="ru-RU"/>
           </a:p>
@@ -1475,7 +1495,7 @@
           <a:p>
             <a:fld id="{8E6E6A2A-E9D3-4A0D-B04A-ABDD367A1E08}" type="datetimeFigureOut">
               <a:rPr lang="ru-RU" smtClean="0"/>
-              <a:t>28.08.2012</a:t>
+              <a:t>29.08.2012</a:t>
             </a:fld>
             <a:endParaRPr lang="ru-RU"/>
           </a:p>
@@ -2920,7 +2940,7 @@
           <a:p>
             <a:fld id="{AC3D3127-B7C4-45E3-9797-C527EC9FDD78}" type="datetimeFigureOut">
               <a:rPr lang="ru-RU" smtClean="0"/>
-              <a:t>28.08.2012</a:t>
+              <a:t>29.08.2012</a:t>
             </a:fld>
             <a:endParaRPr lang="ru-RU"/>
           </a:p>
@@ -3444,15 +3464,23 @@
                   <a:schemeClr val="bg1"/>
                 </a:solidFill>
               </a:rPr>
-              <a:t>Занятие </a:t>
-            </a:r>
-            <a:r>
-              <a:rPr lang="ru-RU" sz="2400" dirty="0" smtClean="0">
+              <a:t>Занятие №</a:t>
+            </a:r>
+            <a:r>
+              <a:rPr lang="en-US" sz="2400" dirty="0" smtClean="0">
                 <a:solidFill>
                   <a:schemeClr val="bg1"/>
                 </a:solidFill>
               </a:rPr>
-              <a:t>№</a:t>
+              <a:t>9</a:t>
+            </a:r>
+            <a:r>
+              <a:rPr lang="ru-RU" sz="2400" dirty="0">
+                <a:solidFill>
+                  <a:schemeClr val="bg1"/>
+                </a:solidFill>
+              </a:rPr>
+              <a:t>. Введение в </a:t>
             </a:r>
             <a:r>
               <a:rPr lang="en-US" sz="2400" dirty="0">
@@ -3460,23 +3488,7 @@
                   <a:schemeClr val="bg1"/>
                 </a:solidFill>
               </a:rPr>
-              <a:t>9</a:t>
-            </a:r>
-            <a:r>
-              <a:rPr lang="ru-RU" sz="2400" dirty="0" smtClean="0">
-                <a:solidFill>
-                  <a:schemeClr val="bg1"/>
-                </a:solidFill>
-              </a:rPr>
-              <a:t>. </a:t>
-            </a:r>
-            <a:r>
-              <a:rPr lang="ru-RU" sz="2400">
-                <a:solidFill>
-                  <a:schemeClr val="bg1"/>
-                </a:solidFill>
-              </a:rPr>
-              <a:t>?</a:t>
+              <a:t>SQL</a:t>
             </a:r>
             <a:endParaRPr lang="en-US" sz="2400" dirty="0">
               <a:solidFill>
@@ -3503,6 +3515,3307 @@
       </p:par>
     </p:tnLst>
   </p:timing>
+</p:sld>
+</file>
+
+<file path=ppt/slides/slide10.xml><?xml version="1.0" encoding="utf-8"?>
+<p:sld xmlns:a="http://schemas.openxmlformats.org/drawingml/2006/main" xmlns:r="http://schemas.openxmlformats.org/officeDocument/2006/relationships" xmlns:p="http://schemas.openxmlformats.org/presentationml/2006/main">
+  <p:cSld>
+    <p:spTree>
+      <p:nvGrpSpPr>
+        <p:cNvPr id="1" name=""/>
+        <p:cNvGrpSpPr/>
+        <p:nvPr/>
+      </p:nvGrpSpPr>
+      <p:grpSpPr>
+        <a:xfrm>
+          <a:off x="0" y="0"/>
+          <a:ext cx="0" cy="0"/>
+          <a:chOff x="0" y="0"/>
+          <a:chExt cx="0" cy="0"/>
+        </a:xfrm>
+      </p:grpSpPr>
+      <p:sp>
+        <p:nvSpPr>
+          <p:cNvPr id="2" name="Title 1"/>
+          <p:cNvSpPr>
+            <a:spLocks noGrp="1"/>
+          </p:cNvSpPr>
+          <p:nvPr>
+            <p:ph type="title"/>
+          </p:nvPr>
+        </p:nvSpPr>
+        <p:spPr>
+          <a:xfrm>
+            <a:off x="457200" y="2857500"/>
+            <a:ext cx="8229600" cy="1143000"/>
+          </a:xfrm>
+        </p:spPr>
+        <p:txBody>
+          <a:bodyPr>
+            <a:normAutofit fontScale="90000"/>
+          </a:bodyPr>
+          <a:lstStyle/>
+          <a:p>
+            <a:r>
+              <a:rPr lang="ru-RU" dirty="0" smtClean="0"/>
+              <a:t>Создание новой БД</a:t>
+            </a:r>
+            <a:br>
+              <a:rPr lang="ru-RU" dirty="0" smtClean="0"/>
+            </a:br>
+            <a:r>
+              <a:rPr lang="ru-RU" dirty="0" smtClean="0"/>
+              <a:t>Демонстрация</a:t>
+            </a:r>
+            <a:endParaRPr lang="en-US" dirty="0"/>
+          </a:p>
+        </p:txBody>
+      </p:sp>
+    </p:spTree>
+    <p:extLst>
+      <p:ext uri="{BB962C8B-B14F-4D97-AF65-F5344CB8AC3E}">
+        <p14:creationId xmlns:p14="http://schemas.microsoft.com/office/powerpoint/2010/main" val="1764324102"/>
+      </p:ext>
+    </p:extLst>
+  </p:cSld>
+  <p:clrMapOvr>
+    <a:masterClrMapping/>
+  </p:clrMapOvr>
+</p:sld>
+</file>
+
+<file path=ppt/slides/slide11.xml><?xml version="1.0" encoding="utf-8"?>
+<p:sld xmlns:a="http://schemas.openxmlformats.org/drawingml/2006/main" xmlns:r="http://schemas.openxmlformats.org/officeDocument/2006/relationships" xmlns:p="http://schemas.openxmlformats.org/presentationml/2006/main">
+  <p:cSld>
+    <p:spTree>
+      <p:nvGrpSpPr>
+        <p:cNvPr id="1" name=""/>
+        <p:cNvGrpSpPr/>
+        <p:nvPr/>
+      </p:nvGrpSpPr>
+      <p:grpSpPr>
+        <a:xfrm>
+          <a:off x="0" y="0"/>
+          <a:ext cx="0" cy="0"/>
+          <a:chOff x="0" y="0"/>
+          <a:chExt cx="0" cy="0"/>
+        </a:xfrm>
+      </p:grpSpPr>
+      <p:sp>
+        <p:nvSpPr>
+          <p:cNvPr id="5122" name="Прямоугольник 2"/>
+          <p:cNvSpPr>
+            <a:spLocks noChangeArrowheads="1"/>
+          </p:cNvSpPr>
+          <p:nvPr/>
+        </p:nvSpPr>
+        <p:spPr bwMode="auto">
+          <a:xfrm>
+            <a:off x="152400" y="76200"/>
+            <a:ext cx="8839200" cy="708025"/>
+          </a:xfrm>
+          <a:prstGeom prst="rect">
+            <a:avLst/>
+          </a:prstGeom>
+          <a:noFill/>
+          <a:ln>
+            <a:noFill/>
+          </a:ln>
+          <a:extLst>
+            <a:ext uri="{909E8E84-426E-40DD-AFC4-6F175D3DCCD1}">
+              <a14:hiddenFill xmlns:a14="http://schemas.microsoft.com/office/drawing/2010/main">
+                <a:solidFill>
+                  <a:srgbClr val="FFFFFF"/>
+                </a:solidFill>
+              </a14:hiddenFill>
+            </a:ext>
+            <a:ext uri="{91240B29-F687-4F45-9708-019B960494DF}">
+              <a14:hiddenLine xmlns:a14="http://schemas.microsoft.com/office/drawing/2010/main" w="9525">
+                <a:solidFill>
+                  <a:srgbClr val="000000"/>
+                </a:solidFill>
+                <a:miter lim="800000"/>
+                <a:headEnd/>
+                <a:tailEnd/>
+              </a14:hiddenLine>
+            </a:ext>
+          </a:extLst>
+        </p:spPr>
+        <p:txBody>
+          <a:bodyPr>
+            <a:spAutoFit/>
+          </a:bodyPr>
+          <a:lstStyle/>
+          <a:p>
+            <a:pPr algn="ctr"/>
+            <a:r>
+              <a:rPr lang="be-BY" sz="2400" b="1"/>
+              <a:t>Основные операторы SQL.</a:t>
+            </a:r>
+          </a:p>
+          <a:p>
+            <a:pPr algn="ctr"/>
+            <a:r>
+              <a:rPr lang="ru-RU" sz="1600" b="1"/>
+              <a:t>Типы данных.</a:t>
+            </a:r>
+            <a:endParaRPr lang="be-BY" sz="1600" b="1"/>
+          </a:p>
+        </p:txBody>
+      </p:sp>
+      <p:sp>
+        <p:nvSpPr>
+          <p:cNvPr id="5" name="Прямоугольник 4"/>
+          <p:cNvSpPr/>
+          <p:nvPr/>
+        </p:nvSpPr>
+        <p:spPr>
+          <a:xfrm>
+            <a:off x="152400" y="914400"/>
+            <a:ext cx="8839200" cy="5816600"/>
+          </a:xfrm>
+          <a:prstGeom prst="rect">
+            <a:avLst/>
+          </a:prstGeom>
+        </p:spPr>
+        <p:txBody>
+          <a:bodyPr>
+            <a:spAutoFit/>
+          </a:bodyPr>
+          <a:lstStyle/>
+          <a:p>
+            <a:pPr>
+              <a:defRPr/>
+            </a:pPr>
+            <a:r>
+              <a:rPr lang="en-US" sz="1200" dirty="0"/>
+              <a:t>	</a:t>
+            </a:r>
+            <a:r>
+              <a:rPr lang="ru-RU" sz="1200" dirty="0"/>
+              <a:t>Идентификаторы SQL предназначены для обозначения объектов в БД и являются их именами.</a:t>
+            </a:r>
+            <a:r>
+              <a:rPr lang="en-US" sz="1200" dirty="0"/>
+              <a:t> </a:t>
+            </a:r>
+            <a:r>
+              <a:rPr lang="ru-RU" sz="1200" dirty="0"/>
+              <a:t>Идентификатор по стандарту ISO состоит из символов (‘A’-‘Z’, ‘</a:t>
+            </a:r>
+            <a:r>
+              <a:rPr lang="ru-RU" sz="1200" dirty="0" err="1"/>
+              <a:t>a’-‘z</a:t>
+            </a:r>
+            <a:r>
+              <a:rPr lang="ru-RU" sz="1200" dirty="0"/>
+              <a:t>’, ‘0’-‘9’ (не может быть первым символом), ‘_’), длина идентификатора не более 128 символов. </a:t>
+            </a:r>
+          </a:p>
+          <a:p>
+            <a:pPr>
+              <a:defRPr/>
+            </a:pPr>
+            <a:r>
+              <a:rPr lang="ru-RU" sz="1200" b="1" dirty="0"/>
+              <a:t>По стандарту ISO в SQL определено шесть типов данных: </a:t>
+            </a:r>
+          </a:p>
+          <a:p>
+            <a:pPr>
+              <a:defRPr/>
+            </a:pPr>
+            <a:r>
+              <a:rPr lang="ru-RU" sz="1200" dirty="0"/>
+              <a:t>• символьные данные – позволяют задать последовательности символов </a:t>
+            </a:r>
+          </a:p>
+          <a:p>
+            <a:pPr lvl="1">
+              <a:defRPr/>
+            </a:pPr>
+            <a:r>
+              <a:rPr lang="en-US" sz="1200" dirty="0"/>
+              <a:t>CHARACTER [VARYING] [length] </a:t>
+            </a:r>
+          </a:p>
+          <a:p>
+            <a:pPr lvl="1">
+              <a:defRPr/>
+            </a:pPr>
+            <a:r>
+              <a:rPr lang="ru-RU" sz="1200" dirty="0"/>
+              <a:t>(сокращения CHAR, VARCHAR; VARYING – переменная длина); </a:t>
+            </a:r>
+          </a:p>
+          <a:p>
+            <a:pPr>
+              <a:defRPr/>
+            </a:pPr>
+            <a:r>
+              <a:rPr lang="ru-RU" sz="1200" dirty="0"/>
+              <a:t>• битовые данные – позволяют задать строки бит (символ может принимать значение ‘0’ или ‘1’) </a:t>
+            </a:r>
+          </a:p>
+          <a:p>
+            <a:pPr lvl="1">
+              <a:defRPr/>
+            </a:pPr>
+            <a:r>
+              <a:rPr lang="en-US" sz="1200" dirty="0"/>
+              <a:t>BIT [VARYING] [length] </a:t>
+            </a:r>
+          </a:p>
+          <a:p>
+            <a:pPr>
+              <a:defRPr/>
+            </a:pPr>
+            <a:r>
+              <a:rPr lang="ru-RU" sz="1200" dirty="0"/>
+              <a:t>• точные числа – используются для определения точного формата чисел </a:t>
+            </a:r>
+          </a:p>
+          <a:p>
+            <a:pPr lvl="1">
+              <a:defRPr/>
+            </a:pPr>
+            <a:r>
+              <a:rPr lang="en-US" sz="1200" dirty="0"/>
+              <a:t>NUMERIC [precision [, scale]] </a:t>
+            </a:r>
+          </a:p>
+          <a:p>
+            <a:pPr lvl="1">
+              <a:defRPr/>
+            </a:pPr>
+            <a:r>
+              <a:rPr lang="en-US" sz="1200" dirty="0"/>
+              <a:t>DECIMAL [precision [, scale]] </a:t>
+            </a:r>
+          </a:p>
+          <a:p>
+            <a:pPr lvl="1">
+              <a:defRPr/>
+            </a:pPr>
+            <a:r>
+              <a:rPr lang="en-US" sz="1200" dirty="0"/>
+              <a:t>INTEGER </a:t>
+            </a:r>
+          </a:p>
+          <a:p>
+            <a:pPr lvl="1">
+              <a:defRPr/>
+            </a:pPr>
+            <a:r>
+              <a:rPr lang="en-US" sz="1200" dirty="0"/>
+              <a:t>SMALLINT </a:t>
+            </a:r>
+          </a:p>
+          <a:p>
+            <a:pPr>
+              <a:defRPr/>
+            </a:pPr>
+            <a:r>
+              <a:rPr lang="en-US" sz="1200" dirty="0"/>
+              <a:t>	</a:t>
+            </a:r>
+            <a:r>
+              <a:rPr lang="ru-RU" sz="1200" dirty="0"/>
+              <a:t>(сокращения INT, DEC; </a:t>
+            </a:r>
+            <a:r>
+              <a:rPr lang="ru-RU" sz="1200" dirty="0" err="1"/>
+              <a:t>precision</a:t>
+            </a:r>
+            <a:r>
+              <a:rPr lang="ru-RU" sz="1200" dirty="0"/>
+              <a:t> – число знаков, </a:t>
+            </a:r>
+            <a:r>
+              <a:rPr lang="ru-RU" sz="1200" dirty="0" err="1"/>
+              <a:t>scale</a:t>
+            </a:r>
+            <a:r>
+              <a:rPr lang="ru-RU" sz="1200" dirty="0"/>
+              <a:t> – число знаков дробной части); </a:t>
+            </a:r>
+            <a:endParaRPr lang="en-US" sz="1200" dirty="0"/>
+          </a:p>
+          <a:p>
+            <a:pPr>
+              <a:buFont typeface="Arial" pitchFamily="34" charset="0"/>
+              <a:buChar char="•"/>
+              <a:defRPr/>
+            </a:pPr>
+            <a:r>
+              <a:rPr lang="ru-RU" sz="1200" dirty="0"/>
+              <a:t>дата и время – предназначены для определения моментов времени DATE </a:t>
+            </a:r>
+          </a:p>
+          <a:p>
+            <a:pPr lvl="1">
+              <a:defRPr/>
+            </a:pPr>
+            <a:r>
+              <a:rPr lang="en-US" sz="1200" dirty="0"/>
+              <a:t>TIME [</a:t>
+            </a:r>
+            <a:r>
+              <a:rPr lang="en-US" sz="1200" dirty="0" err="1"/>
+              <a:t>time_precision</a:t>
+            </a:r>
+            <a:r>
+              <a:rPr lang="en-US" sz="1200" dirty="0"/>
+              <a:t>] [WITH TIME ZONE] </a:t>
+            </a:r>
+          </a:p>
+          <a:p>
+            <a:pPr lvl="1">
+              <a:defRPr/>
+            </a:pPr>
+            <a:r>
+              <a:rPr lang="en-US" sz="1200" dirty="0"/>
+              <a:t>TIMESTAMP [</a:t>
+            </a:r>
+            <a:r>
+              <a:rPr lang="en-US" sz="1200" dirty="0" err="1"/>
+              <a:t>time_precision</a:t>
+            </a:r>
+            <a:r>
+              <a:rPr lang="en-US" sz="1200" dirty="0"/>
+              <a:t>] [WITH TIME ZONE] </a:t>
+            </a:r>
+          </a:p>
+          <a:p>
+            <a:pPr>
+              <a:defRPr/>
+            </a:pPr>
+            <a:r>
+              <a:rPr lang="ru-RU" sz="1200" dirty="0"/>
+              <a:t>• интервальные данные – используются для представления периодов времени </a:t>
+            </a:r>
+          </a:p>
+          <a:p>
+            <a:pPr lvl="1">
+              <a:defRPr/>
+            </a:pPr>
+            <a:r>
+              <a:rPr lang="en-US" sz="1200" dirty="0"/>
+              <a:t>INTERVAL {{</a:t>
+            </a:r>
+            <a:r>
+              <a:rPr lang="en-US" sz="1200" dirty="0" err="1"/>
+              <a:t>start_field</a:t>
+            </a:r>
+            <a:r>
+              <a:rPr lang="en-US" sz="1200" dirty="0"/>
+              <a:t> TO </a:t>
+            </a:r>
+            <a:r>
+              <a:rPr lang="en-US" sz="1200" dirty="0" err="1"/>
+              <a:t>end_field</a:t>
+            </a:r>
+            <a:r>
+              <a:rPr lang="en-US" sz="1200" dirty="0"/>
+              <a:t>} </a:t>
+            </a:r>
+            <a:r>
+              <a:rPr lang="en-US" sz="1200" dirty="0" err="1"/>
+              <a:t>single_datetime_field</a:t>
+            </a:r>
+            <a:r>
+              <a:rPr lang="en-US" sz="1200" dirty="0"/>
+              <a:t>} </a:t>
+            </a:r>
+          </a:p>
+          <a:p>
+            <a:pPr lvl="1">
+              <a:defRPr/>
+            </a:pPr>
+            <a:r>
+              <a:rPr lang="en-US" sz="1200" dirty="0"/>
+              <a:t>[,fractional seconds precision])]</a:t>
+            </a:r>
+          </a:p>
+          <a:p>
+            <a:pPr lvl="1">
+              <a:defRPr/>
+            </a:pPr>
+            <a:endParaRPr lang="en-US" sz="1200" dirty="0"/>
+          </a:p>
+          <a:p>
+            <a:pPr marL="0" lvl="1">
+              <a:defRPr/>
+            </a:pPr>
+            <a:r>
+              <a:rPr lang="be-BY" sz="1200" b="1" dirty="0"/>
+              <a:t>Дополнительные типы данных:</a:t>
+            </a:r>
+            <a:endParaRPr lang="en-US" sz="1200" b="1" dirty="0"/>
+          </a:p>
+          <a:p>
+            <a:pPr>
+              <a:defRPr/>
+            </a:pPr>
+            <a:r>
+              <a:rPr lang="ru-RU" sz="1200" dirty="0"/>
+              <a:t>• денежные данные – описывают представление денежных величин </a:t>
+            </a:r>
+          </a:p>
+          <a:p>
+            <a:pPr>
+              <a:defRPr/>
+            </a:pPr>
+            <a:r>
+              <a:rPr lang="en-US" sz="1200" dirty="0"/>
+              <a:t>	</a:t>
+            </a:r>
+            <a:r>
+              <a:rPr lang="en-US" sz="1200" dirty="0"/>
+              <a:t>MONEY </a:t>
+            </a:r>
+            <a:endParaRPr lang="en-US" sz="1200" dirty="0"/>
+          </a:p>
+          <a:p>
+            <a:pPr>
+              <a:defRPr/>
+            </a:pPr>
+            <a:r>
+              <a:rPr lang="ru-RU" sz="1200" dirty="0"/>
+              <a:t>• двоичные данные – позволяют хранить данные любого объема в двоичном коде</a:t>
+            </a:r>
+          </a:p>
+          <a:p>
+            <a:pPr lvl="1">
+              <a:defRPr/>
+            </a:pPr>
+            <a:r>
+              <a:rPr lang="en-US" sz="1200" dirty="0"/>
+              <a:t>BINARY </a:t>
+            </a:r>
+          </a:p>
+          <a:p>
+            <a:pPr lvl="1">
+              <a:defRPr/>
+            </a:pPr>
+            <a:r>
+              <a:rPr lang="en-US" sz="1200" dirty="0"/>
+              <a:t>BYTE </a:t>
+            </a:r>
+          </a:p>
+          <a:p>
+            <a:pPr lvl="1">
+              <a:defRPr/>
+            </a:pPr>
+            <a:r>
+              <a:rPr lang="en-US" sz="1200" dirty="0"/>
+              <a:t>BLOB </a:t>
+            </a:r>
+          </a:p>
+          <a:p>
+            <a:pPr>
+              <a:defRPr/>
+            </a:pPr>
+            <a:r>
+              <a:rPr lang="ru-RU" sz="1200" dirty="0"/>
+              <a:t>• последовательные данные – используются для представления возрастающих числовых последовательностей </a:t>
+            </a:r>
+          </a:p>
+          <a:p>
+            <a:pPr lvl="1">
+              <a:defRPr/>
+            </a:pPr>
+            <a:r>
+              <a:rPr lang="en-US" sz="1200" dirty="0"/>
+              <a:t>SERIAL</a:t>
+            </a:r>
+          </a:p>
+        </p:txBody>
+      </p:sp>
+    </p:spTree>
+    <p:extLst>
+      <p:ext uri="{BB962C8B-B14F-4D97-AF65-F5344CB8AC3E}">
+        <p14:creationId xmlns:p14="http://schemas.microsoft.com/office/powerpoint/2010/main" val="2387972453"/>
+      </p:ext>
+    </p:extLst>
+  </p:cSld>
+  <p:clrMapOvr>
+    <a:masterClrMapping/>
+  </p:clrMapOvr>
+  <p:timing>
+    <p:tnLst>
+      <p:par>
+        <p:cTn id="1" dur="indefinite" restart="never" nodeType="tmRoot"/>
+      </p:par>
+    </p:tnLst>
+  </p:timing>
+</p:sld>
+</file>
+
+<file path=ppt/slides/slide12.xml><?xml version="1.0" encoding="utf-8"?>
+<p:sld xmlns:a="http://schemas.openxmlformats.org/drawingml/2006/main" xmlns:r="http://schemas.openxmlformats.org/officeDocument/2006/relationships" xmlns:p="http://schemas.openxmlformats.org/presentationml/2006/main">
+  <p:cSld>
+    <p:spTree>
+      <p:nvGrpSpPr>
+        <p:cNvPr id="1" name=""/>
+        <p:cNvGrpSpPr/>
+        <p:nvPr/>
+      </p:nvGrpSpPr>
+      <p:grpSpPr>
+        <a:xfrm>
+          <a:off x="0" y="0"/>
+          <a:ext cx="0" cy="0"/>
+          <a:chOff x="0" y="0"/>
+          <a:chExt cx="0" cy="0"/>
+        </a:xfrm>
+      </p:grpSpPr>
+      <p:sp>
+        <p:nvSpPr>
+          <p:cNvPr id="6146" name="Прямоугольник 4"/>
+          <p:cNvSpPr>
+            <a:spLocks noChangeArrowheads="1"/>
+          </p:cNvSpPr>
+          <p:nvPr/>
+        </p:nvSpPr>
+        <p:spPr bwMode="auto">
+          <a:xfrm>
+            <a:off x="152400" y="381000"/>
+            <a:ext cx="8839200" cy="830263"/>
+          </a:xfrm>
+          <a:prstGeom prst="rect">
+            <a:avLst/>
+          </a:prstGeom>
+          <a:noFill/>
+          <a:ln>
+            <a:noFill/>
+          </a:ln>
+          <a:extLst>
+            <a:ext uri="{909E8E84-426E-40DD-AFC4-6F175D3DCCD1}">
+              <a14:hiddenFill xmlns:a14="http://schemas.microsoft.com/office/drawing/2010/main">
+                <a:solidFill>
+                  <a:srgbClr val="FFFFFF"/>
+                </a:solidFill>
+              </a14:hiddenFill>
+            </a:ext>
+            <a:ext uri="{91240B29-F687-4F45-9708-019B960494DF}">
+              <a14:hiddenLine xmlns:a14="http://schemas.microsoft.com/office/drawing/2010/main" w="9525">
+                <a:solidFill>
+                  <a:srgbClr val="000000"/>
+                </a:solidFill>
+                <a:miter lim="800000"/>
+                <a:headEnd/>
+                <a:tailEnd/>
+              </a14:hiddenLine>
+            </a:ext>
+          </a:extLst>
+        </p:spPr>
+        <p:txBody>
+          <a:bodyPr>
+            <a:spAutoFit/>
+          </a:bodyPr>
+          <a:lstStyle/>
+          <a:p>
+            <a:r>
+              <a:rPr lang="ru-RU" sz="1200"/>
+              <a:t>Для управления базами данных используются следующие команды</a:t>
+            </a:r>
+            <a:r>
+              <a:rPr lang="en-US" sz="1200"/>
+              <a:t>:</a:t>
+            </a:r>
+          </a:p>
+          <a:p>
+            <a:pPr lvl="1"/>
+            <a:r>
+              <a:rPr lang="ru-RU" sz="1200"/>
+              <a:t>• CREATE - определить и создать объект базы данных; </a:t>
+            </a:r>
+          </a:p>
+          <a:p>
+            <a:pPr lvl="1"/>
+            <a:r>
+              <a:rPr lang="ru-RU" sz="1200"/>
+              <a:t>• ALTER - изменить определение объекта базы данных; </a:t>
+            </a:r>
+          </a:p>
+          <a:p>
+            <a:pPr lvl="1"/>
+            <a:r>
+              <a:rPr lang="ru-RU" sz="1200"/>
+              <a:t>• DROP - удалить существующий объект базы данных. </a:t>
+            </a:r>
+            <a:endParaRPr lang="en-US" sz="1200"/>
+          </a:p>
+        </p:txBody>
+      </p:sp>
+      <p:sp>
+        <p:nvSpPr>
+          <p:cNvPr id="4" name="Прямоугольник 3"/>
+          <p:cNvSpPr/>
+          <p:nvPr/>
+        </p:nvSpPr>
+        <p:spPr>
+          <a:xfrm>
+            <a:off x="152400" y="4648200"/>
+            <a:ext cx="8839200" cy="2124075"/>
+          </a:xfrm>
+          <a:prstGeom prst="rect">
+            <a:avLst/>
+          </a:prstGeom>
+          <a:ln>
+            <a:solidFill>
+              <a:schemeClr val="bg1">
+                <a:lumMod val="65000"/>
+              </a:schemeClr>
+            </a:solidFill>
+          </a:ln>
+        </p:spPr>
+        <p:txBody>
+          <a:bodyPr>
+            <a:spAutoFit/>
+          </a:bodyPr>
+          <a:lstStyle/>
+          <a:p>
+            <a:pPr lvl="1">
+              <a:defRPr/>
+            </a:pPr>
+            <a:r>
+              <a:rPr lang="en-US" sz="1200" dirty="0">
+                <a:latin typeface="Courier New" pitchFamily="49" charset="0"/>
+                <a:cs typeface="Courier New" pitchFamily="49" charset="0"/>
+              </a:rPr>
+              <a:t>CREATE TABLE student ( </a:t>
+            </a:r>
+          </a:p>
+          <a:p>
+            <a:pPr lvl="2">
+              <a:defRPr/>
+            </a:pPr>
+            <a:r>
+              <a:rPr lang="en-US" sz="1200" dirty="0" err="1">
+                <a:latin typeface="Courier New" pitchFamily="49" charset="0"/>
+                <a:cs typeface="Courier New" pitchFamily="49" charset="0"/>
+              </a:rPr>
+              <a:t>student_ID</a:t>
+            </a:r>
+            <a:r>
+              <a:rPr lang="en-US" sz="1200" dirty="0">
+                <a:latin typeface="Courier New" pitchFamily="49" charset="0"/>
+                <a:cs typeface="Courier New" pitchFamily="49" charset="0"/>
+              </a:rPr>
+              <a:t>  integer   NOT NULL, </a:t>
+            </a:r>
+          </a:p>
+          <a:p>
+            <a:pPr lvl="2">
+              <a:defRPr/>
+            </a:pPr>
+            <a:r>
+              <a:rPr lang="en-US" sz="1200" dirty="0">
+                <a:latin typeface="Courier New" pitchFamily="49" charset="0"/>
+                <a:cs typeface="Courier New" pitchFamily="49" charset="0"/>
+              </a:rPr>
+              <a:t>name        char(100), </a:t>
+            </a:r>
+          </a:p>
+          <a:p>
+            <a:pPr lvl="2">
+              <a:defRPr/>
+            </a:pPr>
+            <a:r>
+              <a:rPr lang="en-US" sz="1200" dirty="0">
+                <a:latin typeface="Courier New" pitchFamily="49" charset="0"/>
+                <a:cs typeface="Courier New" pitchFamily="49" charset="0"/>
+              </a:rPr>
+              <a:t>rating      float     DEFAULT 0.0, </a:t>
+            </a:r>
+          </a:p>
+          <a:p>
+            <a:pPr lvl="2">
+              <a:defRPr/>
+            </a:pPr>
+            <a:r>
+              <a:rPr lang="en-US" sz="1200" dirty="0" err="1">
+                <a:latin typeface="Courier New" pitchFamily="49" charset="0"/>
+                <a:cs typeface="Courier New" pitchFamily="49" charset="0"/>
+              </a:rPr>
+              <a:t>group_ID</a:t>
+            </a:r>
+            <a:r>
+              <a:rPr lang="en-US" sz="1200" dirty="0">
+                <a:latin typeface="Courier New" pitchFamily="49" charset="0"/>
+                <a:cs typeface="Courier New" pitchFamily="49" charset="0"/>
+              </a:rPr>
+              <a:t>    integer, </a:t>
+            </a:r>
+          </a:p>
+          <a:p>
+            <a:pPr lvl="2">
+              <a:defRPr/>
+            </a:pPr>
+            <a:r>
+              <a:rPr lang="en-US" sz="1200" dirty="0">
+                <a:latin typeface="Courier New" pitchFamily="49" charset="0"/>
+                <a:cs typeface="Courier New" pitchFamily="49" charset="0"/>
+              </a:rPr>
+              <a:t>PRIMARY KEY (</a:t>
+            </a:r>
+            <a:r>
+              <a:rPr lang="en-US" sz="1200" dirty="0" err="1">
+                <a:latin typeface="Courier New" pitchFamily="49" charset="0"/>
+                <a:cs typeface="Courier New" pitchFamily="49" charset="0"/>
+              </a:rPr>
+              <a:t>student_ID</a:t>
+            </a:r>
+            <a:r>
+              <a:rPr lang="en-US" sz="1200" dirty="0">
+                <a:latin typeface="Courier New" pitchFamily="49" charset="0"/>
+                <a:cs typeface="Courier New" pitchFamily="49" charset="0"/>
+              </a:rPr>
+              <a:t>), </a:t>
+            </a:r>
+          </a:p>
+          <a:p>
+            <a:pPr lvl="2">
+              <a:defRPr/>
+            </a:pPr>
+            <a:r>
+              <a:rPr lang="en-US" sz="1200" dirty="0">
+                <a:latin typeface="Courier New" pitchFamily="49" charset="0"/>
+                <a:cs typeface="Courier New" pitchFamily="49" charset="0"/>
+              </a:rPr>
+              <a:t>FOREIGN KEY (</a:t>
+            </a:r>
+            <a:r>
+              <a:rPr lang="en-US" sz="1200" dirty="0" err="1">
+                <a:latin typeface="Courier New" pitchFamily="49" charset="0"/>
+                <a:cs typeface="Courier New" pitchFamily="49" charset="0"/>
+              </a:rPr>
+              <a:t>group_ID</a:t>
+            </a:r>
+            <a:r>
+              <a:rPr lang="en-US" sz="1200" dirty="0">
+                <a:latin typeface="Courier New" pitchFamily="49" charset="0"/>
+                <a:cs typeface="Courier New" pitchFamily="49" charset="0"/>
+              </a:rPr>
+              <a:t>) REFERENCES group </a:t>
+            </a:r>
+          </a:p>
+          <a:p>
+            <a:pPr lvl="2">
+              <a:defRPr/>
+            </a:pPr>
+            <a:r>
+              <a:rPr lang="en-US" sz="1200" dirty="0">
+                <a:latin typeface="Courier New" pitchFamily="49" charset="0"/>
+                <a:cs typeface="Courier New" pitchFamily="49" charset="0"/>
+              </a:rPr>
+              <a:t>ON UPDATE  CASCADE,</a:t>
+            </a:r>
+          </a:p>
+          <a:p>
+            <a:pPr lvl="2">
+              <a:defRPr/>
+            </a:pPr>
+            <a:r>
+              <a:rPr lang="en-US" sz="1200" dirty="0">
+                <a:latin typeface="Courier New" pitchFamily="49" charset="0"/>
+                <a:cs typeface="Courier New" pitchFamily="49" charset="0"/>
+              </a:rPr>
+              <a:t>CONSTRAINT </a:t>
+            </a:r>
+            <a:r>
+              <a:rPr lang="en-US" sz="1200" dirty="0" err="1">
+                <a:latin typeface="Courier New" pitchFamily="49" charset="0"/>
+                <a:cs typeface="Courier New" pitchFamily="49" charset="0"/>
+              </a:rPr>
+              <a:t>rating_OK</a:t>
+            </a:r>
+            <a:r>
+              <a:rPr lang="en-US" sz="1200" dirty="0">
+                <a:latin typeface="Courier New" pitchFamily="49" charset="0"/>
+                <a:cs typeface="Courier New" pitchFamily="49" charset="0"/>
+              </a:rPr>
+              <a:t> CHECK ((rating &gt; 0) and (rating &lt;= 10.0)), </a:t>
+            </a:r>
+          </a:p>
+          <a:p>
+            <a:pPr lvl="2">
+              <a:defRPr/>
+            </a:pPr>
+            <a:r>
+              <a:rPr lang="en-US" sz="1200" dirty="0">
+                <a:latin typeface="Courier New" pitchFamily="49" charset="0"/>
+                <a:cs typeface="Courier New" pitchFamily="49" charset="0"/>
+              </a:rPr>
+              <a:t>CONSTRAINT </a:t>
+            </a:r>
+            <a:r>
+              <a:rPr lang="en-US" sz="1200" dirty="0" err="1">
+                <a:latin typeface="Courier New" pitchFamily="49" charset="0"/>
+                <a:cs typeface="Courier New" pitchFamily="49" charset="0"/>
+              </a:rPr>
+              <a:t>student_ID_OK</a:t>
+            </a:r>
+            <a:r>
+              <a:rPr lang="en-US" sz="1200" dirty="0">
+                <a:latin typeface="Courier New" pitchFamily="49" charset="0"/>
+                <a:cs typeface="Courier New" pitchFamily="49" charset="0"/>
+              </a:rPr>
+              <a:t> CHECK (</a:t>
+            </a:r>
+            <a:r>
+              <a:rPr lang="en-US" sz="1200" dirty="0" err="1">
+                <a:latin typeface="Courier New" pitchFamily="49" charset="0"/>
+                <a:cs typeface="Courier New" pitchFamily="49" charset="0"/>
+              </a:rPr>
+              <a:t>student_ID</a:t>
+            </a:r>
+            <a:r>
+              <a:rPr lang="en-US" sz="1200" dirty="0">
+                <a:latin typeface="Courier New" pitchFamily="49" charset="0"/>
+                <a:cs typeface="Courier New" pitchFamily="49" charset="0"/>
+              </a:rPr>
+              <a:t> &gt; 0)</a:t>
+            </a:r>
+          </a:p>
+          <a:p>
+            <a:pPr lvl="1">
+              <a:defRPr/>
+            </a:pPr>
+            <a:r>
+              <a:rPr lang="en-US" sz="1200" dirty="0">
+                <a:latin typeface="Courier New" pitchFamily="49" charset="0"/>
+                <a:cs typeface="Courier New" pitchFamily="49" charset="0"/>
+              </a:rPr>
+              <a:t>); </a:t>
+            </a:r>
+          </a:p>
+        </p:txBody>
+      </p:sp>
+      <p:sp>
+        <p:nvSpPr>
+          <p:cNvPr id="6148" name="Прямоугольник 5"/>
+          <p:cNvSpPr>
+            <a:spLocks noChangeArrowheads="1"/>
+          </p:cNvSpPr>
+          <p:nvPr/>
+        </p:nvSpPr>
+        <p:spPr bwMode="auto">
+          <a:xfrm>
+            <a:off x="152400" y="1219200"/>
+            <a:ext cx="8839200" cy="3324225"/>
+          </a:xfrm>
+          <a:prstGeom prst="rect">
+            <a:avLst/>
+          </a:prstGeom>
+          <a:noFill/>
+          <a:ln w="9525">
+            <a:solidFill>
+              <a:srgbClr val="FF0000"/>
+            </a:solidFill>
+            <a:miter lim="800000"/>
+            <a:headEnd/>
+            <a:tailEnd/>
+          </a:ln>
+          <a:extLst>
+            <a:ext uri="{909E8E84-426E-40DD-AFC4-6F175D3DCCD1}">
+              <a14:hiddenFill xmlns:a14="http://schemas.microsoft.com/office/drawing/2010/main">
+                <a:solidFill>
+                  <a:srgbClr val="FFFFFF"/>
+                </a:solidFill>
+              </a14:hiddenFill>
+            </a:ext>
+          </a:extLst>
+        </p:spPr>
+        <p:txBody>
+          <a:bodyPr>
+            <a:spAutoFit/>
+          </a:bodyPr>
+          <a:lstStyle/>
+          <a:p>
+            <a:endParaRPr lang="be-BY" sz="1000">
+              <a:latin typeface="Courier New" pitchFamily="49" charset="0"/>
+              <a:cs typeface="Courier New" pitchFamily="49" charset="0"/>
+            </a:endParaRPr>
+          </a:p>
+          <a:p>
+            <a:pPr lvl="1"/>
+            <a:r>
+              <a:rPr lang="en-US" sz="1000">
+                <a:latin typeface="Courier New" pitchFamily="49" charset="0"/>
+                <a:cs typeface="Courier New" pitchFamily="49" charset="0"/>
+              </a:rPr>
+              <a:t>CREATE TABLE table_name ( </a:t>
+            </a:r>
+          </a:p>
+          <a:p>
+            <a:pPr lvl="2"/>
+            <a:r>
+              <a:rPr lang="en-US" sz="1000">
+                <a:latin typeface="Courier New" pitchFamily="49" charset="0"/>
+                <a:cs typeface="Courier New" pitchFamily="49" charset="0"/>
+              </a:rPr>
+              <a:t>{</a:t>
+            </a:r>
+          </a:p>
+          <a:p>
+            <a:pPr lvl="2"/>
+            <a:r>
+              <a:rPr lang="en-US" sz="1000">
+                <a:latin typeface="Courier New" pitchFamily="49" charset="0"/>
+                <a:cs typeface="Courier New" pitchFamily="49" charset="0"/>
+              </a:rPr>
+              <a:t>	column_name data_type [NOT NULL] [UNIQUE] </a:t>
+            </a:r>
+          </a:p>
+          <a:p>
+            <a:pPr lvl="2"/>
+            <a:r>
+              <a:rPr lang="en-US" sz="1000">
+                <a:latin typeface="Courier New" pitchFamily="49" charset="0"/>
+                <a:cs typeface="Courier New" pitchFamily="49" charset="0"/>
+              </a:rPr>
+              <a:t>	[DEFAULT default_option] [CHECK (search_condition)] [, …]</a:t>
+            </a:r>
+          </a:p>
+          <a:p>
+            <a:pPr lvl="2"/>
+            <a:r>
+              <a:rPr lang="en-US" sz="1000">
+                <a:latin typeface="Courier New" pitchFamily="49" charset="0"/>
+                <a:cs typeface="Courier New" pitchFamily="49" charset="0"/>
+              </a:rPr>
+              <a:t>} </a:t>
+            </a:r>
+            <a:endParaRPr lang="be-BY" sz="1000">
+              <a:latin typeface="Courier New" pitchFamily="49" charset="0"/>
+              <a:cs typeface="Courier New" pitchFamily="49" charset="0"/>
+            </a:endParaRPr>
+          </a:p>
+          <a:p>
+            <a:pPr lvl="2"/>
+            <a:r>
+              <a:rPr lang="en-US" sz="1000">
+                <a:latin typeface="Courier New" pitchFamily="49" charset="0"/>
+                <a:cs typeface="Courier New" pitchFamily="49" charset="0"/>
+              </a:rPr>
+              <a:t>[PRIMARY KEY (list_of_columns) [,]] </a:t>
+            </a:r>
+          </a:p>
+          <a:p>
+            <a:pPr lvl="2"/>
+            <a:r>
+              <a:rPr lang="en-US" sz="1000">
+                <a:latin typeface="Courier New" pitchFamily="49" charset="0"/>
+                <a:cs typeface="Courier New" pitchFamily="49" charset="0"/>
+              </a:rPr>
+              <a:t>{</a:t>
+            </a:r>
+          </a:p>
+          <a:p>
+            <a:pPr lvl="2"/>
+            <a:r>
+              <a:rPr lang="en-US" sz="1000">
+                <a:latin typeface="Courier New" pitchFamily="49" charset="0"/>
+                <a:cs typeface="Courier New" pitchFamily="49" charset="0"/>
+              </a:rPr>
+              <a:t>   [UNIQUE (list_of_columns), [, …]</a:t>
+            </a:r>
+          </a:p>
+          <a:p>
+            <a:pPr lvl="2"/>
+            <a:r>
+              <a:rPr lang="en-US" sz="1000">
+                <a:latin typeface="Courier New" pitchFamily="49" charset="0"/>
+                <a:cs typeface="Courier New" pitchFamily="49" charset="0"/>
+              </a:rPr>
+              <a:t>} </a:t>
+            </a:r>
+          </a:p>
+          <a:p>
+            <a:pPr lvl="2"/>
+            <a:r>
+              <a:rPr lang="en-US" sz="1000">
+                <a:latin typeface="Courier New" pitchFamily="49" charset="0"/>
+                <a:cs typeface="Courier New" pitchFamily="49" charset="0"/>
+              </a:rPr>
+              <a:t>{</a:t>
+            </a:r>
+          </a:p>
+          <a:p>
+            <a:pPr lvl="2"/>
+            <a:r>
+              <a:rPr lang="en-US" sz="1000">
+                <a:latin typeface="Courier New" pitchFamily="49" charset="0"/>
+                <a:cs typeface="Courier New" pitchFamily="49" charset="0"/>
+              </a:rPr>
+              <a:t>[   FOREIGN KEY (list_of_foreign_key_columns) </a:t>
+            </a:r>
+          </a:p>
+          <a:p>
+            <a:pPr lvl="2"/>
+            <a:r>
+              <a:rPr lang="en-US" sz="1000">
+                <a:latin typeface="Courier New" pitchFamily="49" charset="0"/>
+                <a:cs typeface="Courier New" pitchFamily="49" charset="0"/>
+              </a:rPr>
+              <a:t>    REFERENCES parent_table_name [(list_of_candidate_key_columns)], </a:t>
+            </a:r>
+          </a:p>
+          <a:p>
+            <a:pPr lvl="2"/>
+            <a:r>
+              <a:rPr lang="en-US" sz="1000">
+                <a:latin typeface="Courier New" pitchFamily="49" charset="0"/>
+                <a:cs typeface="Courier New" pitchFamily="49" charset="0"/>
+              </a:rPr>
+              <a:t>    [MATCH {PARTIAL | FULL}] </a:t>
+            </a:r>
+          </a:p>
+          <a:p>
+            <a:pPr lvl="2"/>
+            <a:r>
+              <a:rPr lang="en-US" sz="1000">
+                <a:latin typeface="Courier New" pitchFamily="49" charset="0"/>
+                <a:cs typeface="Courier New" pitchFamily="49" charset="0"/>
+              </a:rPr>
+              <a:t>    [ON UPDATE referential_action] </a:t>
+            </a:r>
+          </a:p>
+          <a:p>
+            <a:pPr lvl="2"/>
+            <a:r>
+              <a:rPr lang="en-US" sz="1000">
+                <a:latin typeface="Courier New" pitchFamily="49" charset="0"/>
+                <a:cs typeface="Courier New" pitchFamily="49" charset="0"/>
+              </a:rPr>
+              <a:t>    [ON DELETE referential_action] </a:t>
+            </a:r>
+          </a:p>
+          <a:p>
+            <a:pPr lvl="2"/>
+            <a:r>
+              <a:rPr lang="be-BY" sz="1000">
+                <a:latin typeface="Courier New" pitchFamily="49" charset="0"/>
+                <a:cs typeface="Courier New" pitchFamily="49" charset="0"/>
+              </a:rPr>
+              <a:t>] [, …]} </a:t>
+            </a:r>
+          </a:p>
+          <a:p>
+            <a:pPr lvl="2"/>
+            <a:r>
+              <a:rPr lang="en-US" sz="1000">
+                <a:latin typeface="Courier New" pitchFamily="49" charset="0"/>
+                <a:cs typeface="Courier New" pitchFamily="49" charset="0"/>
+              </a:rPr>
+              <a:t>{</a:t>
+            </a:r>
+          </a:p>
+          <a:p>
+            <a:pPr lvl="2"/>
+            <a:r>
+              <a:rPr lang="en-US" sz="1000">
+                <a:latin typeface="Courier New" pitchFamily="49" charset="0"/>
+                <a:cs typeface="Courier New" pitchFamily="49" charset="0"/>
+              </a:rPr>
+              <a:t>    [CHECK (search_condition)] [, …]</a:t>
+            </a:r>
+          </a:p>
+          <a:p>
+            <a:pPr lvl="2"/>
+            <a:r>
+              <a:rPr lang="en-US" sz="1000">
+                <a:latin typeface="Courier New" pitchFamily="49" charset="0"/>
+                <a:cs typeface="Courier New" pitchFamily="49" charset="0"/>
+              </a:rPr>
+              <a:t>}</a:t>
+            </a:r>
+          </a:p>
+          <a:p>
+            <a:pPr lvl="1"/>
+            <a:r>
+              <a:rPr lang="be-BY" sz="1000">
+                <a:latin typeface="Courier New" pitchFamily="49" charset="0"/>
+                <a:cs typeface="Courier New" pitchFamily="49" charset="0"/>
+              </a:rPr>
+              <a:t>)</a:t>
+            </a:r>
+          </a:p>
+        </p:txBody>
+      </p:sp>
+      <p:sp>
+        <p:nvSpPr>
+          <p:cNvPr id="6149" name="Прямоугольник 2"/>
+          <p:cNvSpPr>
+            <a:spLocks noChangeArrowheads="1"/>
+          </p:cNvSpPr>
+          <p:nvPr/>
+        </p:nvSpPr>
+        <p:spPr bwMode="auto">
+          <a:xfrm>
+            <a:off x="152400" y="0"/>
+            <a:ext cx="8839200" cy="461963"/>
+          </a:xfrm>
+          <a:prstGeom prst="rect">
+            <a:avLst/>
+          </a:prstGeom>
+          <a:noFill/>
+          <a:ln>
+            <a:noFill/>
+          </a:ln>
+          <a:extLst>
+            <a:ext uri="{909E8E84-426E-40DD-AFC4-6F175D3DCCD1}">
+              <a14:hiddenFill xmlns:a14="http://schemas.microsoft.com/office/drawing/2010/main">
+                <a:solidFill>
+                  <a:srgbClr val="FFFFFF"/>
+                </a:solidFill>
+              </a14:hiddenFill>
+            </a:ext>
+            <a:ext uri="{91240B29-F687-4F45-9708-019B960494DF}">
+              <a14:hiddenLine xmlns:a14="http://schemas.microsoft.com/office/drawing/2010/main" w="9525">
+                <a:solidFill>
+                  <a:srgbClr val="000000"/>
+                </a:solidFill>
+                <a:miter lim="800000"/>
+                <a:headEnd/>
+                <a:tailEnd/>
+              </a14:hiddenLine>
+            </a:ext>
+          </a:extLst>
+        </p:spPr>
+        <p:txBody>
+          <a:bodyPr>
+            <a:spAutoFit/>
+          </a:bodyPr>
+          <a:lstStyle/>
+          <a:p>
+            <a:pPr algn="ctr"/>
+            <a:r>
+              <a:rPr lang="ru-RU" sz="2400" b="1"/>
+              <a:t>Работа с таблицами.</a:t>
+            </a:r>
+            <a:endParaRPr lang="be-BY" sz="2400" b="1"/>
+          </a:p>
+        </p:txBody>
+      </p:sp>
+    </p:spTree>
+    <p:extLst>
+      <p:ext uri="{BB962C8B-B14F-4D97-AF65-F5344CB8AC3E}">
+        <p14:creationId xmlns:p14="http://schemas.microsoft.com/office/powerpoint/2010/main" val="319265010"/>
+      </p:ext>
+    </p:extLst>
+  </p:cSld>
+  <p:clrMapOvr>
+    <a:masterClrMapping/>
+  </p:clrMapOvr>
+  <p:timing>
+    <p:tnLst>
+      <p:par>
+        <p:cTn id="1" dur="indefinite" restart="never" nodeType="tmRoot"/>
+      </p:par>
+    </p:tnLst>
+  </p:timing>
+</p:sld>
+</file>
+
+<file path=ppt/slides/slide13.xml><?xml version="1.0" encoding="utf-8"?>
+<p:sld xmlns:a="http://schemas.openxmlformats.org/drawingml/2006/main" xmlns:r="http://schemas.openxmlformats.org/officeDocument/2006/relationships" xmlns:p="http://schemas.openxmlformats.org/presentationml/2006/main">
+  <p:cSld>
+    <p:spTree>
+      <p:nvGrpSpPr>
+        <p:cNvPr id="1" name=""/>
+        <p:cNvGrpSpPr/>
+        <p:nvPr/>
+      </p:nvGrpSpPr>
+      <p:grpSpPr>
+        <a:xfrm>
+          <a:off x="0" y="0"/>
+          <a:ext cx="0" cy="0"/>
+          <a:chOff x="0" y="0"/>
+          <a:chExt cx="0" cy="0"/>
+        </a:xfrm>
+      </p:grpSpPr>
+      <p:sp>
+        <p:nvSpPr>
+          <p:cNvPr id="7170" name="Прямоугольник 2"/>
+          <p:cNvSpPr>
+            <a:spLocks noChangeArrowheads="1"/>
+          </p:cNvSpPr>
+          <p:nvPr/>
+        </p:nvSpPr>
+        <p:spPr bwMode="auto">
+          <a:xfrm>
+            <a:off x="152400" y="487363"/>
+            <a:ext cx="8839200" cy="2062162"/>
+          </a:xfrm>
+          <a:prstGeom prst="rect">
+            <a:avLst/>
+          </a:prstGeom>
+          <a:noFill/>
+          <a:ln w="9525">
+            <a:solidFill>
+              <a:srgbClr val="FF0000"/>
+            </a:solidFill>
+            <a:miter lim="800000"/>
+            <a:headEnd/>
+            <a:tailEnd/>
+          </a:ln>
+          <a:extLst>
+            <a:ext uri="{909E8E84-426E-40DD-AFC4-6F175D3DCCD1}">
+              <a14:hiddenFill xmlns:a14="http://schemas.microsoft.com/office/drawing/2010/main">
+                <a:solidFill>
+                  <a:srgbClr val="FFFFFF"/>
+                </a:solidFill>
+              </a14:hiddenFill>
+            </a:ext>
+          </a:extLst>
+        </p:spPr>
+        <p:txBody>
+          <a:bodyPr>
+            <a:spAutoFit/>
+          </a:bodyPr>
+          <a:lstStyle/>
+          <a:p>
+            <a:pPr lvl="1"/>
+            <a:r>
+              <a:rPr lang="en-US" sz="1600">
+                <a:latin typeface="Courier New" pitchFamily="49" charset="0"/>
+                <a:cs typeface="Courier New" pitchFamily="49" charset="0"/>
+              </a:rPr>
+              <a:t>ALTER TABLE table_name </a:t>
+            </a:r>
+          </a:p>
+          <a:p>
+            <a:pPr lvl="1"/>
+            <a:r>
+              <a:rPr lang="en-US" sz="1600">
+                <a:latin typeface="Courier New" pitchFamily="49" charset="0"/>
+                <a:cs typeface="Courier New" pitchFamily="49" charset="0"/>
+              </a:rPr>
+              <a:t>[ADD [COLUMN] column_name data_type [NOT NULL] [UNIQUE] </a:t>
+            </a:r>
+          </a:p>
+          <a:p>
+            <a:pPr lvl="1"/>
+            <a:r>
+              <a:rPr lang="en-US" sz="1600">
+                <a:latin typeface="Courier New" pitchFamily="49" charset="0"/>
+                <a:cs typeface="Courier New" pitchFamily="49" charset="0"/>
+              </a:rPr>
+              <a:t>[DEFAULT default_option] [CHECK (search_condition)]] </a:t>
+            </a:r>
+          </a:p>
+          <a:p>
+            <a:pPr lvl="1"/>
+            <a:r>
+              <a:rPr lang="en-US" sz="1600">
+                <a:latin typeface="Courier New" pitchFamily="49" charset="0"/>
+                <a:cs typeface="Courier New" pitchFamily="49" charset="0"/>
+              </a:rPr>
+              <a:t>[DROP [COLUMN] column_name [RESTRICT | CASCADE]] </a:t>
+            </a:r>
+          </a:p>
+          <a:p>
+            <a:pPr lvl="1"/>
+            <a:r>
+              <a:rPr lang="en-US" sz="1600">
+                <a:latin typeface="Courier New" pitchFamily="49" charset="0"/>
+                <a:cs typeface="Courier New" pitchFamily="49" charset="0"/>
+              </a:rPr>
+              <a:t>[ADD [CONSTRAINT constraint_name] table_constraint_defenition] </a:t>
+            </a:r>
+          </a:p>
+          <a:p>
+            <a:pPr lvl="1"/>
+            <a:r>
+              <a:rPr lang="en-US" sz="1600">
+                <a:latin typeface="Courier New" pitchFamily="49" charset="0"/>
+                <a:cs typeface="Courier New" pitchFamily="49" charset="0"/>
+              </a:rPr>
+              <a:t>[DROP CONSTRAINT constraint_name [RESTRICT | CASCADE]] </a:t>
+            </a:r>
+          </a:p>
+          <a:p>
+            <a:pPr lvl="1"/>
+            <a:r>
+              <a:rPr lang="en-US" sz="1600">
+                <a:latin typeface="Courier New" pitchFamily="49" charset="0"/>
+                <a:cs typeface="Courier New" pitchFamily="49" charset="0"/>
+              </a:rPr>
+              <a:t>[ALTER [COLUMN] SET DEFAULT default_option] </a:t>
+            </a:r>
+          </a:p>
+          <a:p>
+            <a:pPr lvl="1"/>
+            <a:r>
+              <a:rPr lang="en-US" sz="1600">
+                <a:latin typeface="Courier New" pitchFamily="49" charset="0"/>
+                <a:cs typeface="Courier New" pitchFamily="49" charset="0"/>
+              </a:rPr>
+              <a:t>[ALTER [COLUMN] DROP DEFAULT] </a:t>
+            </a:r>
+          </a:p>
+        </p:txBody>
+      </p:sp>
+      <p:sp>
+        <p:nvSpPr>
+          <p:cNvPr id="4" name="Прямоугольник 3"/>
+          <p:cNvSpPr/>
+          <p:nvPr/>
+        </p:nvSpPr>
+        <p:spPr>
+          <a:xfrm>
+            <a:off x="152400" y="2655888"/>
+            <a:ext cx="8839200" cy="1077912"/>
+          </a:xfrm>
+          <a:prstGeom prst="rect">
+            <a:avLst/>
+          </a:prstGeom>
+          <a:ln>
+            <a:solidFill>
+              <a:schemeClr val="bg1">
+                <a:lumMod val="65000"/>
+              </a:schemeClr>
+            </a:solidFill>
+          </a:ln>
+        </p:spPr>
+        <p:txBody>
+          <a:bodyPr>
+            <a:spAutoFit/>
+          </a:bodyPr>
+          <a:lstStyle/>
+          <a:p>
+            <a:pPr lvl="1">
+              <a:defRPr/>
+            </a:pPr>
+            <a:r>
+              <a:rPr lang="en-US" sz="1600" dirty="0">
+                <a:latin typeface="Courier New" pitchFamily="49" charset="0"/>
+                <a:cs typeface="Courier New" pitchFamily="49" charset="0"/>
+              </a:rPr>
+              <a:t>ALTER TABLE student </a:t>
+            </a:r>
+          </a:p>
+          <a:p>
+            <a:pPr lvl="1">
+              <a:defRPr/>
+            </a:pPr>
+            <a:r>
+              <a:rPr lang="en-US" sz="1600" dirty="0">
+                <a:latin typeface="Courier New" pitchFamily="49" charset="0"/>
+                <a:cs typeface="Courier New" pitchFamily="49" charset="0"/>
+              </a:rPr>
+              <a:t>ADD CONSTRAINT </a:t>
+            </a:r>
+            <a:r>
+              <a:rPr lang="en-US" sz="1600" dirty="0" err="1">
+                <a:latin typeface="Courier New" pitchFamily="49" charset="0"/>
+                <a:cs typeface="Courier New" pitchFamily="49" charset="0"/>
+              </a:rPr>
+              <a:t>group_refer</a:t>
+            </a:r>
+            <a:r>
+              <a:rPr lang="en-US" sz="1600" dirty="0">
+                <a:latin typeface="Courier New" pitchFamily="49" charset="0"/>
+                <a:cs typeface="Courier New" pitchFamily="49" charset="0"/>
+              </a:rPr>
+              <a:t> </a:t>
+            </a:r>
+            <a:endParaRPr lang="be-BY" sz="1600" dirty="0">
+              <a:latin typeface="Courier New" pitchFamily="49" charset="0"/>
+              <a:cs typeface="Courier New" pitchFamily="49" charset="0"/>
+            </a:endParaRPr>
+          </a:p>
+          <a:p>
+            <a:pPr lvl="1">
+              <a:defRPr/>
+            </a:pPr>
+            <a:r>
+              <a:rPr lang="en-US" sz="1600" dirty="0">
+                <a:latin typeface="Courier New" pitchFamily="49" charset="0"/>
+                <a:cs typeface="Courier New" pitchFamily="49" charset="0"/>
+              </a:rPr>
+              <a:t>FOREIGN KEY (</a:t>
+            </a:r>
+            <a:r>
+              <a:rPr lang="en-US" sz="1600" dirty="0" err="1">
+                <a:latin typeface="Courier New" pitchFamily="49" charset="0"/>
+                <a:cs typeface="Courier New" pitchFamily="49" charset="0"/>
+              </a:rPr>
+              <a:t>group_ID</a:t>
+            </a:r>
+            <a:r>
+              <a:rPr lang="en-US" sz="1600" dirty="0">
+                <a:latin typeface="Courier New" pitchFamily="49" charset="0"/>
+                <a:cs typeface="Courier New" pitchFamily="49" charset="0"/>
+              </a:rPr>
+              <a:t>) REFERENCES group </a:t>
+            </a:r>
+          </a:p>
+          <a:p>
+            <a:pPr lvl="2">
+              <a:defRPr/>
+            </a:pPr>
+            <a:r>
+              <a:rPr lang="en-US" sz="1600" dirty="0">
+                <a:latin typeface="Courier New" pitchFamily="49" charset="0"/>
+                <a:cs typeface="Courier New" pitchFamily="49" charset="0"/>
+              </a:rPr>
+              <a:t>ON UPDATE CASCADE; </a:t>
+            </a:r>
+          </a:p>
+        </p:txBody>
+      </p:sp>
+      <p:sp>
+        <p:nvSpPr>
+          <p:cNvPr id="7172" name="Прямоугольник 5"/>
+          <p:cNvSpPr>
+            <a:spLocks noChangeArrowheads="1"/>
+          </p:cNvSpPr>
+          <p:nvPr/>
+        </p:nvSpPr>
+        <p:spPr bwMode="auto">
+          <a:xfrm>
+            <a:off x="152400" y="4233863"/>
+            <a:ext cx="8839200" cy="338137"/>
+          </a:xfrm>
+          <a:prstGeom prst="rect">
+            <a:avLst/>
+          </a:prstGeom>
+          <a:noFill/>
+          <a:ln w="9525">
+            <a:solidFill>
+              <a:srgbClr val="FF0000"/>
+            </a:solidFill>
+            <a:miter lim="800000"/>
+            <a:headEnd/>
+            <a:tailEnd/>
+          </a:ln>
+          <a:extLst>
+            <a:ext uri="{909E8E84-426E-40DD-AFC4-6F175D3DCCD1}">
+              <a14:hiddenFill xmlns:a14="http://schemas.microsoft.com/office/drawing/2010/main">
+                <a:solidFill>
+                  <a:srgbClr val="FFFFFF"/>
+                </a:solidFill>
+              </a14:hiddenFill>
+            </a:ext>
+          </a:extLst>
+        </p:spPr>
+        <p:txBody>
+          <a:bodyPr>
+            <a:spAutoFit/>
+          </a:bodyPr>
+          <a:lstStyle/>
+          <a:p>
+            <a:r>
+              <a:rPr lang="en-US" sz="1600">
+                <a:latin typeface="Courier New" pitchFamily="49" charset="0"/>
+                <a:cs typeface="Courier New" pitchFamily="49" charset="0"/>
+              </a:rPr>
+              <a:t>DROP TABLE table_name [RESTICT | CASCADE] </a:t>
+            </a:r>
+            <a:endParaRPr lang="be-BY" sz="1600">
+              <a:latin typeface="Courier New" pitchFamily="49" charset="0"/>
+              <a:cs typeface="Courier New" pitchFamily="49" charset="0"/>
+            </a:endParaRPr>
+          </a:p>
+        </p:txBody>
+      </p:sp>
+      <p:sp>
+        <p:nvSpPr>
+          <p:cNvPr id="7173" name="Прямоугольник 2"/>
+          <p:cNvSpPr>
+            <a:spLocks noChangeArrowheads="1"/>
+          </p:cNvSpPr>
+          <p:nvPr/>
+        </p:nvSpPr>
+        <p:spPr bwMode="auto">
+          <a:xfrm>
+            <a:off x="152400" y="0"/>
+            <a:ext cx="8839200" cy="461963"/>
+          </a:xfrm>
+          <a:prstGeom prst="rect">
+            <a:avLst/>
+          </a:prstGeom>
+          <a:noFill/>
+          <a:ln>
+            <a:noFill/>
+          </a:ln>
+          <a:extLst>
+            <a:ext uri="{909E8E84-426E-40DD-AFC4-6F175D3DCCD1}">
+              <a14:hiddenFill xmlns:a14="http://schemas.microsoft.com/office/drawing/2010/main">
+                <a:solidFill>
+                  <a:srgbClr val="FFFFFF"/>
+                </a:solidFill>
+              </a14:hiddenFill>
+            </a:ext>
+            <a:ext uri="{91240B29-F687-4F45-9708-019B960494DF}">
+              <a14:hiddenLine xmlns:a14="http://schemas.microsoft.com/office/drawing/2010/main" w="9525">
+                <a:solidFill>
+                  <a:srgbClr val="000000"/>
+                </a:solidFill>
+                <a:miter lim="800000"/>
+                <a:headEnd/>
+                <a:tailEnd/>
+              </a14:hiddenLine>
+            </a:ext>
+          </a:extLst>
+        </p:spPr>
+        <p:txBody>
+          <a:bodyPr>
+            <a:spAutoFit/>
+          </a:bodyPr>
+          <a:lstStyle/>
+          <a:p>
+            <a:pPr algn="ctr"/>
+            <a:r>
+              <a:rPr lang="ru-RU" sz="2400" b="1"/>
+              <a:t>Работа с таблицами.</a:t>
+            </a:r>
+            <a:endParaRPr lang="be-BY" sz="2400" b="1"/>
+          </a:p>
+        </p:txBody>
+      </p:sp>
+    </p:spTree>
+    <p:extLst>
+      <p:ext uri="{BB962C8B-B14F-4D97-AF65-F5344CB8AC3E}">
+        <p14:creationId xmlns:p14="http://schemas.microsoft.com/office/powerpoint/2010/main" val="2150446948"/>
+      </p:ext>
+    </p:extLst>
+  </p:cSld>
+  <p:clrMapOvr>
+    <a:masterClrMapping/>
+  </p:clrMapOvr>
+  <p:timing>
+    <p:tnLst>
+      <p:par>
+        <p:cTn id="1" dur="indefinite" restart="never" nodeType="tmRoot"/>
+      </p:par>
+    </p:tnLst>
+  </p:timing>
+</p:sld>
+</file>
+
+<file path=ppt/slides/slide14.xml><?xml version="1.0" encoding="utf-8"?>
+<p:sld xmlns:a="http://schemas.openxmlformats.org/drawingml/2006/main" xmlns:r="http://schemas.openxmlformats.org/officeDocument/2006/relationships" xmlns:p="http://schemas.openxmlformats.org/presentationml/2006/main">
+  <p:cSld>
+    <p:spTree>
+      <p:nvGrpSpPr>
+        <p:cNvPr id="1" name=""/>
+        <p:cNvGrpSpPr/>
+        <p:nvPr/>
+      </p:nvGrpSpPr>
+      <p:grpSpPr>
+        <a:xfrm>
+          <a:off x="0" y="0"/>
+          <a:ext cx="0" cy="0"/>
+          <a:chOff x="0" y="0"/>
+          <a:chExt cx="0" cy="0"/>
+        </a:xfrm>
+      </p:grpSpPr>
+      <p:sp>
+        <p:nvSpPr>
+          <p:cNvPr id="8194" name="Прямоугольник 2"/>
+          <p:cNvSpPr>
+            <a:spLocks noChangeArrowheads="1"/>
+          </p:cNvSpPr>
+          <p:nvPr/>
+        </p:nvSpPr>
+        <p:spPr bwMode="auto">
+          <a:xfrm>
+            <a:off x="152400" y="0"/>
+            <a:ext cx="8839200" cy="461963"/>
+          </a:xfrm>
+          <a:prstGeom prst="rect">
+            <a:avLst/>
+          </a:prstGeom>
+          <a:noFill/>
+          <a:ln>
+            <a:noFill/>
+          </a:ln>
+          <a:extLst>
+            <a:ext uri="{909E8E84-426E-40DD-AFC4-6F175D3DCCD1}">
+              <a14:hiddenFill xmlns:a14="http://schemas.microsoft.com/office/drawing/2010/main">
+                <a:solidFill>
+                  <a:srgbClr val="FFFFFF"/>
+                </a:solidFill>
+              </a14:hiddenFill>
+            </a:ext>
+            <a:ext uri="{91240B29-F687-4F45-9708-019B960494DF}">
+              <a14:hiddenLine xmlns:a14="http://schemas.microsoft.com/office/drawing/2010/main" w="9525">
+                <a:solidFill>
+                  <a:srgbClr val="000000"/>
+                </a:solidFill>
+                <a:miter lim="800000"/>
+                <a:headEnd/>
+                <a:tailEnd/>
+              </a14:hiddenLine>
+            </a:ext>
+          </a:extLst>
+        </p:spPr>
+        <p:txBody>
+          <a:bodyPr>
+            <a:spAutoFit/>
+          </a:bodyPr>
+          <a:lstStyle/>
+          <a:p>
+            <a:pPr algn="ctr"/>
+            <a:r>
+              <a:rPr lang="en-US" sz="2400" b="1"/>
+              <a:t>SELECT.</a:t>
+            </a:r>
+            <a:endParaRPr lang="be-BY" sz="2400" b="1"/>
+          </a:p>
+        </p:txBody>
+      </p:sp>
+      <p:sp>
+        <p:nvSpPr>
+          <p:cNvPr id="8195" name="Прямоугольник 6"/>
+          <p:cNvSpPr>
+            <a:spLocks noChangeArrowheads="1"/>
+          </p:cNvSpPr>
+          <p:nvPr/>
+        </p:nvSpPr>
+        <p:spPr bwMode="auto">
+          <a:xfrm>
+            <a:off x="152400" y="457200"/>
+            <a:ext cx="8839200" cy="1323975"/>
+          </a:xfrm>
+          <a:prstGeom prst="rect">
+            <a:avLst/>
+          </a:prstGeom>
+          <a:noFill/>
+          <a:ln w="9525">
+            <a:solidFill>
+              <a:srgbClr val="FF0000"/>
+            </a:solidFill>
+            <a:miter lim="800000"/>
+            <a:headEnd/>
+            <a:tailEnd/>
+          </a:ln>
+          <a:extLst>
+            <a:ext uri="{909E8E84-426E-40DD-AFC4-6F175D3DCCD1}">
+              <a14:hiddenFill xmlns:a14="http://schemas.microsoft.com/office/drawing/2010/main">
+                <a:solidFill>
+                  <a:srgbClr val="FFFFFF"/>
+                </a:solidFill>
+              </a14:hiddenFill>
+            </a:ext>
+          </a:extLst>
+        </p:spPr>
+        <p:txBody>
+          <a:bodyPr>
+            <a:spAutoFit/>
+          </a:bodyPr>
+          <a:lstStyle/>
+          <a:p>
+            <a:r>
+              <a:rPr lang="en-US" sz="1600">
+                <a:latin typeface="Courier New" pitchFamily="49" charset="0"/>
+                <a:cs typeface="Courier New" pitchFamily="49" charset="0"/>
+              </a:rPr>
+              <a:t>SELECT [DISTINCT | ALL]{* | [column [AS new_column_name]] [, …]}</a:t>
+            </a:r>
+          </a:p>
+          <a:p>
+            <a:r>
+              <a:rPr lang="en-US" sz="1600">
+                <a:latin typeface="Courier New" pitchFamily="49" charset="0"/>
+                <a:cs typeface="Courier New" pitchFamily="49" charset="0"/>
+              </a:rPr>
+              <a:t>FROM table [alias] [,…]</a:t>
+            </a:r>
+          </a:p>
+          <a:p>
+            <a:r>
+              <a:rPr lang="en-US" sz="1600">
+                <a:latin typeface="Courier New" pitchFamily="49" charset="0"/>
+                <a:cs typeface="Courier New" pitchFamily="49" charset="0"/>
+              </a:rPr>
+              <a:t>[WHERE condition]</a:t>
+            </a:r>
+          </a:p>
+          <a:p>
+            <a:r>
+              <a:rPr lang="en-US" sz="1600">
+                <a:latin typeface="Courier New" pitchFamily="49" charset="0"/>
+                <a:cs typeface="Courier New" pitchFamily="49" charset="0"/>
+              </a:rPr>
+              <a:t>[GROUP BY list [HAVING condition]]</a:t>
+            </a:r>
+          </a:p>
+          <a:p>
+            <a:r>
+              <a:rPr lang="en-US" sz="1600">
+                <a:latin typeface="Courier New" pitchFamily="49" charset="0"/>
+                <a:cs typeface="Courier New" pitchFamily="49" charset="0"/>
+              </a:rPr>
+              <a:t>[ORDER BY list]</a:t>
+            </a:r>
+            <a:endParaRPr lang="be-BY" sz="1600">
+              <a:latin typeface="Courier New" pitchFamily="49" charset="0"/>
+              <a:cs typeface="Courier New" pitchFamily="49" charset="0"/>
+            </a:endParaRPr>
+          </a:p>
+        </p:txBody>
+      </p:sp>
+      <p:sp>
+        <p:nvSpPr>
+          <p:cNvPr id="8196" name="Прямоугольник 7"/>
+          <p:cNvSpPr>
+            <a:spLocks noChangeArrowheads="1"/>
+          </p:cNvSpPr>
+          <p:nvPr/>
+        </p:nvSpPr>
+        <p:spPr bwMode="auto">
+          <a:xfrm>
+            <a:off x="152400" y="1905000"/>
+            <a:ext cx="8839200" cy="2308225"/>
+          </a:xfrm>
+          <a:prstGeom prst="rect">
+            <a:avLst/>
+          </a:prstGeom>
+          <a:noFill/>
+          <a:ln>
+            <a:noFill/>
+          </a:ln>
+          <a:extLst>
+            <a:ext uri="{909E8E84-426E-40DD-AFC4-6F175D3DCCD1}">
+              <a14:hiddenFill xmlns:a14="http://schemas.microsoft.com/office/drawing/2010/main">
+                <a:solidFill>
+                  <a:srgbClr val="FFFFFF"/>
+                </a:solidFill>
+              </a14:hiddenFill>
+            </a:ext>
+            <a:ext uri="{91240B29-F687-4F45-9708-019B960494DF}">
+              <a14:hiddenLine xmlns:a14="http://schemas.microsoft.com/office/drawing/2010/main" w="9525">
+                <a:solidFill>
+                  <a:srgbClr val="000000"/>
+                </a:solidFill>
+                <a:miter lim="800000"/>
+                <a:headEnd/>
+                <a:tailEnd/>
+              </a14:hiddenLine>
+            </a:ext>
+          </a:extLst>
+        </p:spPr>
+        <p:txBody>
+          <a:bodyPr>
+            <a:spAutoFit/>
+          </a:bodyPr>
+          <a:lstStyle/>
+          <a:p>
+            <a:pPr lvl="2"/>
+            <a:r>
+              <a:rPr lang="be-BY" sz="1600"/>
+              <a:t>Здесь использованы следующие обозначения:</a:t>
+            </a:r>
+          </a:p>
+          <a:p>
+            <a:pPr lvl="2"/>
+            <a:r>
+              <a:rPr lang="ru-RU" sz="1600"/>
+              <a:t>• column – имя столбца (или константа, или выражение);</a:t>
+            </a:r>
+          </a:p>
+          <a:p>
+            <a:pPr lvl="2"/>
+            <a:r>
+              <a:rPr lang="ru-RU" sz="1600"/>
+              <a:t>• DISTINCT - результат не будет содержать строк-дубликатов;</a:t>
+            </a:r>
+          </a:p>
+          <a:p>
+            <a:pPr lvl="2"/>
+            <a:r>
+              <a:rPr lang="ru-RU" sz="1600"/>
+              <a:t>• ALL - результат может содержать дублирующие строки (по умолчанию);</a:t>
+            </a:r>
+          </a:p>
+          <a:p>
+            <a:pPr lvl="2"/>
+            <a:r>
+              <a:rPr lang="be-BY" sz="1600"/>
+              <a:t>• * - все столбцы;</a:t>
+            </a:r>
+          </a:p>
+          <a:p>
+            <a:pPr lvl="2"/>
+            <a:r>
+              <a:rPr lang="en-US" sz="1600"/>
+              <a:t>• table - </a:t>
+            </a:r>
+            <a:r>
+              <a:rPr lang="be-BY" sz="1600"/>
+              <a:t>имя таблицы;</a:t>
+            </a:r>
+          </a:p>
+          <a:p>
+            <a:pPr lvl="2"/>
+            <a:r>
+              <a:rPr lang="ru-RU" sz="1600"/>
+              <a:t>• alias - сокращение для имени таблицы;</a:t>
+            </a:r>
+          </a:p>
+          <a:p>
+            <a:pPr lvl="2"/>
+            <a:r>
+              <a:rPr lang="ru-RU" sz="1600"/>
+              <a:t>• condition - условие фильтрации строк данных;</a:t>
+            </a:r>
+          </a:p>
+          <a:p>
+            <a:pPr lvl="2"/>
+            <a:r>
+              <a:rPr lang="en-US" sz="1600"/>
+              <a:t>• list - </a:t>
+            </a:r>
+            <a:r>
+              <a:rPr lang="be-BY" sz="1600"/>
+              <a:t>список столбцов;</a:t>
+            </a:r>
+          </a:p>
+        </p:txBody>
+      </p:sp>
+    </p:spTree>
+    <p:extLst>
+      <p:ext uri="{BB962C8B-B14F-4D97-AF65-F5344CB8AC3E}">
+        <p14:creationId xmlns:p14="http://schemas.microsoft.com/office/powerpoint/2010/main" val="3082503542"/>
+      </p:ext>
+    </p:extLst>
+  </p:cSld>
+  <p:clrMapOvr>
+    <a:masterClrMapping/>
+  </p:clrMapOvr>
+  <p:timing>
+    <p:tnLst>
+      <p:par>
+        <p:cTn id="1" dur="indefinite" restart="never" nodeType="tmRoot"/>
+      </p:par>
+    </p:tnLst>
+  </p:timing>
+</p:sld>
+</file>
+
+<file path=ppt/slides/slide15.xml><?xml version="1.0" encoding="utf-8"?>
+<p:sld xmlns:a="http://schemas.openxmlformats.org/drawingml/2006/main" xmlns:r="http://schemas.openxmlformats.org/officeDocument/2006/relationships" xmlns:p="http://schemas.openxmlformats.org/presentationml/2006/main">
+  <p:cSld>
+    <p:spTree>
+      <p:nvGrpSpPr>
+        <p:cNvPr id="1" name=""/>
+        <p:cNvGrpSpPr/>
+        <p:nvPr/>
+      </p:nvGrpSpPr>
+      <p:grpSpPr>
+        <a:xfrm>
+          <a:off x="0" y="0"/>
+          <a:ext cx="0" cy="0"/>
+          <a:chOff x="0" y="0"/>
+          <a:chExt cx="0" cy="0"/>
+        </a:xfrm>
+      </p:grpSpPr>
+      <p:sp>
+        <p:nvSpPr>
+          <p:cNvPr id="9218" name="Прямоугольник 4"/>
+          <p:cNvSpPr>
+            <a:spLocks noChangeArrowheads="1"/>
+          </p:cNvSpPr>
+          <p:nvPr/>
+        </p:nvSpPr>
+        <p:spPr bwMode="auto">
+          <a:xfrm>
+            <a:off x="152400" y="381000"/>
+            <a:ext cx="8839200" cy="6370638"/>
+          </a:xfrm>
+          <a:prstGeom prst="rect">
+            <a:avLst/>
+          </a:prstGeom>
+          <a:noFill/>
+          <a:ln>
+            <a:noFill/>
+          </a:ln>
+          <a:extLst>
+            <a:ext uri="{909E8E84-426E-40DD-AFC4-6F175D3DCCD1}">
+              <a14:hiddenFill xmlns:a14="http://schemas.microsoft.com/office/drawing/2010/main">
+                <a:solidFill>
+                  <a:srgbClr val="FFFFFF"/>
+                </a:solidFill>
+              </a14:hiddenFill>
+            </a:ext>
+            <a:ext uri="{91240B29-F687-4F45-9708-019B960494DF}">
+              <a14:hiddenLine xmlns:a14="http://schemas.microsoft.com/office/drawing/2010/main" w="9525">
+                <a:solidFill>
+                  <a:srgbClr val="000000"/>
+                </a:solidFill>
+                <a:miter lim="800000"/>
+                <a:headEnd/>
+                <a:tailEnd/>
+              </a14:hiddenLine>
+            </a:ext>
+          </a:extLst>
+        </p:spPr>
+        <p:txBody>
+          <a:bodyPr>
+            <a:spAutoFit/>
+          </a:bodyPr>
+          <a:lstStyle/>
+          <a:p>
+            <a:r>
+              <a:rPr lang="ru-RU" sz="1200"/>
+              <a:t>Предложение WHERE состоит из ключевого слова WHERE, за которым следует условие отбора, определяющее, какие именно строки требуется извлечь. Если условие отбора имеет значение TRUE, строка будет включена в результаты запроса. Если же оно имеет значение FALSE или NULL, то строка исключается из результатов запроса. </a:t>
+            </a:r>
+          </a:p>
+          <a:p>
+            <a:r>
+              <a:rPr lang="be-BY" sz="1200"/>
+              <a:t>Основные типы условий фильтрации: </a:t>
+            </a:r>
+          </a:p>
+          <a:p>
+            <a:r>
+              <a:rPr lang="ru-RU" sz="1200" b="1"/>
+              <a:t>1) Сравнение </a:t>
+            </a:r>
+            <a:r>
+              <a:rPr lang="ru-RU" sz="1200"/>
+              <a:t>– использование операторов сравнения (&gt;, &lt;, &gt;=, &lt;=, =, &lt;&gt;), скобок ('(', ')'), логических связок (AND («и»), OR («или»), NOT («нет»)) и констант: </a:t>
+            </a:r>
+          </a:p>
+          <a:p>
+            <a:r>
+              <a:rPr lang="en-US" sz="1200"/>
+              <a:t>	… WHERE ((rating &gt; 0.0) AND (rating &lt; 10.0)) … </a:t>
+            </a:r>
+          </a:p>
+          <a:p>
+            <a:r>
+              <a:rPr lang="ru-RU" sz="1200" b="1"/>
+              <a:t>2) Проверка на принадлежность значений диапазону </a:t>
+            </a:r>
+            <a:r>
+              <a:rPr lang="ru-RU" sz="1200"/>
+              <a:t>(оператор [NOT] BETWEEN … AND …): </a:t>
+            </a:r>
+          </a:p>
+          <a:p>
+            <a:r>
+              <a:rPr lang="en-US" sz="1200"/>
+              <a:t>	… WHERE rating BETWEEN 0.0 AND 10.0 … </a:t>
+            </a:r>
+          </a:p>
+          <a:p>
+            <a:r>
+              <a:rPr lang="be-BY" sz="1200"/>
+              <a:t>или (инверсная форма) </a:t>
+            </a:r>
+          </a:p>
+          <a:p>
+            <a:r>
+              <a:rPr lang="en-US" sz="1200"/>
+              <a:t>	… WHERE rating NOT BETWEEN 0.0 AND 10.0 … </a:t>
+            </a:r>
+          </a:p>
+          <a:p>
+            <a:r>
+              <a:rPr lang="ru-RU" sz="1200"/>
+              <a:t>Следует отметить, что проверка на принадлежность диапазону может</a:t>
+            </a:r>
+            <a:r>
+              <a:rPr lang="en-US" sz="1200"/>
+              <a:t> </a:t>
+            </a:r>
+            <a:r>
+              <a:rPr lang="be-BY" sz="1200"/>
+              <a:t>быть реализована через сравнения. </a:t>
+            </a:r>
+          </a:p>
+          <a:p>
+            <a:r>
+              <a:rPr lang="ru-RU" sz="1200" b="1"/>
+              <a:t>3) Принадлежность к множеству </a:t>
+            </a:r>
+            <a:r>
+              <a:rPr lang="ru-RU" sz="1200"/>
+              <a:t>– использование [NOT] IN (value_list): </a:t>
+            </a:r>
+          </a:p>
+          <a:p>
+            <a:r>
+              <a:rPr lang="en-US" sz="1200"/>
+              <a:t>	… WHERE student IN (‘Ivanov’, ‘Petrov’, ‘Sidorov’) … </a:t>
+            </a:r>
+          </a:p>
+          <a:p>
+            <a:r>
+              <a:rPr lang="ru-RU" sz="1200" b="1"/>
+              <a:t>4) Соответствие символьному шаблону </a:t>
+            </a:r>
+            <a:r>
+              <a:rPr lang="ru-RU" sz="1200"/>
+              <a:t>– использование [NOT] LIKE 'template'. Специальные символы шаблона по стандарту: '%' – любая последовательность символов; '_' – любой одиночный символ; для поиска одиночных символов '%' и '_' можно задать ESCAPE символ. Например, для поиска по шаблону '15%' можно задать: </a:t>
+            </a:r>
+          </a:p>
+          <a:p>
+            <a:r>
+              <a:rPr lang="en-US" sz="1200"/>
+              <a:t>	… WHERE data LIKE '15#%' ESCAPE '#' … </a:t>
+            </a:r>
+          </a:p>
+          <a:p>
+            <a:r>
+              <a:rPr lang="ru-RU" sz="1200" b="1"/>
+              <a:t>5) Обработка неизвестных значений (NULL) </a:t>
+            </a:r>
+            <a:r>
+              <a:rPr lang="ru-RU" sz="1200"/>
+              <a:t>– использование IS NULL или NOT NULL: </a:t>
+            </a:r>
+          </a:p>
+          <a:p>
+            <a:r>
+              <a:rPr lang="en-US" sz="1200"/>
+              <a:t>	… WHERE rating IS NULL … </a:t>
+            </a:r>
+          </a:p>
+          <a:p>
+            <a:endParaRPr lang="en-US" sz="1200"/>
+          </a:p>
+          <a:p>
+            <a:r>
+              <a:rPr lang="ru-RU" sz="1200" b="1"/>
+              <a:t>В SQL имеется пять статистических функций: </a:t>
+            </a:r>
+          </a:p>
+          <a:p>
+            <a:r>
+              <a:rPr lang="ru-RU" sz="1200"/>
+              <a:t>• SUM() – для вычисления суммы всех значений столбца (только числовые типы); </a:t>
+            </a:r>
+          </a:p>
+          <a:p>
+            <a:r>
+              <a:rPr lang="ru-RU" sz="1200"/>
+              <a:t>• AVG() – для вычисления среднего значения столбца (только числовые типы); </a:t>
+            </a:r>
+          </a:p>
+          <a:p>
+            <a:r>
+              <a:rPr lang="ru-RU" sz="1200"/>
+              <a:t>• MIN() – определяет минимальное значение столбца; </a:t>
+            </a:r>
+          </a:p>
+          <a:p>
+            <a:r>
+              <a:rPr lang="ru-RU" sz="1200"/>
+              <a:t>• MAX() – определяет максимальное значение столбца; </a:t>
+            </a:r>
+          </a:p>
+          <a:p>
+            <a:r>
+              <a:rPr lang="ru-RU" sz="1200"/>
+              <a:t>• COUNT() – подсчитывает число всех определенных значений столбца.</a:t>
+            </a:r>
+          </a:p>
+          <a:p>
+            <a:endParaRPr lang="ru-RU" sz="1200"/>
+          </a:p>
+          <a:p>
+            <a:r>
+              <a:rPr lang="ru-RU" sz="1200"/>
+              <a:t>Обобщающие функции по стандарту SQL2 могут располагаться только в секциях SELECT и HAVING запроса SELECT; </a:t>
+            </a:r>
+          </a:p>
+          <a:p>
+            <a:r>
+              <a:rPr lang="ru-RU" sz="1200"/>
+              <a:t>• все обобщающие функции игнорируют NULL значения; </a:t>
+            </a:r>
+          </a:p>
+          <a:p>
+            <a:r>
+              <a:rPr lang="ru-RU" sz="1200"/>
+              <a:t>• не допускается вложение обобщающих функций друг в друга. Варианты использования функции COUNT: </a:t>
+            </a:r>
+          </a:p>
+          <a:p>
+            <a:r>
+              <a:rPr lang="ru-RU" sz="1200"/>
+              <a:t>• COUNT(column) – количество значений в столбце column; </a:t>
+            </a:r>
+          </a:p>
+          <a:p>
+            <a:r>
+              <a:rPr lang="ru-RU" sz="1200"/>
+              <a:t>• COUNT(*) - количество строк в таблице; </a:t>
+            </a:r>
+          </a:p>
+          <a:p>
+            <a:r>
+              <a:rPr lang="ru-RU" sz="1200"/>
+              <a:t>• COUNT (DISTINCT column) – число не повторяющихся значений в столбце column. </a:t>
+            </a:r>
+            <a:endParaRPr lang="be-BY" sz="1200"/>
+          </a:p>
+        </p:txBody>
+      </p:sp>
+      <p:sp>
+        <p:nvSpPr>
+          <p:cNvPr id="9219" name="Прямоугольник 2"/>
+          <p:cNvSpPr>
+            <a:spLocks noChangeArrowheads="1"/>
+          </p:cNvSpPr>
+          <p:nvPr/>
+        </p:nvSpPr>
+        <p:spPr bwMode="auto">
+          <a:xfrm>
+            <a:off x="152400" y="0"/>
+            <a:ext cx="8839200" cy="461963"/>
+          </a:xfrm>
+          <a:prstGeom prst="rect">
+            <a:avLst/>
+          </a:prstGeom>
+          <a:noFill/>
+          <a:ln>
+            <a:noFill/>
+          </a:ln>
+          <a:extLst>
+            <a:ext uri="{909E8E84-426E-40DD-AFC4-6F175D3DCCD1}">
+              <a14:hiddenFill xmlns:a14="http://schemas.microsoft.com/office/drawing/2010/main">
+                <a:solidFill>
+                  <a:srgbClr val="FFFFFF"/>
+                </a:solidFill>
+              </a14:hiddenFill>
+            </a:ext>
+            <a:ext uri="{91240B29-F687-4F45-9708-019B960494DF}">
+              <a14:hiddenLine xmlns:a14="http://schemas.microsoft.com/office/drawing/2010/main" w="9525">
+                <a:solidFill>
+                  <a:srgbClr val="000000"/>
+                </a:solidFill>
+                <a:miter lim="800000"/>
+                <a:headEnd/>
+                <a:tailEnd/>
+              </a14:hiddenLine>
+            </a:ext>
+          </a:extLst>
+        </p:spPr>
+        <p:txBody>
+          <a:bodyPr>
+            <a:spAutoFit/>
+          </a:bodyPr>
+          <a:lstStyle/>
+          <a:p>
+            <a:pPr algn="ctr"/>
+            <a:r>
+              <a:rPr lang="en-US" sz="2400" b="1"/>
+              <a:t>WHERE.</a:t>
+            </a:r>
+            <a:endParaRPr lang="be-BY" sz="2400" b="1"/>
+          </a:p>
+        </p:txBody>
+      </p:sp>
+    </p:spTree>
+    <p:extLst>
+      <p:ext uri="{BB962C8B-B14F-4D97-AF65-F5344CB8AC3E}">
+        <p14:creationId xmlns:p14="http://schemas.microsoft.com/office/powerpoint/2010/main" val="3680314375"/>
+      </p:ext>
+    </p:extLst>
+  </p:cSld>
+  <p:clrMapOvr>
+    <a:masterClrMapping/>
+  </p:clrMapOvr>
+  <p:timing>
+    <p:tnLst>
+      <p:par>
+        <p:cTn id="1" dur="indefinite" restart="never" nodeType="tmRoot"/>
+      </p:par>
+    </p:tnLst>
+  </p:timing>
+</p:sld>
+</file>
+
+<file path=ppt/slides/slide16.xml><?xml version="1.0" encoding="utf-8"?>
+<p:sld xmlns:a="http://schemas.openxmlformats.org/drawingml/2006/main" xmlns:r="http://schemas.openxmlformats.org/officeDocument/2006/relationships" xmlns:p="http://schemas.openxmlformats.org/presentationml/2006/main">
+  <p:cSld>
+    <p:spTree>
+      <p:nvGrpSpPr>
+        <p:cNvPr id="1" name=""/>
+        <p:cNvGrpSpPr/>
+        <p:nvPr/>
+      </p:nvGrpSpPr>
+      <p:grpSpPr>
+        <a:xfrm>
+          <a:off x="0" y="0"/>
+          <a:ext cx="0" cy="0"/>
+          <a:chOff x="0" y="0"/>
+          <a:chExt cx="0" cy="0"/>
+        </a:xfrm>
+      </p:grpSpPr>
+      <p:sp>
+        <p:nvSpPr>
+          <p:cNvPr id="10242" name="Прямоугольник 2"/>
+          <p:cNvSpPr>
+            <a:spLocks noChangeArrowheads="1"/>
+          </p:cNvSpPr>
+          <p:nvPr/>
+        </p:nvSpPr>
+        <p:spPr bwMode="auto">
+          <a:xfrm>
+            <a:off x="152400" y="0"/>
+            <a:ext cx="8839200" cy="461963"/>
+          </a:xfrm>
+          <a:prstGeom prst="rect">
+            <a:avLst/>
+          </a:prstGeom>
+          <a:noFill/>
+          <a:ln>
+            <a:noFill/>
+          </a:ln>
+          <a:extLst>
+            <a:ext uri="{909E8E84-426E-40DD-AFC4-6F175D3DCCD1}">
+              <a14:hiddenFill xmlns:a14="http://schemas.microsoft.com/office/drawing/2010/main">
+                <a:solidFill>
+                  <a:srgbClr val="FFFFFF"/>
+                </a:solidFill>
+              </a14:hiddenFill>
+            </a:ext>
+            <a:ext uri="{91240B29-F687-4F45-9708-019B960494DF}">
+              <a14:hiddenLine xmlns:a14="http://schemas.microsoft.com/office/drawing/2010/main" w="9525">
+                <a:solidFill>
+                  <a:srgbClr val="000000"/>
+                </a:solidFill>
+                <a:miter lim="800000"/>
+                <a:headEnd/>
+                <a:tailEnd/>
+              </a14:hiddenLine>
+            </a:ext>
+          </a:extLst>
+        </p:spPr>
+        <p:txBody>
+          <a:bodyPr>
+            <a:spAutoFit/>
+          </a:bodyPr>
+          <a:lstStyle/>
+          <a:p>
+            <a:pPr algn="ctr"/>
+            <a:r>
+              <a:rPr lang="ru-RU" sz="2400" b="1"/>
+              <a:t>GROUP BY</a:t>
+            </a:r>
+            <a:r>
+              <a:rPr lang="en-US" sz="2400" b="1"/>
+              <a:t>.</a:t>
+            </a:r>
+            <a:endParaRPr lang="be-BY" sz="2400" b="1"/>
+          </a:p>
+        </p:txBody>
+      </p:sp>
+      <p:sp>
+        <p:nvSpPr>
+          <p:cNvPr id="10243" name="Прямоугольник 4"/>
+          <p:cNvSpPr>
+            <a:spLocks noChangeArrowheads="1"/>
+          </p:cNvSpPr>
+          <p:nvPr/>
+        </p:nvSpPr>
+        <p:spPr bwMode="auto">
+          <a:xfrm>
+            <a:off x="152400" y="457200"/>
+            <a:ext cx="8839200" cy="4524375"/>
+          </a:xfrm>
+          <a:prstGeom prst="rect">
+            <a:avLst/>
+          </a:prstGeom>
+          <a:noFill/>
+          <a:ln>
+            <a:noFill/>
+          </a:ln>
+          <a:extLst>
+            <a:ext uri="{909E8E84-426E-40DD-AFC4-6F175D3DCCD1}">
+              <a14:hiddenFill xmlns:a14="http://schemas.microsoft.com/office/drawing/2010/main">
+                <a:solidFill>
+                  <a:srgbClr val="FFFFFF"/>
+                </a:solidFill>
+              </a14:hiddenFill>
+            </a:ext>
+            <a:ext uri="{91240B29-F687-4F45-9708-019B960494DF}">
+              <a14:hiddenLine xmlns:a14="http://schemas.microsoft.com/office/drawing/2010/main" w="9525">
+                <a:solidFill>
+                  <a:srgbClr val="000000"/>
+                </a:solidFill>
+                <a:miter lim="800000"/>
+                <a:headEnd/>
+                <a:tailEnd/>
+              </a14:hiddenLine>
+            </a:ext>
+          </a:extLst>
+        </p:spPr>
+        <p:txBody>
+          <a:bodyPr>
+            <a:spAutoFit/>
+          </a:bodyPr>
+          <a:lstStyle/>
+          <a:p>
+            <a:r>
+              <a:rPr lang="ru-RU" sz="1200"/>
+              <a:t>	Запрос, включающий в себя предложение </a:t>
+            </a:r>
+            <a:r>
+              <a:rPr lang="ru-RU" sz="1200" b="1"/>
+              <a:t>GROUP BY</a:t>
+            </a:r>
+            <a:r>
+              <a:rPr lang="ru-RU" sz="1200"/>
+              <a:t>, называется запросом с группировкой, поскольку он объединяет строки исходных таблиц в группы и для каждой группы строк генерирует одну строку в таблице результатов запроса. Столбцы, указанные в предложении GROUP BY, называются столбцами группировки (возможно указание нескольких столбцов – группировка по комбинации значений), поскольку именно они определяют, по какому признаку строки делятся на группы.</a:t>
+            </a:r>
+          </a:p>
+          <a:p>
+            <a:r>
+              <a:rPr lang="ru-RU" sz="1200"/>
+              <a:t>Ограничения на синтаксис группирующих запросов и особенности выполнения: </a:t>
+            </a:r>
+          </a:p>
+          <a:p>
+            <a:r>
+              <a:rPr lang="ru-RU" sz="1200" b="1"/>
+              <a:t>1)</a:t>
+            </a:r>
+            <a:r>
+              <a:rPr lang="ru-RU" sz="1200"/>
+              <a:t> Столбцы с группировкой должны представлять собой реальные столбцы таблиц, перечисленных в предложении FROM. Нельзя группировать строки на основании значения вычисляемого выражения. </a:t>
+            </a:r>
+          </a:p>
+          <a:p>
+            <a:r>
+              <a:rPr lang="ru-RU" sz="1200" b="1"/>
+              <a:t>2)</a:t>
+            </a:r>
+            <a:r>
+              <a:rPr lang="ru-RU" sz="1200"/>
+              <a:t> Все имена столбцов, приведенные в описании SELECT должны обязательно присутствовать и в секции GROUP BY. Это означает, что возвращаемым столбцом может быть: </a:t>
+            </a:r>
+            <a:endParaRPr lang="be-BY" sz="1200"/>
+          </a:p>
+          <a:p>
+            <a:pPr lvl="1"/>
+            <a:r>
+              <a:rPr lang="be-BY" sz="1200"/>
+              <a:t>• константа; </a:t>
+            </a:r>
+          </a:p>
+          <a:p>
+            <a:pPr lvl="1"/>
+            <a:r>
+              <a:rPr lang="ru-RU" sz="1200"/>
+              <a:t>• статистическая функция, возвращающая одно значение для всех строк, входящих в группу; </a:t>
+            </a:r>
+          </a:p>
+          <a:p>
+            <a:pPr lvl="1"/>
+            <a:r>
+              <a:rPr lang="ru-RU" sz="1200"/>
+              <a:t>• столбец группировки, который по определению имеет одно и то же значение во всех строках группы; </a:t>
+            </a:r>
+          </a:p>
+          <a:p>
+            <a:pPr lvl="1"/>
+            <a:r>
+              <a:rPr lang="ru-RU" sz="1200"/>
+              <a:t>• выражение, включающее в себя перечисленные выше элементы.</a:t>
+            </a:r>
+          </a:p>
+          <a:p>
+            <a:r>
+              <a:rPr lang="ru-RU" sz="1200" b="1"/>
+              <a:t>3)</a:t>
+            </a:r>
+            <a:r>
+              <a:rPr lang="ru-RU" sz="1200"/>
+              <a:t> Если совместно с GROUP BY используется WHERE, то WHERE обрабатывается первым, а группированию подвергаются только те строки, которые удовлетворяют условию фильтра. По ISO, NULL-значения входят в одну группу.</a:t>
+            </a:r>
+          </a:p>
+          <a:p>
+            <a:endParaRPr lang="ru-RU" sz="1200"/>
+          </a:p>
+          <a:p>
+            <a:endParaRPr lang="ru-RU" sz="1200"/>
+          </a:p>
+          <a:p>
+            <a:r>
+              <a:rPr lang="ru-RU" sz="1200"/>
+              <a:t>	</a:t>
+            </a:r>
+            <a:r>
+              <a:rPr lang="ru-RU" sz="1200" b="1"/>
+              <a:t>Подзапросы</a:t>
+            </a:r>
+            <a:r>
+              <a:rPr lang="ru-RU" sz="1200"/>
+              <a:t> – запросы с помощью оператора SELECT, помещенные в секции WHERE и (или) HAVING внешнего оператора SELECT. Подзапрос создает временную таблицу, содержимое которой извлекается и обрабатывается внешним оператором (обычно предикатом внешнего запроса). Текст подзапроса должен быть заключен в круглые скобки и располагается всегда в правой части операции внешнего запроса. В подзапросах не должна </a:t>
+            </a:r>
+            <a:r>
+              <a:rPr lang="be-BY" sz="1200"/>
+              <a:t>использоваться секция </a:t>
+            </a:r>
+            <a:r>
+              <a:rPr lang="en-US" sz="1200"/>
+              <a:t>ORDER BY. </a:t>
+            </a:r>
+            <a:r>
+              <a:rPr lang="ru-RU" sz="1200"/>
+              <a:t> </a:t>
+            </a:r>
+          </a:p>
+          <a:p>
+            <a:endParaRPr lang="ru-RU" sz="1200"/>
+          </a:p>
+        </p:txBody>
+      </p:sp>
+    </p:spTree>
+    <p:extLst>
+      <p:ext uri="{BB962C8B-B14F-4D97-AF65-F5344CB8AC3E}">
+        <p14:creationId xmlns:p14="http://schemas.microsoft.com/office/powerpoint/2010/main" val="600660360"/>
+      </p:ext>
+    </p:extLst>
+  </p:cSld>
+  <p:clrMapOvr>
+    <a:masterClrMapping/>
+  </p:clrMapOvr>
+  <p:timing>
+    <p:tnLst>
+      <p:par>
+        <p:cTn id="1" dur="indefinite" restart="never" nodeType="tmRoot"/>
+      </p:par>
+    </p:tnLst>
+  </p:timing>
+</p:sld>
+</file>
+
+<file path=ppt/slides/slide17.xml><?xml version="1.0" encoding="utf-8"?>
+<p:sld xmlns:a="http://schemas.openxmlformats.org/drawingml/2006/main" xmlns:r="http://schemas.openxmlformats.org/officeDocument/2006/relationships" xmlns:p="http://schemas.openxmlformats.org/presentationml/2006/main">
+  <p:cSld>
+    <p:spTree>
+      <p:nvGrpSpPr>
+        <p:cNvPr id="1" name=""/>
+        <p:cNvGrpSpPr/>
+        <p:nvPr/>
+      </p:nvGrpSpPr>
+      <p:grpSpPr>
+        <a:xfrm>
+          <a:off x="0" y="0"/>
+          <a:ext cx="0" cy="0"/>
+          <a:chOff x="0" y="0"/>
+          <a:chExt cx="0" cy="0"/>
+        </a:xfrm>
+      </p:grpSpPr>
+      <p:sp>
+        <p:nvSpPr>
+          <p:cNvPr id="11266" name="Прямоугольник 2"/>
+          <p:cNvSpPr>
+            <a:spLocks noChangeArrowheads="1"/>
+          </p:cNvSpPr>
+          <p:nvPr/>
+        </p:nvSpPr>
+        <p:spPr bwMode="auto">
+          <a:xfrm>
+            <a:off x="152400" y="0"/>
+            <a:ext cx="8839200" cy="461963"/>
+          </a:xfrm>
+          <a:prstGeom prst="rect">
+            <a:avLst/>
+          </a:prstGeom>
+          <a:noFill/>
+          <a:ln>
+            <a:noFill/>
+          </a:ln>
+          <a:extLst>
+            <a:ext uri="{909E8E84-426E-40DD-AFC4-6F175D3DCCD1}">
+              <a14:hiddenFill xmlns:a14="http://schemas.microsoft.com/office/drawing/2010/main">
+                <a:solidFill>
+                  <a:srgbClr val="FFFFFF"/>
+                </a:solidFill>
+              </a14:hiddenFill>
+            </a:ext>
+            <a:ext uri="{91240B29-F687-4F45-9708-019B960494DF}">
+              <a14:hiddenLine xmlns:a14="http://schemas.microsoft.com/office/drawing/2010/main" w="9525">
+                <a:solidFill>
+                  <a:srgbClr val="000000"/>
+                </a:solidFill>
+                <a:miter lim="800000"/>
+                <a:headEnd/>
+                <a:tailEnd/>
+              </a14:hiddenLine>
+            </a:ext>
+          </a:extLst>
+        </p:spPr>
+        <p:txBody>
+          <a:bodyPr>
+            <a:spAutoFit/>
+          </a:bodyPr>
+          <a:lstStyle/>
+          <a:p>
+            <a:pPr algn="ctr"/>
+            <a:r>
+              <a:rPr lang="be-BY" sz="2400" b="1"/>
+              <a:t>Многотаблычные запросы.</a:t>
+            </a:r>
+          </a:p>
+        </p:txBody>
+      </p:sp>
+      <p:sp>
+        <p:nvSpPr>
+          <p:cNvPr id="11267" name="Прямоугольник 4"/>
+          <p:cNvSpPr>
+            <a:spLocks noChangeArrowheads="1"/>
+          </p:cNvSpPr>
+          <p:nvPr/>
+        </p:nvSpPr>
+        <p:spPr bwMode="auto">
+          <a:xfrm>
+            <a:off x="152400" y="457200"/>
+            <a:ext cx="8839200" cy="4154488"/>
+          </a:xfrm>
+          <a:prstGeom prst="rect">
+            <a:avLst/>
+          </a:prstGeom>
+          <a:noFill/>
+          <a:ln>
+            <a:noFill/>
+          </a:ln>
+          <a:extLst>
+            <a:ext uri="{909E8E84-426E-40DD-AFC4-6F175D3DCCD1}">
+              <a14:hiddenFill xmlns:a14="http://schemas.microsoft.com/office/drawing/2010/main">
+                <a:solidFill>
+                  <a:srgbClr val="FFFFFF"/>
+                </a:solidFill>
+              </a14:hiddenFill>
+            </a:ext>
+            <a:ext uri="{91240B29-F687-4F45-9708-019B960494DF}">
+              <a14:hiddenLine xmlns:a14="http://schemas.microsoft.com/office/drawing/2010/main" w="9525">
+                <a:solidFill>
+                  <a:srgbClr val="000000"/>
+                </a:solidFill>
+                <a:miter lim="800000"/>
+                <a:headEnd/>
+                <a:tailEnd/>
+              </a14:hiddenLine>
+            </a:ext>
+          </a:extLst>
+        </p:spPr>
+        <p:txBody>
+          <a:bodyPr>
+            <a:spAutoFit/>
+          </a:bodyPr>
+          <a:lstStyle/>
+          <a:p>
+            <a:r>
+              <a:rPr lang="ru-RU" sz="1200" b="1"/>
+              <a:t>1) Декартово произведение двух таблиц: </a:t>
+            </a:r>
+          </a:p>
+          <a:p>
+            <a:pPr lvl="1"/>
+            <a:r>
+              <a:rPr lang="en-US" sz="1200">
+                <a:latin typeface="Courier New" pitchFamily="49" charset="0"/>
+                <a:cs typeface="Courier New" pitchFamily="49" charset="0"/>
+              </a:rPr>
+              <a:t>SELECT t1.*, t2.* </a:t>
+            </a:r>
+          </a:p>
+          <a:p>
+            <a:pPr lvl="1"/>
+            <a:r>
+              <a:rPr lang="en-US" sz="1200">
+                <a:latin typeface="Courier New" pitchFamily="49" charset="0"/>
+                <a:cs typeface="Courier New" pitchFamily="49" charset="0"/>
+              </a:rPr>
+              <a:t>FROM t1, t2; </a:t>
+            </a:r>
+          </a:p>
+          <a:p>
+            <a:r>
+              <a:rPr lang="ru-RU" sz="1200" b="1"/>
+              <a:t>2) Тета-соединение таблиц </a:t>
+            </a:r>
+            <a:r>
+              <a:rPr lang="ru-RU" sz="1200"/>
+              <a:t>(используются знаки сравнения, на практике используется редко, так как трудно найти смысл соединения): </a:t>
+            </a:r>
+          </a:p>
+          <a:p>
+            <a:pPr lvl="1"/>
+            <a:r>
+              <a:rPr lang="en-US" sz="1200">
+                <a:latin typeface="Courier New" pitchFamily="49" charset="0"/>
+                <a:cs typeface="Courier New" pitchFamily="49" charset="0"/>
+              </a:rPr>
+              <a:t>SELECT * </a:t>
+            </a:r>
+          </a:p>
+          <a:p>
+            <a:pPr lvl="1"/>
+            <a:r>
+              <a:rPr lang="en-US" sz="1200">
+                <a:latin typeface="Courier New" pitchFamily="49" charset="0"/>
+                <a:cs typeface="Courier New" pitchFamily="49" charset="0"/>
+              </a:rPr>
+              <a:t>FROM t1, t2 </a:t>
+            </a:r>
+          </a:p>
+          <a:p>
+            <a:pPr lvl="1"/>
+            <a:r>
+              <a:rPr lang="en-US" sz="1200">
+                <a:latin typeface="Courier New" pitchFamily="49" charset="0"/>
+                <a:cs typeface="Courier New" pitchFamily="49" charset="0"/>
+              </a:rPr>
+              <a:t>WHERE (t1.number &gt; t2.number); </a:t>
+            </a:r>
+          </a:p>
+          <a:p>
+            <a:r>
+              <a:rPr lang="ru-RU" sz="1200" b="1"/>
+              <a:t>3) Экви-соединение таблиц </a:t>
+            </a:r>
+            <a:r>
+              <a:rPr lang="ru-RU" sz="1200"/>
+              <a:t>(выполняется по равенству значений общего атрибута, например значений первичного и внешнего ключа): </a:t>
+            </a:r>
+          </a:p>
+          <a:p>
+            <a:pPr lvl="1"/>
+            <a:r>
+              <a:rPr lang="en-US" sz="1200">
+                <a:latin typeface="Courier New" pitchFamily="49" charset="0"/>
+                <a:cs typeface="Courier New" pitchFamily="49" charset="0"/>
+              </a:rPr>
+              <a:t>SELECT t1.*, t2.* </a:t>
+            </a:r>
+          </a:p>
+          <a:p>
+            <a:pPr lvl="1"/>
+            <a:r>
+              <a:rPr lang="en-US" sz="1200">
+                <a:latin typeface="Courier New" pitchFamily="49" charset="0"/>
+                <a:cs typeface="Courier New" pitchFamily="49" charset="0"/>
+              </a:rPr>
+              <a:t>FROM t1, t2 </a:t>
+            </a:r>
+          </a:p>
+          <a:p>
+            <a:pPr lvl="1"/>
+            <a:r>
+              <a:rPr lang="en-US" sz="1200">
+                <a:latin typeface="Courier New" pitchFamily="49" charset="0"/>
+                <a:cs typeface="Courier New" pitchFamily="49" charset="0"/>
+              </a:rPr>
+              <a:t>WHERE (t1.number = t2.number); </a:t>
+            </a:r>
+          </a:p>
+          <a:p>
+            <a:r>
+              <a:rPr lang="ru-RU" sz="1200"/>
+              <a:t>или эквивалентный вариант соединения (inner или natural join): </a:t>
+            </a:r>
+          </a:p>
+          <a:p>
+            <a:pPr lvl="1"/>
+            <a:r>
+              <a:rPr lang="en-US" sz="1200">
+                <a:latin typeface="Courier New" pitchFamily="49" charset="0"/>
+                <a:cs typeface="Courier New" pitchFamily="49" charset="0"/>
+              </a:rPr>
+              <a:t>SELECT t1.*, t2.* </a:t>
+            </a:r>
+          </a:p>
+          <a:p>
+            <a:pPr lvl="1"/>
+            <a:r>
+              <a:rPr lang="en-US" sz="1200">
+                <a:latin typeface="Courier New" pitchFamily="49" charset="0"/>
+                <a:cs typeface="Courier New" pitchFamily="49" charset="0"/>
+              </a:rPr>
+              <a:t>FROM t1 INNER JOIN t2 ON (t1.number = t2.number); </a:t>
+            </a:r>
+          </a:p>
+          <a:p>
+            <a:r>
+              <a:rPr lang="ru-RU" sz="1200" b="1"/>
+              <a:t>4) Внешние соединения таблиц </a:t>
+            </a:r>
+            <a:r>
+              <a:rPr lang="ru-RU" sz="1200"/>
+              <a:t>(левое, правое и полное, соответственно): </a:t>
+            </a:r>
+          </a:p>
+          <a:p>
+            <a:pPr lvl="1"/>
+            <a:r>
+              <a:rPr lang="en-US" sz="1200">
+                <a:latin typeface="Courier New" pitchFamily="49" charset="0"/>
+                <a:cs typeface="Courier New" pitchFamily="49" charset="0"/>
+              </a:rPr>
+              <a:t>SELECT t1.*, t2.* </a:t>
+            </a:r>
+          </a:p>
+          <a:p>
+            <a:pPr lvl="1"/>
+            <a:r>
+              <a:rPr lang="en-US" sz="1200">
+                <a:latin typeface="Courier New" pitchFamily="49" charset="0"/>
+                <a:cs typeface="Courier New" pitchFamily="49" charset="0"/>
+              </a:rPr>
+              <a:t>FROM t1 LEFT JOIN t2 ON t1.number = t2.number; </a:t>
+            </a:r>
+          </a:p>
+          <a:p>
+            <a:pPr lvl="1"/>
+            <a:endParaRPr lang="en-US" sz="1200">
+              <a:latin typeface="Courier New" pitchFamily="49" charset="0"/>
+              <a:cs typeface="Courier New" pitchFamily="49" charset="0"/>
+            </a:endParaRPr>
+          </a:p>
+          <a:p>
+            <a:pPr lvl="1"/>
+            <a:r>
+              <a:rPr lang="en-US" sz="1200">
+                <a:latin typeface="Courier New" pitchFamily="49" charset="0"/>
+                <a:cs typeface="Courier New" pitchFamily="49" charset="0"/>
+              </a:rPr>
+              <a:t>SELECT t1.*, t2.* </a:t>
+            </a:r>
+          </a:p>
+          <a:p>
+            <a:pPr lvl="1"/>
+            <a:r>
+              <a:rPr lang="en-US" sz="1200">
+                <a:latin typeface="Courier New" pitchFamily="49" charset="0"/>
+                <a:cs typeface="Courier New" pitchFamily="49" charset="0"/>
+              </a:rPr>
+              <a:t>FROM t1 RIGHT JOIN t2 ON t1.number = t2.number;</a:t>
+            </a:r>
+          </a:p>
+        </p:txBody>
+      </p:sp>
+    </p:spTree>
+    <p:extLst>
+      <p:ext uri="{BB962C8B-B14F-4D97-AF65-F5344CB8AC3E}">
+        <p14:creationId xmlns:p14="http://schemas.microsoft.com/office/powerpoint/2010/main" val="2446323228"/>
+      </p:ext>
+    </p:extLst>
+  </p:cSld>
+  <p:clrMapOvr>
+    <a:masterClrMapping/>
+  </p:clrMapOvr>
+  <p:timing>
+    <p:tnLst>
+      <p:par>
+        <p:cTn id="1" dur="indefinite" restart="never" nodeType="tmRoot"/>
+      </p:par>
+    </p:tnLst>
+  </p:timing>
+</p:sld>
+</file>
+
+<file path=ppt/slides/slide18.xml><?xml version="1.0" encoding="utf-8"?>
+<p:sld xmlns:a="http://schemas.openxmlformats.org/drawingml/2006/main" xmlns:r="http://schemas.openxmlformats.org/officeDocument/2006/relationships" xmlns:p="http://schemas.openxmlformats.org/presentationml/2006/main">
+  <p:cSld>
+    <p:spTree>
+      <p:nvGrpSpPr>
+        <p:cNvPr id="1" name=""/>
+        <p:cNvGrpSpPr/>
+        <p:nvPr/>
+      </p:nvGrpSpPr>
+      <p:grpSpPr>
+        <a:xfrm>
+          <a:off x="0" y="0"/>
+          <a:ext cx="0" cy="0"/>
+          <a:chOff x="0" y="0"/>
+          <a:chExt cx="0" cy="0"/>
+        </a:xfrm>
+      </p:grpSpPr>
+      <p:sp>
+        <p:nvSpPr>
+          <p:cNvPr id="12290" name="Прямоугольник 2"/>
+          <p:cNvSpPr>
+            <a:spLocks noChangeArrowheads="1"/>
+          </p:cNvSpPr>
+          <p:nvPr/>
+        </p:nvSpPr>
+        <p:spPr bwMode="auto">
+          <a:xfrm>
+            <a:off x="152400" y="0"/>
+            <a:ext cx="8839200" cy="461963"/>
+          </a:xfrm>
+          <a:prstGeom prst="rect">
+            <a:avLst/>
+          </a:prstGeom>
+          <a:noFill/>
+          <a:ln>
+            <a:noFill/>
+          </a:ln>
+          <a:extLst>
+            <a:ext uri="{909E8E84-426E-40DD-AFC4-6F175D3DCCD1}">
+              <a14:hiddenFill xmlns:a14="http://schemas.microsoft.com/office/drawing/2010/main">
+                <a:solidFill>
+                  <a:srgbClr val="FFFFFF"/>
+                </a:solidFill>
+              </a14:hiddenFill>
+            </a:ext>
+            <a:ext uri="{91240B29-F687-4F45-9708-019B960494DF}">
+              <a14:hiddenLine xmlns:a14="http://schemas.microsoft.com/office/drawing/2010/main" w="9525">
+                <a:solidFill>
+                  <a:srgbClr val="000000"/>
+                </a:solidFill>
+                <a:miter lim="800000"/>
+                <a:headEnd/>
+                <a:tailEnd/>
+              </a14:hiddenLine>
+            </a:ext>
+          </a:extLst>
+        </p:spPr>
+        <p:txBody>
+          <a:bodyPr>
+            <a:spAutoFit/>
+          </a:bodyPr>
+          <a:lstStyle/>
+          <a:p>
+            <a:pPr algn="ctr"/>
+            <a:r>
+              <a:rPr lang="ru-RU" sz="2400" b="1"/>
+              <a:t>Операторы вставки, изменения, удаления.</a:t>
+            </a:r>
+            <a:endParaRPr lang="be-BY" sz="2400" b="1"/>
+          </a:p>
+        </p:txBody>
+      </p:sp>
+      <p:sp>
+        <p:nvSpPr>
+          <p:cNvPr id="12291" name="Прямоугольник 3"/>
+          <p:cNvSpPr>
+            <a:spLocks noChangeArrowheads="1"/>
+          </p:cNvSpPr>
+          <p:nvPr/>
+        </p:nvSpPr>
+        <p:spPr bwMode="auto">
+          <a:xfrm>
+            <a:off x="152400" y="457200"/>
+            <a:ext cx="8839200" cy="6186488"/>
+          </a:xfrm>
+          <a:prstGeom prst="rect">
+            <a:avLst/>
+          </a:prstGeom>
+          <a:noFill/>
+          <a:ln>
+            <a:noFill/>
+          </a:ln>
+          <a:extLst>
+            <a:ext uri="{909E8E84-426E-40DD-AFC4-6F175D3DCCD1}">
+              <a14:hiddenFill xmlns:a14="http://schemas.microsoft.com/office/drawing/2010/main">
+                <a:solidFill>
+                  <a:srgbClr val="FFFFFF"/>
+                </a:solidFill>
+              </a14:hiddenFill>
+            </a:ext>
+            <a:ext uri="{91240B29-F687-4F45-9708-019B960494DF}">
+              <a14:hiddenLine xmlns:a14="http://schemas.microsoft.com/office/drawing/2010/main" w="9525">
+                <a:solidFill>
+                  <a:srgbClr val="000000"/>
+                </a:solidFill>
+                <a:miter lim="800000"/>
+                <a:headEnd/>
+                <a:tailEnd/>
+              </a14:hiddenLine>
+            </a:ext>
+          </a:extLst>
+        </p:spPr>
+        <p:txBody>
+          <a:bodyPr>
+            <a:spAutoFit/>
+          </a:bodyPr>
+          <a:lstStyle/>
+          <a:p>
+            <a:r>
+              <a:rPr lang="ru-RU" sz="1200"/>
+              <a:t>К операторам модификации данных относятся операторы INSERT (вставка), UPDATE (изменение) и DELETE (удаление).</a:t>
+            </a:r>
+            <a:endParaRPr lang="en-US" sz="1200"/>
+          </a:p>
+          <a:p>
+            <a:endParaRPr lang="en-US" sz="1200"/>
+          </a:p>
+          <a:p>
+            <a:r>
+              <a:rPr lang="ru-RU" sz="1200" b="1"/>
+              <a:t>1)</a:t>
+            </a:r>
+            <a:r>
+              <a:rPr lang="ru-RU" sz="1200"/>
+              <a:t> Однострочная инструкция </a:t>
+            </a:r>
+            <a:r>
+              <a:rPr lang="ru-RU" sz="1200" b="1"/>
+              <a:t>INSERT</a:t>
+            </a:r>
+            <a:r>
+              <a:rPr lang="ru-RU" sz="1200"/>
+              <a:t> позволяет добавить в таблицу одну новую строку. Этот вариант широко используется в повседневных приложениях, например в программах ввода данных, и имеет формат: </a:t>
+            </a:r>
+          </a:p>
+          <a:p>
+            <a:pPr lvl="1"/>
+            <a:r>
+              <a:rPr lang="en-US" sz="1200">
+                <a:latin typeface="Courier New" pitchFamily="49" charset="0"/>
+                <a:cs typeface="Courier New" pitchFamily="49" charset="0"/>
+              </a:rPr>
+              <a:t>INSERT INTO table_name [(column_list)] </a:t>
+            </a:r>
+          </a:p>
+          <a:p>
+            <a:pPr lvl="1"/>
+            <a:r>
+              <a:rPr lang="en-US" sz="1200">
+                <a:latin typeface="Courier New" pitchFamily="49" charset="0"/>
+                <a:cs typeface="Courier New" pitchFamily="49" charset="0"/>
+              </a:rPr>
+              <a:t>VALUES (data_value_list) </a:t>
+            </a:r>
+          </a:p>
+          <a:p>
+            <a:r>
+              <a:rPr lang="ru-RU" sz="1200"/>
+              <a:t>Здесь, table_name – имя таблицы или обновляемого представления. </a:t>
+            </a:r>
+            <a:endParaRPr lang="en-US" sz="1200"/>
+          </a:p>
+          <a:p>
+            <a:r>
+              <a:rPr lang="be-BY" sz="1200" b="1"/>
+              <a:t>Пример данного вида оператора:</a:t>
+            </a:r>
+            <a:r>
+              <a:rPr lang="be-BY" sz="1200"/>
+              <a:t> </a:t>
+            </a:r>
+          </a:p>
+          <a:p>
+            <a:pPr lvl="1"/>
+            <a:r>
+              <a:rPr lang="en-US" sz="1200">
+                <a:latin typeface="Courier New" pitchFamily="49" charset="0"/>
+                <a:cs typeface="Courier New" pitchFamily="49" charset="0"/>
+              </a:rPr>
+              <a:t>INSERT INTO student (student_ID, name, group_ID) </a:t>
+            </a:r>
+          </a:p>
+          <a:p>
+            <a:pPr lvl="1"/>
+            <a:r>
+              <a:rPr lang="en-US" sz="1200">
+                <a:latin typeface="Courier New" pitchFamily="49" charset="0"/>
+                <a:cs typeface="Courier New" pitchFamily="49" charset="0"/>
+              </a:rPr>
+              <a:t>VALUES (10, ‘Ivanov’, 1);</a:t>
+            </a:r>
+          </a:p>
+          <a:p>
+            <a:pPr lvl="1"/>
+            <a:endParaRPr lang="en-US" sz="1200">
+              <a:latin typeface="Courier New" pitchFamily="49" charset="0"/>
+              <a:cs typeface="Courier New" pitchFamily="49" charset="0"/>
+            </a:endParaRPr>
+          </a:p>
+          <a:p>
+            <a:r>
+              <a:rPr lang="en-US" sz="1200" b="1"/>
+              <a:t>2)</a:t>
+            </a:r>
+            <a:r>
+              <a:rPr lang="en-US" sz="1200"/>
+              <a:t> </a:t>
+            </a:r>
+            <a:r>
+              <a:rPr lang="ru-RU" sz="1200"/>
+              <a:t>Инструкция UPDATE обновляет значения одного или нескольких столбцов в выбранных строках одной таблицы. Формат оператора UPDATE следующий: </a:t>
+            </a:r>
+          </a:p>
+          <a:p>
+            <a:pPr lvl="1"/>
+            <a:r>
+              <a:rPr lang="en-US" sz="1200">
+                <a:latin typeface="Courier New" pitchFamily="49" charset="0"/>
+                <a:cs typeface="Courier New" pitchFamily="49" charset="0"/>
+              </a:rPr>
+              <a:t>UPDATE table_name </a:t>
+            </a:r>
+          </a:p>
+          <a:p>
+            <a:pPr lvl="1"/>
+            <a:r>
+              <a:rPr lang="en-US" sz="1200">
+                <a:latin typeface="Courier New" pitchFamily="49" charset="0"/>
+                <a:cs typeface="Courier New" pitchFamily="49" charset="0"/>
+              </a:rPr>
+              <a:t>SET column_name1 = data_value1 [, column_name2 = data_value2 …] </a:t>
+            </a:r>
+          </a:p>
+          <a:p>
+            <a:pPr lvl="1"/>
+            <a:r>
+              <a:rPr lang="en-US" sz="1200">
+                <a:latin typeface="Courier New" pitchFamily="49" charset="0"/>
+                <a:cs typeface="Courier New" pitchFamily="49" charset="0"/>
+              </a:rPr>
+              <a:t>[WHERE search_condition]</a:t>
+            </a:r>
+          </a:p>
+          <a:p>
+            <a:r>
+              <a:rPr lang="be-BY" sz="1200" b="1"/>
+              <a:t>Пример полного обновления таблицы: </a:t>
+            </a:r>
+          </a:p>
+          <a:p>
+            <a:pPr lvl="1"/>
+            <a:r>
+              <a:rPr lang="en-US" sz="1200">
+                <a:latin typeface="Courier New" pitchFamily="49" charset="0"/>
+                <a:cs typeface="Courier New" pitchFamily="49" charset="0"/>
+              </a:rPr>
+              <a:t>UPDATE student </a:t>
+            </a:r>
+          </a:p>
+          <a:p>
+            <a:pPr lvl="1"/>
+            <a:r>
+              <a:rPr lang="en-US" sz="1200">
+                <a:latin typeface="Courier New" pitchFamily="49" charset="0"/>
+                <a:cs typeface="Courier New" pitchFamily="49" charset="0"/>
+              </a:rPr>
+              <a:t>SET rating = rating + 1.0;</a:t>
+            </a:r>
+          </a:p>
+          <a:p>
+            <a:endParaRPr lang="en-US" sz="1200">
+              <a:latin typeface="Courier New" pitchFamily="49" charset="0"/>
+              <a:cs typeface="Courier New" pitchFamily="49" charset="0"/>
+            </a:endParaRPr>
+          </a:p>
+          <a:p>
+            <a:pPr lvl="1"/>
+            <a:r>
+              <a:rPr lang="en-US" sz="1200">
+                <a:latin typeface="Courier New" pitchFamily="49" charset="0"/>
+                <a:cs typeface="Courier New" pitchFamily="49" charset="0"/>
+              </a:rPr>
+              <a:t>UPDATE student </a:t>
+            </a:r>
+          </a:p>
+          <a:p>
+            <a:pPr lvl="1"/>
+            <a:r>
+              <a:rPr lang="en-US" sz="1200">
+                <a:latin typeface="Courier New" pitchFamily="49" charset="0"/>
+                <a:cs typeface="Courier New" pitchFamily="49" charset="0"/>
+              </a:rPr>
+              <a:t>SET rating = rating + 1.0 </a:t>
+            </a:r>
+          </a:p>
+          <a:p>
+            <a:pPr lvl="1"/>
+            <a:r>
+              <a:rPr lang="en-US" sz="1200">
+                <a:latin typeface="Courier New" pitchFamily="49" charset="0"/>
+                <a:cs typeface="Courier New" pitchFamily="49" charset="0"/>
+              </a:rPr>
+              <a:t>WHERE name IN (SELECT student_name FROM konkurs);</a:t>
+            </a:r>
+          </a:p>
+          <a:p>
+            <a:endParaRPr lang="en-US" sz="1200">
+              <a:latin typeface="Courier New" pitchFamily="49" charset="0"/>
+              <a:cs typeface="Courier New" pitchFamily="49" charset="0"/>
+            </a:endParaRPr>
+          </a:p>
+          <a:p>
+            <a:r>
+              <a:rPr lang="en-US" sz="1200" b="1"/>
+              <a:t>3) </a:t>
+            </a:r>
+            <a:r>
+              <a:rPr lang="ru-RU" sz="1200"/>
+              <a:t>Инструкция DELETE удаляет выбранные строки из одной таблицы. Формат оператора DELETE следующий: </a:t>
+            </a:r>
+          </a:p>
+          <a:p>
+            <a:pPr lvl="1"/>
+            <a:r>
+              <a:rPr lang="en-US" sz="1200">
+                <a:latin typeface="Courier New" pitchFamily="49" charset="0"/>
+                <a:cs typeface="Courier New" pitchFamily="49" charset="0"/>
+              </a:rPr>
+              <a:t>DELETE FROM table_name </a:t>
+            </a:r>
+          </a:p>
+          <a:p>
+            <a:pPr lvl="1"/>
+            <a:r>
+              <a:rPr lang="en-US" sz="1200">
+                <a:latin typeface="Courier New" pitchFamily="49" charset="0"/>
+                <a:cs typeface="Courier New" pitchFamily="49" charset="0"/>
+              </a:rPr>
+              <a:t>[WHERE search_condition] </a:t>
+            </a:r>
+          </a:p>
+          <a:p>
+            <a:r>
+              <a:rPr lang="ru-RU" sz="1200" b="1"/>
+              <a:t>Пример полной очистки таблицы (сама таблица не удаляется из БД):</a:t>
+            </a:r>
+            <a:endParaRPr lang="en-US" sz="1200" b="1"/>
+          </a:p>
+          <a:p>
+            <a:pPr lvl="1"/>
+            <a:r>
+              <a:rPr lang="en-US" sz="1200">
+                <a:latin typeface="Courier New" pitchFamily="49" charset="0"/>
+                <a:cs typeface="Courier New" pitchFamily="49" charset="0"/>
+              </a:rPr>
+              <a:t>DELETE FROM student;</a:t>
+            </a:r>
+          </a:p>
+          <a:p>
+            <a:endParaRPr lang="en-US" sz="1200" b="1"/>
+          </a:p>
+          <a:p>
+            <a:r>
+              <a:rPr lang="ru-RU" sz="1200" b="1"/>
+              <a:t>Пример неполного удаления данных таблицы: </a:t>
+            </a:r>
+          </a:p>
+          <a:p>
+            <a:pPr lvl="1"/>
+            <a:r>
+              <a:rPr lang="en-US" sz="1200">
+                <a:latin typeface="Courier New" pitchFamily="49" charset="0"/>
+                <a:cs typeface="Courier New" pitchFamily="49" charset="0"/>
+              </a:rPr>
+              <a:t>DELETE FROM student </a:t>
+            </a:r>
+          </a:p>
+          <a:p>
+            <a:pPr lvl="1"/>
+            <a:r>
+              <a:rPr lang="en-US" sz="1200">
+                <a:latin typeface="Courier New" pitchFamily="49" charset="0"/>
+                <a:cs typeface="Courier New" pitchFamily="49" charset="0"/>
+              </a:rPr>
+              <a:t>WHERE name IN (SELECT student_name FROM prikaz)</a:t>
+            </a:r>
+            <a:endParaRPr lang="be-BY" sz="1200">
+              <a:latin typeface="Courier New" pitchFamily="49" charset="0"/>
+              <a:cs typeface="Courier New" pitchFamily="49" charset="0"/>
+            </a:endParaRPr>
+          </a:p>
+        </p:txBody>
+      </p:sp>
+    </p:spTree>
+    <p:extLst>
+      <p:ext uri="{BB962C8B-B14F-4D97-AF65-F5344CB8AC3E}">
+        <p14:creationId xmlns:p14="http://schemas.microsoft.com/office/powerpoint/2010/main" val="2017122947"/>
+      </p:ext>
+    </p:extLst>
+  </p:cSld>
+  <p:clrMapOvr>
+    <a:masterClrMapping/>
+  </p:clrMapOvr>
+  <p:timing>
+    <p:tnLst>
+      <p:par>
+        <p:cTn id="1" dur="indefinite" restart="never" nodeType="tmRoot"/>
+      </p:par>
+    </p:tnLst>
+  </p:timing>
+</p:sld>
+</file>
+
+<file path=ppt/slides/slide19.xml><?xml version="1.0" encoding="utf-8"?>
+<p:sld xmlns:a="http://schemas.openxmlformats.org/drawingml/2006/main" xmlns:r="http://schemas.openxmlformats.org/officeDocument/2006/relationships" xmlns:p="http://schemas.openxmlformats.org/presentationml/2006/main">
+  <p:cSld>
+    <p:spTree>
+      <p:nvGrpSpPr>
+        <p:cNvPr id="1" name=""/>
+        <p:cNvGrpSpPr/>
+        <p:nvPr/>
+      </p:nvGrpSpPr>
+      <p:grpSpPr>
+        <a:xfrm>
+          <a:off x="0" y="0"/>
+          <a:ext cx="0" cy="0"/>
+          <a:chOff x="0" y="0"/>
+          <a:chExt cx="0" cy="0"/>
+        </a:xfrm>
+      </p:grpSpPr>
+      <p:sp>
+        <p:nvSpPr>
+          <p:cNvPr id="2" name="Title 1"/>
+          <p:cNvSpPr>
+            <a:spLocks noGrp="1"/>
+          </p:cNvSpPr>
+          <p:nvPr>
+            <p:ph type="title"/>
+          </p:nvPr>
+        </p:nvSpPr>
+        <p:spPr/>
+        <p:txBody>
+          <a:bodyPr/>
+          <a:lstStyle/>
+          <a:p>
+            <a:r>
+              <a:rPr lang="ru-RU" dirty="0" smtClean="0"/>
+              <a:t>Хранимые процедуры</a:t>
+            </a:r>
+            <a:endParaRPr lang="en-US" dirty="0"/>
+          </a:p>
+        </p:txBody>
+      </p:sp>
+      <p:sp>
+        <p:nvSpPr>
+          <p:cNvPr id="3" name="Content Placeholder 2"/>
+          <p:cNvSpPr>
+            <a:spLocks noGrp="1"/>
+          </p:cNvSpPr>
+          <p:nvPr>
+            <p:ph idx="1"/>
+          </p:nvPr>
+        </p:nvSpPr>
+        <p:spPr/>
+        <p:txBody>
+          <a:bodyPr/>
+          <a:lstStyle/>
+          <a:p>
+            <a:r>
+              <a:rPr lang="en-US" dirty="0" smtClean="0"/>
+              <a:t>CREATE PROC</a:t>
+            </a:r>
+            <a:endParaRPr lang="en-US" dirty="0"/>
+          </a:p>
+        </p:txBody>
+      </p:sp>
+    </p:spTree>
+    <p:extLst>
+      <p:ext uri="{BB962C8B-B14F-4D97-AF65-F5344CB8AC3E}">
+        <p14:creationId xmlns:p14="http://schemas.microsoft.com/office/powerpoint/2010/main" val="1003551259"/>
+      </p:ext>
+    </p:extLst>
+  </p:cSld>
+  <p:clrMapOvr>
+    <a:masterClrMapping/>
+  </p:clrMapOvr>
 </p:sld>
 </file>
 
@@ -3578,6 +6891,1361 @@
       </p:par>
     </p:tnLst>
   </p:timing>
+</p:sld>
+</file>
+
+<file path=ppt/slides/slide20.xml><?xml version="1.0" encoding="utf-8"?>
+<p:sld xmlns:a="http://schemas.openxmlformats.org/drawingml/2006/main" xmlns:r="http://schemas.openxmlformats.org/officeDocument/2006/relationships" xmlns:p="http://schemas.openxmlformats.org/presentationml/2006/main">
+  <p:cSld>
+    <p:spTree>
+      <p:nvGrpSpPr>
+        <p:cNvPr id="1" name=""/>
+        <p:cNvGrpSpPr/>
+        <p:nvPr/>
+      </p:nvGrpSpPr>
+      <p:grpSpPr>
+        <a:xfrm>
+          <a:off x="0" y="0"/>
+          <a:ext cx="0" cy="0"/>
+          <a:chOff x="0" y="0"/>
+          <a:chExt cx="0" cy="0"/>
+        </a:xfrm>
+      </p:grpSpPr>
+      <p:sp>
+        <p:nvSpPr>
+          <p:cNvPr id="2" name="Title 1"/>
+          <p:cNvSpPr>
+            <a:spLocks noGrp="1"/>
+          </p:cNvSpPr>
+          <p:nvPr>
+            <p:ph type="title"/>
+          </p:nvPr>
+        </p:nvSpPr>
+        <p:spPr/>
+        <p:txBody>
+          <a:bodyPr/>
+          <a:lstStyle/>
+          <a:p>
+            <a:r>
+              <a:rPr lang="ru-RU" dirty="0" smtClean="0"/>
+              <a:t>Триггеры</a:t>
+            </a:r>
+            <a:endParaRPr lang="en-US" dirty="0"/>
+          </a:p>
+        </p:txBody>
+      </p:sp>
+      <p:sp>
+        <p:nvSpPr>
+          <p:cNvPr id="3" name="Content Placeholder 2"/>
+          <p:cNvSpPr>
+            <a:spLocks noGrp="1"/>
+          </p:cNvSpPr>
+          <p:nvPr>
+            <p:ph idx="1"/>
+          </p:nvPr>
+        </p:nvSpPr>
+        <p:spPr/>
+        <p:txBody>
+          <a:bodyPr/>
+          <a:lstStyle/>
+          <a:p>
+            <a:r>
+              <a:rPr lang="ru-RU" dirty="0" smtClean="0"/>
+              <a:t>Позволяют</a:t>
+            </a:r>
+            <a:r>
+              <a:rPr lang="en-US" dirty="0" smtClean="0"/>
+              <a:t> </a:t>
+            </a:r>
+            <a:r>
+              <a:rPr lang="ru-RU" dirty="0" smtClean="0"/>
+              <a:t>перехватывать операции на уровне отдельных таблиц.</a:t>
+            </a:r>
+          </a:p>
+          <a:p>
+            <a:r>
+              <a:rPr lang="ru-RU" dirty="0" smtClean="0"/>
+              <a:t>Полезно для проверок безопасности, дополнительной целотсности данных, протоколирования, аудита и т.п.</a:t>
+            </a:r>
+            <a:endParaRPr lang="en-US" dirty="0"/>
+          </a:p>
+        </p:txBody>
+      </p:sp>
+    </p:spTree>
+    <p:extLst>
+      <p:ext uri="{BB962C8B-B14F-4D97-AF65-F5344CB8AC3E}">
+        <p14:creationId xmlns:p14="http://schemas.microsoft.com/office/powerpoint/2010/main" val="2390943353"/>
+      </p:ext>
+    </p:extLst>
+  </p:cSld>
+  <p:clrMapOvr>
+    <a:masterClrMapping/>
+  </p:clrMapOvr>
+</p:sld>
+</file>
+
+<file path=ppt/slides/slide21.xml><?xml version="1.0" encoding="utf-8"?>
+<p:sld xmlns:a="http://schemas.openxmlformats.org/drawingml/2006/main" xmlns:r="http://schemas.openxmlformats.org/officeDocument/2006/relationships" xmlns:p="http://schemas.openxmlformats.org/presentationml/2006/main">
+  <p:cSld>
+    <p:spTree>
+      <p:nvGrpSpPr>
+        <p:cNvPr id="1" name=""/>
+        <p:cNvGrpSpPr/>
+        <p:nvPr/>
+      </p:nvGrpSpPr>
+      <p:grpSpPr>
+        <a:xfrm>
+          <a:off x="0" y="0"/>
+          <a:ext cx="0" cy="0"/>
+          <a:chOff x="0" y="0"/>
+          <a:chExt cx="0" cy="0"/>
+        </a:xfrm>
+      </p:grpSpPr>
+      <p:sp>
+        <p:nvSpPr>
+          <p:cNvPr id="2" name="Title 1"/>
+          <p:cNvSpPr>
+            <a:spLocks noGrp="1"/>
+          </p:cNvSpPr>
+          <p:nvPr>
+            <p:ph type="title"/>
+          </p:nvPr>
+        </p:nvSpPr>
+        <p:spPr/>
+        <p:txBody>
+          <a:bodyPr/>
+          <a:lstStyle/>
+          <a:p>
+            <a:r>
+              <a:rPr lang="ru-RU" dirty="0" smtClean="0"/>
+              <a:t>Понятие транзакции</a:t>
+            </a:r>
+            <a:endParaRPr lang="en-US" dirty="0"/>
+          </a:p>
+        </p:txBody>
+      </p:sp>
+      <p:sp>
+        <p:nvSpPr>
+          <p:cNvPr id="3" name="Content Placeholder 2"/>
+          <p:cNvSpPr>
+            <a:spLocks noGrp="1"/>
+          </p:cNvSpPr>
+          <p:nvPr>
+            <p:ph idx="1"/>
+          </p:nvPr>
+        </p:nvSpPr>
+        <p:spPr/>
+        <p:txBody>
+          <a:bodyPr/>
+          <a:lstStyle/>
+          <a:p>
+            <a:endParaRPr lang="en-US" dirty="0"/>
+          </a:p>
+        </p:txBody>
+      </p:sp>
+    </p:spTree>
+    <p:extLst>
+      <p:ext uri="{BB962C8B-B14F-4D97-AF65-F5344CB8AC3E}">
+        <p14:creationId xmlns:p14="http://schemas.microsoft.com/office/powerpoint/2010/main" val="1871542494"/>
+      </p:ext>
+    </p:extLst>
+  </p:cSld>
+  <p:clrMapOvr>
+    <a:masterClrMapping/>
+  </p:clrMapOvr>
+</p:sld>
+</file>
+
+<file path=ppt/slides/slide22.xml><?xml version="1.0" encoding="utf-8"?>
+<p:sld xmlns:a="http://schemas.openxmlformats.org/drawingml/2006/main" xmlns:r="http://schemas.openxmlformats.org/officeDocument/2006/relationships" xmlns:p="http://schemas.openxmlformats.org/presentationml/2006/main">
+  <p:cSld>
+    <p:spTree>
+      <p:nvGrpSpPr>
+        <p:cNvPr id="1" name=""/>
+        <p:cNvGrpSpPr/>
+        <p:nvPr/>
+      </p:nvGrpSpPr>
+      <p:grpSpPr>
+        <a:xfrm>
+          <a:off x="0" y="0"/>
+          <a:ext cx="0" cy="0"/>
+          <a:chOff x="0" y="0"/>
+          <a:chExt cx="0" cy="0"/>
+        </a:xfrm>
+      </p:grpSpPr>
+      <p:sp>
+        <p:nvSpPr>
+          <p:cNvPr id="2" name="Title 1"/>
+          <p:cNvSpPr>
+            <a:spLocks noGrp="1"/>
+          </p:cNvSpPr>
+          <p:nvPr>
+            <p:ph type="title"/>
+          </p:nvPr>
+        </p:nvSpPr>
+        <p:spPr/>
+        <p:txBody>
+          <a:bodyPr/>
+          <a:lstStyle/>
+          <a:p>
+            <a:r>
+              <a:rPr lang="ru-RU" dirty="0" smtClean="0"/>
+              <a:t>Безопасность </a:t>
+            </a:r>
+            <a:r>
+              <a:rPr lang="en-US" dirty="0" smtClean="0"/>
+              <a:t>SQL</a:t>
+            </a:r>
+            <a:endParaRPr lang="en-US" dirty="0"/>
+          </a:p>
+        </p:txBody>
+      </p:sp>
+      <p:sp>
+        <p:nvSpPr>
+          <p:cNvPr id="3" name="Content Placeholder 2"/>
+          <p:cNvSpPr>
+            <a:spLocks noGrp="1"/>
+          </p:cNvSpPr>
+          <p:nvPr>
+            <p:ph idx="1"/>
+          </p:nvPr>
+        </p:nvSpPr>
+        <p:spPr/>
+        <p:txBody>
+          <a:bodyPr/>
+          <a:lstStyle/>
+          <a:p>
+            <a:r>
+              <a:rPr lang="en-US" dirty="0" smtClean="0"/>
+              <a:t>SQL Injection </a:t>
+            </a:r>
+            <a:r>
+              <a:rPr lang="ru-RU" dirty="0" smtClean="0"/>
+              <a:t>атаки</a:t>
+            </a:r>
+          </a:p>
+          <a:p>
+            <a:pPr lvl="1"/>
+            <a:r>
+              <a:rPr lang="ru-RU" dirty="0" smtClean="0"/>
+              <a:t>Чаще направлены против веб-приложений, но и </a:t>
+            </a:r>
+            <a:r>
+              <a:rPr lang="en-US" dirty="0" smtClean="0"/>
+              <a:t>desktop </a:t>
+            </a:r>
+            <a:r>
+              <a:rPr lang="ru-RU" dirty="0" smtClean="0"/>
+              <a:t>приложения тоже должны защищаться от них</a:t>
+            </a:r>
+          </a:p>
+          <a:p>
+            <a:r>
+              <a:rPr lang="ru-RU" dirty="0" smtClean="0"/>
+              <a:t>Защита от </a:t>
+            </a:r>
+            <a:r>
+              <a:rPr lang="en-US" dirty="0" smtClean="0"/>
+              <a:t>SQL Injection</a:t>
+            </a:r>
+          </a:p>
+          <a:p>
+            <a:pPr lvl="1"/>
+            <a:r>
+              <a:rPr lang="ru-RU" dirty="0" smtClean="0"/>
+              <a:t>«Нет» динамическому </a:t>
+            </a:r>
+            <a:r>
+              <a:rPr lang="en-US" dirty="0" smtClean="0"/>
+              <a:t>SQL</a:t>
+            </a:r>
+          </a:p>
+          <a:p>
+            <a:pPr lvl="1"/>
+            <a:r>
+              <a:rPr lang="en-US" dirty="0" smtClean="0"/>
+              <a:t>@</a:t>
+            </a:r>
+            <a:r>
+              <a:rPr lang="ru-RU" dirty="0" smtClean="0"/>
+              <a:t>Параметры!</a:t>
+            </a:r>
+            <a:endParaRPr lang="en-US" dirty="0"/>
+          </a:p>
+        </p:txBody>
+      </p:sp>
+    </p:spTree>
+    <p:extLst>
+      <p:ext uri="{BB962C8B-B14F-4D97-AF65-F5344CB8AC3E}">
+        <p14:creationId xmlns:p14="http://schemas.microsoft.com/office/powerpoint/2010/main" val="326301753"/>
+      </p:ext>
+    </p:extLst>
+  </p:cSld>
+  <p:clrMapOvr>
+    <a:masterClrMapping/>
+  </p:clrMapOvr>
+</p:sld>
+</file>
+
+<file path=ppt/slides/slide3.xml><?xml version="1.0" encoding="utf-8"?>
+<p:sld xmlns:a="http://schemas.openxmlformats.org/drawingml/2006/main" xmlns:r="http://schemas.openxmlformats.org/officeDocument/2006/relationships" xmlns:p="http://schemas.openxmlformats.org/presentationml/2006/main" show="0">
+  <p:cSld>
+    <p:spTree>
+      <p:nvGrpSpPr>
+        <p:cNvPr id="1" name=""/>
+        <p:cNvGrpSpPr/>
+        <p:nvPr/>
+      </p:nvGrpSpPr>
+      <p:grpSpPr>
+        <a:xfrm>
+          <a:off x="0" y="0"/>
+          <a:ext cx="0" cy="0"/>
+          <a:chOff x="0" y="0"/>
+          <a:chExt cx="0" cy="0"/>
+        </a:xfrm>
+      </p:grpSpPr>
+      <p:sp>
+        <p:nvSpPr>
+          <p:cNvPr id="3074" name="Прямоугольник 3"/>
+          <p:cNvSpPr>
+            <a:spLocks noChangeArrowheads="1"/>
+          </p:cNvSpPr>
+          <p:nvPr/>
+        </p:nvSpPr>
+        <p:spPr bwMode="auto">
+          <a:xfrm>
+            <a:off x="685800" y="304800"/>
+            <a:ext cx="8305800" cy="5078413"/>
+          </a:xfrm>
+          <a:prstGeom prst="rect">
+            <a:avLst/>
+          </a:prstGeom>
+          <a:noFill/>
+          <a:ln>
+            <a:noFill/>
+          </a:ln>
+          <a:extLst>
+            <a:ext uri="{909E8E84-426E-40DD-AFC4-6F175D3DCCD1}">
+              <a14:hiddenFill xmlns:a14="http://schemas.microsoft.com/office/drawing/2010/main">
+                <a:solidFill>
+                  <a:srgbClr val="FFFFFF"/>
+                </a:solidFill>
+              </a14:hiddenFill>
+            </a:ext>
+            <a:ext uri="{91240B29-F687-4F45-9708-019B960494DF}">
+              <a14:hiddenLine xmlns:a14="http://schemas.microsoft.com/office/drawing/2010/main" w="9525">
+                <a:solidFill>
+                  <a:srgbClr val="000000"/>
+                </a:solidFill>
+                <a:miter lim="800000"/>
+                <a:headEnd/>
+                <a:tailEnd/>
+              </a14:hiddenLine>
+            </a:ext>
+          </a:extLst>
+        </p:spPr>
+        <p:txBody>
+          <a:bodyPr>
+            <a:spAutoFit/>
+          </a:bodyPr>
+          <a:lstStyle/>
+          <a:p>
+            <a:r>
+              <a:rPr lang="ru-RU" b="1"/>
+              <a:t>Концептуальные модели данных</a:t>
+            </a:r>
+            <a:r>
+              <a:rPr lang="en-US" b="1"/>
+              <a:t> :</a:t>
+            </a:r>
+          </a:p>
+          <a:p>
+            <a:pPr lvl="1"/>
+            <a:r>
+              <a:rPr lang="ru-RU"/>
+              <a:t>Семантическое моделирование данных</a:t>
+            </a:r>
+            <a:r>
+              <a:rPr lang="en-US"/>
+              <a:t>.</a:t>
+            </a:r>
+          </a:p>
+          <a:p>
+            <a:pPr lvl="1"/>
+            <a:r>
+              <a:rPr lang="ru-RU"/>
+              <a:t>ER-модель (модель типа «сущность-связь» или «объект/отношение»)</a:t>
+            </a:r>
+            <a:r>
+              <a:rPr lang="en-US"/>
+              <a:t>.</a:t>
+            </a:r>
+          </a:p>
+          <a:p>
+            <a:pPr lvl="1"/>
+            <a:r>
+              <a:rPr lang="ru-RU"/>
+              <a:t>EER-модель (Расширенная ER-модель)</a:t>
+            </a:r>
+            <a:r>
+              <a:rPr lang="en-US"/>
+              <a:t>.</a:t>
+            </a:r>
+          </a:p>
+          <a:p>
+            <a:endParaRPr lang="en-US"/>
+          </a:p>
+          <a:p>
+            <a:r>
+              <a:rPr lang="ru-RU" b="1"/>
+              <a:t>Логические модели данных</a:t>
+            </a:r>
+            <a:r>
+              <a:rPr lang="en-US" b="1"/>
+              <a:t> :</a:t>
+            </a:r>
+          </a:p>
+          <a:p>
+            <a:pPr lvl="1">
+              <a:buFont typeface="Arial" charset="0"/>
+              <a:buChar char="•"/>
+            </a:pPr>
+            <a:r>
+              <a:rPr lang="ru-RU"/>
+              <a:t>Иерархическая модель данных</a:t>
+            </a:r>
+            <a:r>
+              <a:rPr lang="en-US"/>
+              <a:t>.</a:t>
+            </a:r>
+          </a:p>
+          <a:p>
+            <a:pPr lvl="1">
+              <a:buFont typeface="Arial" charset="0"/>
+              <a:buChar char="•"/>
+            </a:pPr>
+            <a:r>
+              <a:rPr lang="ru-RU"/>
+              <a:t>Сетевая модель данных</a:t>
+            </a:r>
+            <a:r>
+              <a:rPr lang="en-US"/>
+              <a:t>.</a:t>
+            </a:r>
+          </a:p>
+          <a:p>
+            <a:pPr lvl="1">
+              <a:buFont typeface="Arial" charset="0"/>
+              <a:buChar char="•"/>
+            </a:pPr>
+            <a:r>
+              <a:rPr lang="ru-RU"/>
+              <a:t>Реляционная модель данных</a:t>
+            </a:r>
+            <a:r>
+              <a:rPr lang="en-US"/>
+              <a:t>.</a:t>
+            </a:r>
+            <a:endParaRPr lang="ru-RU"/>
+          </a:p>
+          <a:p>
+            <a:pPr lvl="2">
+              <a:buFont typeface="Arial" charset="0"/>
+              <a:buChar char="•"/>
+            </a:pPr>
+            <a:r>
+              <a:rPr lang="be-BY"/>
+              <a:t>Домены</a:t>
+            </a:r>
+            <a:r>
+              <a:rPr lang="en-US"/>
+              <a:t>, </a:t>
+            </a:r>
+            <a:r>
+              <a:rPr lang="be-BY"/>
+              <a:t>Отношения</a:t>
+            </a:r>
+            <a:r>
+              <a:rPr lang="en-US"/>
+              <a:t>,</a:t>
+            </a:r>
+            <a:r>
+              <a:rPr lang="be-BY"/>
+              <a:t> Представления</a:t>
+            </a:r>
+            <a:r>
+              <a:rPr lang="en-US"/>
+              <a:t>,</a:t>
+            </a:r>
+            <a:r>
+              <a:rPr lang="ru-RU"/>
+              <a:t> Целостность реляционных данных </a:t>
+            </a:r>
+            <a:r>
+              <a:rPr lang="en-US"/>
+              <a:t>,</a:t>
+            </a:r>
+            <a:r>
+              <a:rPr lang="be-BY"/>
+              <a:t> Потенциальные ключи</a:t>
+            </a:r>
+            <a:r>
+              <a:rPr lang="en-US"/>
+              <a:t>, </a:t>
+            </a:r>
+            <a:r>
+              <a:rPr lang="be-BY"/>
+              <a:t>Внешние ключи</a:t>
+            </a:r>
+            <a:r>
+              <a:rPr lang="en-US"/>
+              <a:t>.</a:t>
+            </a:r>
+          </a:p>
+          <a:p>
+            <a:pPr lvl="2">
+              <a:buFont typeface="Arial" charset="0"/>
+              <a:buChar char="•"/>
+            </a:pPr>
+            <a:r>
+              <a:rPr lang="be-BY"/>
+              <a:t>Реляционные операторы</a:t>
+            </a:r>
+            <a:r>
+              <a:rPr lang="en-US"/>
+              <a:t>, </a:t>
+            </a:r>
+            <a:r>
+              <a:rPr lang="be-BY"/>
+              <a:t>Реляционная алгебра</a:t>
+            </a:r>
+            <a:r>
+              <a:rPr lang="en-US"/>
+              <a:t>.</a:t>
+            </a:r>
+          </a:p>
+          <a:p>
+            <a:pPr lvl="2">
+              <a:buFont typeface="Arial" charset="0"/>
+              <a:buChar char="•"/>
+            </a:pPr>
+            <a:r>
+              <a:rPr lang="ru-RU"/>
+              <a:t>Перевод ER-диаграммы в реляционную модель данных</a:t>
+            </a:r>
+            <a:r>
+              <a:rPr lang="en-US"/>
+              <a:t>.</a:t>
+            </a:r>
+          </a:p>
+          <a:p>
+            <a:pPr lvl="1">
+              <a:buFont typeface="Arial" charset="0"/>
+              <a:buChar char="•"/>
+            </a:pPr>
+            <a:r>
+              <a:rPr lang="be-BY"/>
+              <a:t>Объектно-реляционные СУБД</a:t>
+            </a:r>
+            <a:r>
+              <a:rPr lang="en-US"/>
+              <a:t>.</a:t>
+            </a:r>
+            <a:endParaRPr lang="be-BY"/>
+          </a:p>
+          <a:p>
+            <a:pPr lvl="1">
+              <a:buFont typeface="Arial" charset="0"/>
+              <a:buChar char="•"/>
+            </a:pPr>
+            <a:r>
+              <a:rPr lang="ru-RU"/>
+              <a:t>Нереляционные СУБД третьего поколения</a:t>
+            </a:r>
+            <a:r>
+              <a:rPr lang="en-US"/>
+              <a:t>.</a:t>
+            </a:r>
+          </a:p>
+          <a:p>
+            <a:pPr>
+              <a:buFont typeface="Arial" charset="0"/>
+              <a:buChar char="•"/>
+            </a:pPr>
+            <a:endParaRPr lang="en-US"/>
+          </a:p>
+          <a:p>
+            <a:r>
+              <a:rPr lang="ru-RU" b="1"/>
+              <a:t>Физические модели данных</a:t>
+            </a:r>
+            <a:r>
+              <a:rPr lang="en-US" b="1"/>
+              <a:t> :</a:t>
+            </a:r>
+          </a:p>
+          <a:p>
+            <a:pPr lvl="1">
+              <a:buFont typeface="Arial" charset="0"/>
+              <a:buChar char="•"/>
+            </a:pPr>
+            <a:r>
+              <a:rPr lang="ru-RU"/>
+              <a:t>Основные понятия физического хранения данных</a:t>
+            </a:r>
+            <a:r>
+              <a:rPr lang="en-US"/>
+              <a:t>.</a:t>
+            </a:r>
+          </a:p>
+        </p:txBody>
+      </p:sp>
+    </p:spTree>
+    <p:extLst>
+      <p:ext uri="{BB962C8B-B14F-4D97-AF65-F5344CB8AC3E}">
+        <p14:creationId xmlns:p14="http://schemas.microsoft.com/office/powerpoint/2010/main" val="3637511724"/>
+      </p:ext>
+    </p:extLst>
+  </p:cSld>
+  <p:clrMapOvr>
+    <a:masterClrMapping/>
+  </p:clrMapOvr>
+  <mc:AlternateContent xmlns:mc="http://schemas.openxmlformats.org/markup-compatibility/2006">
+    <mc:Choice xmlns:p14="http://schemas.microsoft.com/office/powerpoint/2010/main" Requires="p14">
+      <p:transition spd="slow" p14:dur="2000"/>
+    </mc:Choice>
+    <mc:Fallback>
+      <p:transition spd="slow"/>
+    </mc:Fallback>
+  </mc:AlternateContent>
+  <p:timing>
+    <p:tnLst>
+      <p:par>
+        <p:cTn id="1" dur="indefinite" restart="never" nodeType="tmRoot"/>
+      </p:par>
+    </p:tnLst>
+  </p:timing>
+</p:sld>
+</file>
+
+<file path=ppt/slides/slide4.xml><?xml version="1.0" encoding="utf-8"?>
+<p:sld xmlns:a="http://schemas.openxmlformats.org/drawingml/2006/main" xmlns:r="http://schemas.openxmlformats.org/officeDocument/2006/relationships" xmlns:p="http://schemas.openxmlformats.org/presentationml/2006/main">
+  <p:cSld>
+    <p:spTree>
+      <p:nvGrpSpPr>
+        <p:cNvPr id="1" name=""/>
+        <p:cNvGrpSpPr/>
+        <p:nvPr/>
+      </p:nvGrpSpPr>
+      <p:grpSpPr>
+        <a:xfrm>
+          <a:off x="0" y="0"/>
+          <a:ext cx="0" cy="0"/>
+          <a:chOff x="0" y="0"/>
+          <a:chExt cx="0" cy="0"/>
+        </a:xfrm>
+      </p:grpSpPr>
+      <p:sp>
+        <p:nvSpPr>
+          <p:cNvPr id="2" name="Title 1"/>
+          <p:cNvSpPr>
+            <a:spLocks noGrp="1"/>
+          </p:cNvSpPr>
+          <p:nvPr>
+            <p:ph type="title"/>
+          </p:nvPr>
+        </p:nvSpPr>
+        <p:spPr/>
+        <p:txBody>
+          <a:bodyPr/>
+          <a:lstStyle/>
+          <a:p>
+            <a:r>
+              <a:rPr lang="ru-RU" dirty="0" smtClean="0"/>
+              <a:t>Типы БД</a:t>
+            </a:r>
+            <a:endParaRPr lang="en-US" dirty="0"/>
+          </a:p>
+        </p:txBody>
+      </p:sp>
+      <p:sp>
+        <p:nvSpPr>
+          <p:cNvPr id="3" name="Content Placeholder 2"/>
+          <p:cNvSpPr>
+            <a:spLocks noGrp="1"/>
+          </p:cNvSpPr>
+          <p:nvPr>
+            <p:ph idx="1"/>
+          </p:nvPr>
+        </p:nvSpPr>
+        <p:spPr/>
+        <p:txBody>
+          <a:bodyPr/>
+          <a:lstStyle/>
+          <a:p>
+            <a:r>
+              <a:rPr lang="ru-RU" dirty="0" smtClean="0"/>
+              <a:t>Реляционные </a:t>
+            </a:r>
+            <a:r>
+              <a:rPr lang="en-US" dirty="0" smtClean="0"/>
+              <a:t>(relational)</a:t>
+            </a:r>
+            <a:endParaRPr lang="ru-RU" dirty="0" smtClean="0"/>
+          </a:p>
+          <a:p>
+            <a:r>
+              <a:rPr lang="ru-RU" dirty="0" smtClean="0"/>
+              <a:t>Документные</a:t>
+            </a:r>
+            <a:r>
+              <a:rPr lang="en-US" dirty="0" smtClean="0"/>
+              <a:t> (document-driven)</a:t>
+            </a:r>
+            <a:endParaRPr lang="ru-RU" dirty="0" smtClean="0"/>
+          </a:p>
+          <a:p>
+            <a:endParaRPr lang="ru-RU" dirty="0"/>
+          </a:p>
+          <a:p>
+            <a:r>
+              <a:rPr lang="ru-RU" dirty="0" smtClean="0"/>
+              <a:t>СУБД – Система Управления Базами Данных </a:t>
+            </a:r>
+            <a:r>
+              <a:rPr lang="en-US" dirty="0" smtClean="0"/>
+              <a:t>(RDBMS </a:t>
+            </a:r>
+            <a:r>
+              <a:rPr lang="ru-RU" dirty="0" smtClean="0"/>
+              <a:t>– </a:t>
+            </a:r>
+            <a:r>
+              <a:rPr lang="en-US" dirty="0" smtClean="0"/>
+              <a:t>Relational Database Management System)</a:t>
+            </a:r>
+            <a:endParaRPr lang="en-US" dirty="0"/>
+          </a:p>
+        </p:txBody>
+      </p:sp>
+    </p:spTree>
+    <p:extLst>
+      <p:ext uri="{BB962C8B-B14F-4D97-AF65-F5344CB8AC3E}">
+        <p14:creationId xmlns:p14="http://schemas.microsoft.com/office/powerpoint/2010/main" val="2786420212"/>
+      </p:ext>
+    </p:extLst>
+  </p:cSld>
+  <p:clrMapOvr>
+    <a:masterClrMapping/>
+  </p:clrMapOvr>
+</p:sld>
+</file>
+
+<file path=ppt/slides/slide5.xml><?xml version="1.0" encoding="utf-8"?>
+<p:sld xmlns:a="http://schemas.openxmlformats.org/drawingml/2006/main" xmlns:r="http://schemas.openxmlformats.org/officeDocument/2006/relationships" xmlns:p="http://schemas.openxmlformats.org/presentationml/2006/main">
+  <p:cSld>
+    <p:spTree>
+      <p:nvGrpSpPr>
+        <p:cNvPr id="1" name=""/>
+        <p:cNvGrpSpPr/>
+        <p:nvPr/>
+      </p:nvGrpSpPr>
+      <p:grpSpPr>
+        <a:xfrm>
+          <a:off x="0" y="0"/>
+          <a:ext cx="0" cy="0"/>
+          <a:chOff x="0" y="0"/>
+          <a:chExt cx="0" cy="0"/>
+        </a:xfrm>
+      </p:grpSpPr>
+      <p:sp>
+        <p:nvSpPr>
+          <p:cNvPr id="2" name="Title 1"/>
+          <p:cNvSpPr>
+            <a:spLocks noGrp="1"/>
+          </p:cNvSpPr>
+          <p:nvPr>
+            <p:ph type="title"/>
+          </p:nvPr>
+        </p:nvSpPr>
+        <p:spPr/>
+        <p:txBody>
+          <a:bodyPr/>
+          <a:lstStyle/>
+          <a:p>
+            <a:r>
+              <a:rPr lang="ru-RU" dirty="0" smtClean="0"/>
+              <a:t>Производители СУБД</a:t>
+            </a:r>
+            <a:endParaRPr lang="en-US" dirty="0"/>
+          </a:p>
+        </p:txBody>
+      </p:sp>
+      <p:sp>
+        <p:nvSpPr>
+          <p:cNvPr id="3" name="Content Placeholder 2"/>
+          <p:cNvSpPr>
+            <a:spLocks noGrp="1"/>
+          </p:cNvSpPr>
+          <p:nvPr>
+            <p:ph idx="1"/>
+          </p:nvPr>
+        </p:nvSpPr>
+        <p:spPr/>
+        <p:txBody>
+          <a:bodyPr/>
+          <a:lstStyle/>
+          <a:p>
+            <a:r>
+              <a:rPr lang="en-US" dirty="0" smtClean="0"/>
+              <a:t>IBM</a:t>
+            </a:r>
+          </a:p>
+          <a:p>
+            <a:pPr lvl="1"/>
+            <a:r>
+              <a:rPr lang="en-US" dirty="0" smtClean="0"/>
+              <a:t>DB2</a:t>
+            </a:r>
+          </a:p>
+          <a:p>
+            <a:r>
+              <a:rPr lang="en-US" dirty="0" smtClean="0"/>
+              <a:t>Microsoft</a:t>
+            </a:r>
+          </a:p>
+          <a:p>
+            <a:pPr lvl="1"/>
+            <a:r>
+              <a:rPr lang="en-US" dirty="0" smtClean="0"/>
+              <a:t>SQL Server</a:t>
+            </a:r>
+          </a:p>
+          <a:p>
+            <a:pPr lvl="1"/>
+            <a:r>
+              <a:rPr lang="en-US" dirty="0" smtClean="0"/>
+              <a:t>Access</a:t>
+            </a:r>
+          </a:p>
+          <a:p>
+            <a:r>
+              <a:rPr lang="en-US" dirty="0" smtClean="0"/>
+              <a:t>Oracle</a:t>
+            </a:r>
+          </a:p>
+          <a:p>
+            <a:pPr lvl="1"/>
+            <a:r>
+              <a:rPr lang="en-US" dirty="0" smtClean="0"/>
+              <a:t>Oracle</a:t>
+            </a:r>
+          </a:p>
+          <a:p>
+            <a:pPr lvl="1"/>
+            <a:r>
+              <a:rPr lang="en-US" dirty="0" smtClean="0"/>
+              <a:t>MySQL</a:t>
+            </a:r>
+          </a:p>
+        </p:txBody>
+      </p:sp>
+    </p:spTree>
+    <p:extLst>
+      <p:ext uri="{BB962C8B-B14F-4D97-AF65-F5344CB8AC3E}">
+        <p14:creationId xmlns:p14="http://schemas.microsoft.com/office/powerpoint/2010/main" val="3418372022"/>
+      </p:ext>
+    </p:extLst>
+  </p:cSld>
+  <p:clrMapOvr>
+    <a:masterClrMapping/>
+  </p:clrMapOvr>
+</p:sld>
+</file>
+
+<file path=ppt/slides/slide6.xml><?xml version="1.0" encoding="utf-8"?>
+<p:sld xmlns:a="http://schemas.openxmlformats.org/drawingml/2006/main" xmlns:r="http://schemas.openxmlformats.org/officeDocument/2006/relationships" xmlns:p="http://schemas.openxmlformats.org/presentationml/2006/main">
+  <p:cSld>
+    <p:spTree>
+      <p:nvGrpSpPr>
+        <p:cNvPr id="1" name=""/>
+        <p:cNvGrpSpPr/>
+        <p:nvPr/>
+      </p:nvGrpSpPr>
+      <p:grpSpPr>
+        <a:xfrm>
+          <a:off x="0" y="0"/>
+          <a:ext cx="0" cy="0"/>
+          <a:chOff x="0" y="0"/>
+          <a:chExt cx="0" cy="0"/>
+        </a:xfrm>
+      </p:grpSpPr>
+      <p:pic>
+        <p:nvPicPr>
+          <p:cNvPr id="4098" name="Picture 2"/>
+          <p:cNvPicPr>
+            <a:picLocks noChangeAspect="1" noChangeArrowheads="1"/>
+          </p:cNvPicPr>
+          <p:nvPr/>
+        </p:nvPicPr>
+        <p:blipFill>
+          <a:blip r:embed="rId2">
+            <a:extLst>
+              <a:ext uri="{28A0092B-C50C-407E-A947-70E740481C1C}">
+                <a14:useLocalDpi xmlns:a14="http://schemas.microsoft.com/office/drawing/2010/main" val="0"/>
+              </a:ext>
+            </a:extLst>
+          </a:blip>
+          <a:srcRect/>
+          <a:stretch>
+            <a:fillRect/>
+          </a:stretch>
+        </p:blipFill>
+        <p:spPr bwMode="auto">
+          <a:xfrm>
+            <a:off x="150813" y="1600200"/>
+            <a:ext cx="8840787" cy="3352800"/>
+          </a:xfrm>
+          <a:prstGeom prst="rect">
+            <a:avLst/>
+          </a:prstGeom>
+          <a:noFill/>
+          <a:ln>
+            <a:noFill/>
+          </a:ln>
+          <a:extLst>
+            <a:ext uri="{909E8E84-426E-40DD-AFC4-6F175D3DCCD1}">
+              <a14:hiddenFill xmlns:a14="http://schemas.microsoft.com/office/drawing/2010/main">
+                <a:solidFill>
+                  <a:srgbClr val="FFFFFF"/>
+                </a:solidFill>
+              </a14:hiddenFill>
+            </a:ext>
+            <a:ext uri="{91240B29-F687-4F45-9708-019B960494DF}">
+              <a14:hiddenLine xmlns:a14="http://schemas.microsoft.com/office/drawing/2010/main" w="9525">
+                <a:solidFill>
+                  <a:srgbClr val="000000"/>
+                </a:solidFill>
+                <a:miter lim="800000"/>
+                <a:headEnd/>
+                <a:tailEnd/>
+              </a14:hiddenLine>
+            </a:ext>
+          </a:extLst>
+        </p:spPr>
+      </p:pic>
+      <p:sp>
+        <p:nvSpPr>
+          <p:cNvPr id="4099" name="Прямоугольник 2"/>
+          <p:cNvSpPr>
+            <a:spLocks noChangeArrowheads="1"/>
+          </p:cNvSpPr>
+          <p:nvPr/>
+        </p:nvSpPr>
+        <p:spPr bwMode="auto">
+          <a:xfrm>
+            <a:off x="152400" y="76200"/>
+            <a:ext cx="8839200" cy="708025"/>
+          </a:xfrm>
+          <a:prstGeom prst="rect">
+            <a:avLst/>
+          </a:prstGeom>
+          <a:noFill/>
+          <a:ln>
+            <a:noFill/>
+          </a:ln>
+          <a:extLst>
+            <a:ext uri="{909E8E84-426E-40DD-AFC4-6F175D3DCCD1}">
+              <a14:hiddenFill xmlns:a14="http://schemas.microsoft.com/office/drawing/2010/main">
+                <a:solidFill>
+                  <a:srgbClr val="FFFFFF"/>
+                </a:solidFill>
+              </a14:hiddenFill>
+            </a:ext>
+            <a:ext uri="{91240B29-F687-4F45-9708-019B960494DF}">
+              <a14:hiddenLine xmlns:a14="http://schemas.microsoft.com/office/drawing/2010/main" w="9525">
+                <a:solidFill>
+                  <a:srgbClr val="000000"/>
+                </a:solidFill>
+                <a:miter lim="800000"/>
+                <a:headEnd/>
+                <a:tailEnd/>
+              </a14:hiddenLine>
+            </a:ext>
+          </a:extLst>
+        </p:spPr>
+        <p:txBody>
+          <a:bodyPr>
+            <a:spAutoFit/>
+          </a:bodyPr>
+          <a:lstStyle/>
+          <a:p>
+            <a:pPr algn="ctr"/>
+            <a:r>
+              <a:rPr lang="ru-RU" sz="2400" b="1"/>
+              <a:t>Реляционная БД</a:t>
+            </a:r>
+            <a:r>
+              <a:rPr lang="be-BY" sz="2400" b="1"/>
+              <a:t>.</a:t>
+            </a:r>
+          </a:p>
+          <a:p>
+            <a:pPr algn="ctr"/>
+            <a:r>
+              <a:rPr lang="ru-RU" sz="1600" b="1"/>
+              <a:t>Отношение.</a:t>
+            </a:r>
+            <a:endParaRPr lang="be-BY" sz="1600" b="1"/>
+          </a:p>
+        </p:txBody>
+      </p:sp>
+    </p:spTree>
+    <p:extLst>
+      <p:ext uri="{BB962C8B-B14F-4D97-AF65-F5344CB8AC3E}">
+        <p14:creationId xmlns:p14="http://schemas.microsoft.com/office/powerpoint/2010/main" val="796670954"/>
+      </p:ext>
+    </p:extLst>
+  </p:cSld>
+  <p:clrMapOvr>
+    <a:masterClrMapping/>
+  </p:clrMapOvr>
+</p:sld>
+</file>
+
+<file path=ppt/slides/slide7.xml><?xml version="1.0" encoding="utf-8"?>
+<p:sld xmlns:a="http://schemas.openxmlformats.org/drawingml/2006/main" xmlns:r="http://schemas.openxmlformats.org/officeDocument/2006/relationships" xmlns:p="http://schemas.openxmlformats.org/presentationml/2006/main">
+  <p:cSld>
+    <p:spTree>
+      <p:nvGrpSpPr>
+        <p:cNvPr id="1" name=""/>
+        <p:cNvGrpSpPr/>
+        <p:nvPr/>
+      </p:nvGrpSpPr>
+      <p:grpSpPr>
+        <a:xfrm>
+          <a:off x="0" y="0"/>
+          <a:ext cx="0" cy="0"/>
+          <a:chOff x="0" y="0"/>
+          <a:chExt cx="0" cy="0"/>
+        </a:xfrm>
+      </p:grpSpPr>
+      <p:sp>
+        <p:nvSpPr>
+          <p:cNvPr id="2" name="Title 1"/>
+          <p:cNvSpPr>
+            <a:spLocks noGrp="1"/>
+          </p:cNvSpPr>
+          <p:nvPr>
+            <p:ph type="title"/>
+          </p:nvPr>
+        </p:nvSpPr>
+        <p:spPr/>
+        <p:txBody>
+          <a:bodyPr/>
+          <a:lstStyle/>
+          <a:p>
+            <a:r>
+              <a:rPr lang="ru-RU" dirty="0" smtClean="0"/>
+              <a:t>Понятие нормализации</a:t>
+            </a:r>
+            <a:endParaRPr lang="en-US" dirty="0"/>
+          </a:p>
+        </p:txBody>
+      </p:sp>
+      <p:sp>
+        <p:nvSpPr>
+          <p:cNvPr id="3" name="Content Placeholder 2"/>
+          <p:cNvSpPr>
+            <a:spLocks noGrp="1"/>
+          </p:cNvSpPr>
+          <p:nvPr>
+            <p:ph idx="1"/>
+          </p:nvPr>
+        </p:nvSpPr>
+        <p:spPr/>
+        <p:txBody>
+          <a:bodyPr/>
+          <a:lstStyle/>
+          <a:p>
+            <a:endParaRPr lang="en-US" dirty="0"/>
+          </a:p>
+        </p:txBody>
+      </p:sp>
+    </p:spTree>
+    <p:extLst>
+      <p:ext uri="{BB962C8B-B14F-4D97-AF65-F5344CB8AC3E}">
+        <p14:creationId xmlns:p14="http://schemas.microsoft.com/office/powerpoint/2010/main" val="2031119416"/>
+      </p:ext>
+    </p:extLst>
+  </p:cSld>
+  <p:clrMapOvr>
+    <a:masterClrMapping/>
+  </p:clrMapOvr>
+</p:sld>
+</file>
+
+<file path=ppt/slides/slide8.xml><?xml version="1.0" encoding="utf-8"?>
+<p:sld xmlns:a="http://schemas.openxmlformats.org/drawingml/2006/main" xmlns:r="http://schemas.openxmlformats.org/officeDocument/2006/relationships" xmlns:p="http://schemas.openxmlformats.org/presentationml/2006/main">
+  <p:cSld>
+    <p:spTree>
+      <p:nvGrpSpPr>
+        <p:cNvPr id="1" name=""/>
+        <p:cNvGrpSpPr/>
+        <p:nvPr/>
+      </p:nvGrpSpPr>
+      <p:grpSpPr>
+        <a:xfrm>
+          <a:off x="0" y="0"/>
+          <a:ext cx="0" cy="0"/>
+          <a:chOff x="0" y="0"/>
+          <a:chExt cx="0" cy="0"/>
+        </a:xfrm>
+      </p:grpSpPr>
+      <p:sp>
+        <p:nvSpPr>
+          <p:cNvPr id="2" name="Title 1"/>
+          <p:cNvSpPr>
+            <a:spLocks noGrp="1"/>
+          </p:cNvSpPr>
+          <p:nvPr>
+            <p:ph type="title"/>
+          </p:nvPr>
+        </p:nvSpPr>
+        <p:spPr/>
+        <p:txBody>
+          <a:bodyPr>
+            <a:normAutofit fontScale="90000"/>
+          </a:bodyPr>
+          <a:lstStyle/>
+          <a:p>
+            <a:r>
+              <a:rPr lang="ru-RU" dirty="0" smtClean="0"/>
+              <a:t>Язык </a:t>
+            </a:r>
+            <a:r>
+              <a:rPr lang="en-US" dirty="0" smtClean="0"/>
+              <a:t>SQL (</a:t>
+            </a:r>
+            <a:r>
+              <a:rPr lang="en-US" dirty="0" smtClean="0">
+                <a:solidFill>
+                  <a:srgbClr val="FF0000"/>
+                </a:solidFill>
+              </a:rPr>
+              <a:t>S</a:t>
+            </a:r>
+            <a:r>
+              <a:rPr lang="en-US" dirty="0" smtClean="0"/>
+              <a:t>tructured </a:t>
+            </a:r>
+            <a:r>
+              <a:rPr lang="en-US" dirty="0" smtClean="0">
+                <a:solidFill>
+                  <a:srgbClr val="FF0000"/>
+                </a:solidFill>
+              </a:rPr>
+              <a:t>Q</a:t>
+            </a:r>
+            <a:r>
+              <a:rPr lang="en-US" dirty="0" smtClean="0"/>
+              <a:t>uery </a:t>
+            </a:r>
+            <a:r>
+              <a:rPr lang="en-US" dirty="0" smtClean="0">
+                <a:solidFill>
+                  <a:srgbClr val="FF0000"/>
+                </a:solidFill>
+              </a:rPr>
+              <a:t>L</a:t>
+            </a:r>
+            <a:r>
+              <a:rPr lang="en-US" dirty="0" smtClean="0"/>
+              <a:t>anguage)</a:t>
+            </a:r>
+            <a:endParaRPr lang="en-US" dirty="0"/>
+          </a:p>
+        </p:txBody>
+      </p:sp>
+      <p:sp>
+        <p:nvSpPr>
+          <p:cNvPr id="3" name="Content Placeholder 2"/>
+          <p:cNvSpPr>
+            <a:spLocks noGrp="1"/>
+          </p:cNvSpPr>
+          <p:nvPr>
+            <p:ph idx="1"/>
+          </p:nvPr>
+        </p:nvSpPr>
+        <p:spPr/>
+        <p:txBody>
+          <a:bodyPr>
+            <a:normAutofit fontScale="85000" lnSpcReduction="20000"/>
+          </a:bodyPr>
+          <a:lstStyle/>
+          <a:p>
+            <a:r>
+              <a:rPr lang="ru-RU" dirty="0" smtClean="0"/>
+              <a:t>Универсальный язык</a:t>
+            </a:r>
+            <a:r>
+              <a:rPr lang="ru-RU" dirty="0"/>
+              <a:t>, применяемый для создания, модификации и управления данными в реляционных базах данных</a:t>
+            </a:r>
+            <a:r>
+              <a:rPr lang="ru-RU" dirty="0" smtClean="0"/>
+              <a:t>.</a:t>
+            </a:r>
+          </a:p>
+          <a:p>
+            <a:r>
+              <a:rPr lang="ru-RU" dirty="0" smtClean="0"/>
+              <a:t>Есть ряд </a:t>
+            </a:r>
+            <a:r>
+              <a:rPr lang="en-US" dirty="0" smtClean="0"/>
+              <a:t>ISO</a:t>
+            </a:r>
+            <a:r>
+              <a:rPr lang="ru-RU" dirty="0" smtClean="0"/>
+              <a:t> стандартов (</a:t>
+            </a:r>
+            <a:r>
+              <a:rPr lang="en-US" dirty="0"/>
+              <a:t>SQL-86, SQL-89, SQL-92, SQL:1999, SQL:2003, SQL:2006, SQL:2008, </a:t>
+            </a:r>
+            <a:r>
+              <a:rPr lang="en-US" dirty="0" smtClean="0"/>
+              <a:t>SQL:2011</a:t>
+            </a:r>
+            <a:r>
+              <a:rPr lang="ru-RU" dirty="0" smtClean="0"/>
+              <a:t>)</a:t>
+            </a:r>
+          </a:p>
+          <a:p>
+            <a:r>
+              <a:rPr lang="ru-RU" dirty="0" smtClean="0"/>
+              <a:t>У разных производителей свои диалекты</a:t>
+            </a:r>
+          </a:p>
+          <a:p>
+            <a:pPr lvl="1"/>
+            <a:r>
+              <a:rPr lang="en-US" dirty="0" smtClean="0"/>
+              <a:t>PL/SQL (Oracle)</a:t>
+            </a:r>
+          </a:p>
+          <a:p>
+            <a:pPr lvl="1"/>
+            <a:r>
+              <a:rPr lang="en-US" dirty="0" smtClean="0"/>
+              <a:t>T-SQL (Microsoft)</a:t>
+            </a:r>
+            <a:endParaRPr lang="ru-RU" dirty="0" smtClean="0"/>
+          </a:p>
+          <a:p>
+            <a:r>
+              <a:rPr lang="ru-RU" dirty="0" smtClean="0"/>
+              <a:t>Диалекты</a:t>
+            </a:r>
+            <a:endParaRPr lang="en-US" dirty="0" smtClean="0"/>
+          </a:p>
+          <a:p>
+            <a:pPr lvl="1"/>
+            <a:r>
+              <a:rPr lang="en-US" dirty="0" smtClean="0"/>
+              <a:t>Data Definition Language – DDL</a:t>
+            </a:r>
+            <a:endParaRPr lang="ru-RU" dirty="0" smtClean="0"/>
+          </a:p>
+          <a:p>
+            <a:pPr lvl="1"/>
+            <a:r>
+              <a:rPr lang="en-US" dirty="0" smtClean="0"/>
+              <a:t>Data Manipulation Language - DML</a:t>
+            </a:r>
+            <a:endParaRPr lang="en-US" dirty="0"/>
+          </a:p>
+        </p:txBody>
+      </p:sp>
+    </p:spTree>
+    <p:extLst>
+      <p:ext uri="{BB962C8B-B14F-4D97-AF65-F5344CB8AC3E}">
+        <p14:creationId xmlns:p14="http://schemas.microsoft.com/office/powerpoint/2010/main" val="233512801"/>
+      </p:ext>
+    </p:extLst>
+  </p:cSld>
+  <p:clrMapOvr>
+    <a:masterClrMapping/>
+  </p:clrMapOvr>
+</p:sld>
+</file>
+
+<file path=ppt/slides/slide9.xml><?xml version="1.0" encoding="utf-8"?>
+<p:sld xmlns:a="http://schemas.openxmlformats.org/drawingml/2006/main" xmlns:r="http://schemas.openxmlformats.org/officeDocument/2006/relationships" xmlns:p="http://schemas.openxmlformats.org/presentationml/2006/main">
+  <p:cSld>
+    <p:spTree>
+      <p:nvGrpSpPr>
+        <p:cNvPr id="1" name=""/>
+        <p:cNvGrpSpPr/>
+        <p:nvPr/>
+      </p:nvGrpSpPr>
+      <p:grpSpPr>
+        <a:xfrm>
+          <a:off x="0" y="0"/>
+          <a:ext cx="0" cy="0"/>
+          <a:chOff x="0" y="0"/>
+          <a:chExt cx="0" cy="0"/>
+        </a:xfrm>
+      </p:grpSpPr>
+      <p:sp>
+        <p:nvSpPr>
+          <p:cNvPr id="2" name="Title 1"/>
+          <p:cNvSpPr>
+            <a:spLocks noGrp="1"/>
+          </p:cNvSpPr>
+          <p:nvPr>
+            <p:ph type="title"/>
+          </p:nvPr>
+        </p:nvSpPr>
+        <p:spPr>
+          <a:xfrm>
+            <a:off x="457200" y="2857500"/>
+            <a:ext cx="8229600" cy="1143000"/>
+          </a:xfrm>
+        </p:spPr>
+        <p:txBody>
+          <a:bodyPr>
+            <a:normAutofit fontScale="90000"/>
+          </a:bodyPr>
+          <a:lstStyle/>
+          <a:p>
+            <a:r>
+              <a:rPr lang="en-US" dirty="0" smtClean="0"/>
+              <a:t>SQL Server Management Studio</a:t>
+            </a:r>
+            <a:br>
+              <a:rPr lang="en-US" dirty="0" smtClean="0"/>
+            </a:br>
+            <a:r>
+              <a:rPr lang="ru-RU" dirty="0" smtClean="0"/>
+              <a:t>Демонстрация</a:t>
+            </a:r>
+            <a:endParaRPr lang="en-US" dirty="0"/>
+          </a:p>
+        </p:txBody>
+      </p:sp>
+    </p:spTree>
+    <p:extLst>
+      <p:ext uri="{BB962C8B-B14F-4D97-AF65-F5344CB8AC3E}">
+        <p14:creationId xmlns:p14="http://schemas.microsoft.com/office/powerpoint/2010/main" val="484756406"/>
+      </p:ext>
+    </p:extLst>
+  </p:cSld>
+  <p:clrMapOvr>
+    <a:masterClrMapping/>
+  </p:clrMapOvr>
 </p:sld>
 </file>
 

</xml_diff>

<commit_message>
Updated T-SQL presentation (#9)
</commit_message>
<xml_diff>
--- a/Presentation/lesson-09.pptx
+++ b/Presentation/lesson-09.pptx
@@ -5,7 +5,7 @@
     <p:sldMasterId id="2147483648" r:id="rId1"/>
   </p:sldMasterIdLst>
   <p:notesMasterIdLst>
-    <p:notesMasterId r:id="rId27"/>
+    <p:notesMasterId r:id="rId28"/>
   </p:notesMasterIdLst>
   <p:sldIdLst>
     <p:sldId id="256" r:id="rId2"/>
@@ -21,18 +21,19 @@
     <p:sldId id="276" r:id="rId12"/>
     <p:sldId id="277" r:id="rId13"/>
     <p:sldId id="281" r:id="rId14"/>
-    <p:sldId id="260" r:id="rId15"/>
-    <p:sldId id="261" r:id="rId16"/>
-    <p:sldId id="262" r:id="rId17"/>
-    <p:sldId id="263" r:id="rId18"/>
-    <p:sldId id="264" r:id="rId19"/>
-    <p:sldId id="265" r:id="rId20"/>
-    <p:sldId id="266" r:id="rId21"/>
-    <p:sldId id="267" r:id="rId22"/>
-    <p:sldId id="271" r:id="rId23"/>
-    <p:sldId id="280" r:id="rId24"/>
-    <p:sldId id="272" r:id="rId25"/>
-    <p:sldId id="273" r:id="rId26"/>
+    <p:sldId id="282" r:id="rId15"/>
+    <p:sldId id="260" r:id="rId16"/>
+    <p:sldId id="261" r:id="rId17"/>
+    <p:sldId id="262" r:id="rId18"/>
+    <p:sldId id="263" r:id="rId19"/>
+    <p:sldId id="264" r:id="rId20"/>
+    <p:sldId id="265" r:id="rId21"/>
+    <p:sldId id="266" r:id="rId22"/>
+    <p:sldId id="267" r:id="rId23"/>
+    <p:sldId id="271" r:id="rId24"/>
+    <p:sldId id="280" r:id="rId25"/>
+    <p:sldId id="272" r:id="rId26"/>
+    <p:sldId id="273" r:id="rId27"/>
   </p:sldIdLst>
   <p:sldSz cx="9144000" cy="6858000" type="screen4x3"/>
   <p:notesSz cx="6858000" cy="9144000"/>
@@ -216,7 +217,7 @@
           <a:p>
             <a:fld id="{B24A7054-7FFB-49F4-A126-5DF6E687FF53}" type="datetimeFigureOut">
               <a:rPr lang="ru-RU" smtClean="0"/>
-              <a:t>28.12.2012</a:t>
+              <a:t>24.01.2013</a:t>
             </a:fld>
             <a:endParaRPr lang="ru-RU"/>
           </a:p>
@@ -1498,7 +1499,7 @@
           <a:p>
             <a:fld id="{8E6E6A2A-E9D3-4A0D-B04A-ABDD367A1E08}" type="datetimeFigureOut">
               <a:rPr lang="ru-RU" smtClean="0"/>
-              <a:t>28.12.2012</a:t>
+              <a:t>24.01.2013</a:t>
             </a:fld>
             <a:endParaRPr lang="ru-RU"/>
           </a:p>
@@ -2943,7 +2944,7 @@
           <a:p>
             <a:fld id="{AC3D3127-B7C4-45E3-9797-C527EC9FDD78}" type="datetimeFigureOut">
               <a:rPr lang="ru-RU" smtClean="0"/>
-              <a:t>28.12.2012</a:t>
+              <a:t>24.01.2013</a:t>
             </a:fld>
             <a:endParaRPr lang="ru-RU"/>
           </a:p>
@@ -3881,6 +3882,136 @@
           <a:p>
             <a:r>
               <a:rPr lang="ru-RU" dirty="0" smtClean="0"/>
+              <a:t>Системные Базы Данных</a:t>
+            </a:r>
+            <a:endParaRPr lang="en-US" dirty="0"/>
+          </a:p>
+        </p:txBody>
+      </p:sp>
+      <p:sp>
+        <p:nvSpPr>
+          <p:cNvPr id="3" name="Content Placeholder 2"/>
+          <p:cNvSpPr>
+            <a:spLocks noGrp="1"/>
+          </p:cNvSpPr>
+          <p:nvPr>
+            <p:ph idx="1"/>
+          </p:nvPr>
+        </p:nvSpPr>
+        <p:spPr/>
+        <p:txBody>
+          <a:bodyPr>
+            <a:normAutofit/>
+          </a:bodyPr>
+          <a:lstStyle/>
+          <a:p>
+            <a:pPr marL="0" indent="0">
+              <a:buNone/>
+            </a:pPr>
+            <a:r>
+              <a:rPr lang="ru-RU" dirty="0" smtClean="0"/>
+              <a:t>Нижес</a:t>
+            </a:r>
+            <a:r>
+              <a:rPr lang="ru-RU" dirty="0" smtClean="0"/>
+              <a:t>ледующие базы данных используются для внутренних нужд </a:t>
+            </a:r>
+            <a:r>
+              <a:rPr lang="en-US" dirty="0" smtClean="0"/>
+              <a:t>SQL Server</a:t>
+            </a:r>
+            <a:r>
+              <a:rPr lang="ru-RU" dirty="0"/>
+              <a:t> </a:t>
+            </a:r>
+            <a:r>
+              <a:rPr lang="ru-RU" dirty="0" smtClean="0"/>
+              <a:t>и _никогда_ не должны использоваться для хранения ваших данных:</a:t>
+            </a:r>
+            <a:endParaRPr lang="ru-RU" dirty="0" smtClean="0"/>
+          </a:p>
+          <a:p>
+            <a:pPr lvl="1"/>
+            <a:r>
+              <a:rPr lang="en-US" dirty="0" smtClean="0"/>
+              <a:t>master</a:t>
+            </a:r>
+          </a:p>
+          <a:p>
+            <a:pPr lvl="1"/>
+            <a:r>
+              <a:rPr lang="en-US" dirty="0" smtClean="0"/>
+              <a:t>model</a:t>
+            </a:r>
+          </a:p>
+          <a:p>
+            <a:pPr lvl="1"/>
+            <a:r>
+              <a:rPr lang="en-US" dirty="0" err="1" smtClean="0"/>
+              <a:t>msdb</a:t>
+            </a:r>
+            <a:endParaRPr lang="en-US" dirty="0" smtClean="0"/>
+          </a:p>
+          <a:p>
+            <a:pPr lvl="1"/>
+            <a:r>
+              <a:rPr lang="en-US" dirty="0" err="1" smtClean="0"/>
+              <a:t>tempdb</a:t>
+            </a:r>
+            <a:endParaRPr lang="en-US" dirty="0" smtClean="0"/>
+          </a:p>
+          <a:p>
+            <a:endParaRPr lang="en-US" dirty="0"/>
+          </a:p>
+        </p:txBody>
+      </p:sp>
+    </p:spTree>
+    <p:extLst>
+      <p:ext uri="{BB962C8B-B14F-4D97-AF65-F5344CB8AC3E}">
+        <p14:creationId xmlns:p14="http://schemas.microsoft.com/office/powerpoint/2010/main" val="1563628706"/>
+      </p:ext>
+    </p:extLst>
+  </p:cSld>
+  <p:clrMapOvr>
+    <a:masterClrMapping/>
+  </p:clrMapOvr>
+</p:sld>
+</file>
+
+<file path=ppt/slides/slide14.xml><?xml version="1.0" encoding="utf-8"?>
+<p:sld xmlns:a="http://schemas.openxmlformats.org/drawingml/2006/main" xmlns:r="http://schemas.openxmlformats.org/officeDocument/2006/relationships" xmlns:p="http://schemas.openxmlformats.org/presentationml/2006/main">
+  <p:cSld>
+    <p:spTree>
+      <p:nvGrpSpPr>
+        <p:cNvPr id="1" name=""/>
+        <p:cNvGrpSpPr/>
+        <p:nvPr/>
+      </p:nvGrpSpPr>
+      <p:grpSpPr>
+        <a:xfrm>
+          <a:off x="0" y="0"/>
+          <a:ext cx="0" cy="0"/>
+          <a:chOff x="0" y="0"/>
+          <a:chExt cx="0" cy="0"/>
+        </a:xfrm>
+      </p:grpSpPr>
+      <p:sp>
+        <p:nvSpPr>
+          <p:cNvPr id="2" name="Title 1"/>
+          <p:cNvSpPr>
+            <a:spLocks noGrp="1"/>
+          </p:cNvSpPr>
+          <p:nvPr>
+            <p:ph type="title"/>
+          </p:nvPr>
+        </p:nvSpPr>
+        <p:spPr/>
+        <p:txBody>
+          <a:bodyPr/>
+          <a:lstStyle/>
+          <a:p>
+            <a:r>
+              <a:rPr lang="ru-RU" dirty="0" smtClean="0"/>
               <a:t>Типы данных</a:t>
             </a:r>
             <a:endParaRPr lang="en-US" dirty="0"/>
@@ -4073,7 +4204,7 @@
     </p:spTree>
     <p:extLst>
       <p:ext uri="{BB962C8B-B14F-4D97-AF65-F5344CB8AC3E}">
-        <p14:creationId xmlns:p14="http://schemas.microsoft.com/office/powerpoint/2010/main" val="1563628706"/>
+        <p14:creationId xmlns:p14="http://schemas.microsoft.com/office/powerpoint/2010/main" val="2524908556"/>
       </p:ext>
     </p:extLst>
   </p:cSld>
@@ -4083,7 +4214,7 @@
 </p:sld>
 </file>
 
-<file path=ppt/slides/slide14.xml><?xml version="1.0" encoding="utf-8"?>
+<file path=ppt/slides/slide15.xml><?xml version="1.0" encoding="utf-8"?>
 <p:sld xmlns:a="http://schemas.openxmlformats.org/drawingml/2006/main" xmlns:r="http://schemas.openxmlformats.org/officeDocument/2006/relationships" xmlns:p="http://schemas.openxmlformats.org/presentationml/2006/main">
   <p:cSld>
     <p:spTree>
@@ -4546,7 +4677,7 @@
 </p:sld>
 </file>
 
-<file path=ppt/slides/slide15.xml><?xml version="1.0" encoding="utf-8"?>
+<file path=ppt/slides/slide16.xml><?xml version="1.0" encoding="utf-8"?>
 <p:sld xmlns:a="http://schemas.openxmlformats.org/drawingml/2006/main" xmlns:r="http://schemas.openxmlformats.org/officeDocument/2006/relationships" xmlns:p="http://schemas.openxmlformats.org/presentationml/2006/main">
   <p:cSld>
     <p:spTree>
@@ -5214,7 +5345,7 @@
 </p:sld>
 </file>
 
-<file path=ppt/slides/slide16.xml><?xml version="1.0" encoding="utf-8"?>
+<file path=ppt/slides/slide17.xml><?xml version="1.0" encoding="utf-8"?>
 <p:sld xmlns:a="http://schemas.openxmlformats.org/drawingml/2006/main" xmlns:r="http://schemas.openxmlformats.org/officeDocument/2006/relationships" xmlns:p="http://schemas.openxmlformats.org/presentationml/2006/main">
   <p:cSld>
     <p:spTree>
@@ -5592,7 +5723,7 @@
 </p:sld>
 </file>
 
-<file path=ppt/slides/slide17.xml><?xml version="1.0" encoding="utf-8"?>
+<file path=ppt/slides/slide18.xml><?xml version="1.0" encoding="utf-8"?>
 <p:sld xmlns:a="http://schemas.openxmlformats.org/drawingml/2006/main" xmlns:r="http://schemas.openxmlformats.org/officeDocument/2006/relationships" xmlns:p="http://schemas.openxmlformats.org/presentationml/2006/main">
   <p:cSld>
     <p:spTree>
@@ -5893,7 +6024,7 @@
 </p:sld>
 </file>
 
-<file path=ppt/slides/slide18.xml><?xml version="1.0" encoding="utf-8"?>
+<file path=ppt/slides/slide19.xml><?xml version="1.0" encoding="utf-8"?>
 <p:sld xmlns:a="http://schemas.openxmlformats.org/drawingml/2006/main" xmlns:r="http://schemas.openxmlformats.org/officeDocument/2006/relationships" xmlns:p="http://schemas.openxmlformats.org/presentationml/2006/main">
   <p:cSld>
     <p:spTree>
@@ -6229,7 +6360,82 @@
 </p:sld>
 </file>
 
-<file path=ppt/slides/slide19.xml><?xml version="1.0" encoding="utf-8"?>
+<file path=ppt/slides/slide2.xml><?xml version="1.0" encoding="utf-8"?>
+<p:sld xmlns:a="http://schemas.openxmlformats.org/drawingml/2006/main" xmlns:r="http://schemas.openxmlformats.org/officeDocument/2006/relationships" xmlns:p="http://schemas.openxmlformats.org/presentationml/2006/main">
+  <p:cSld>
+    <p:spTree>
+      <p:nvGrpSpPr>
+        <p:cNvPr id="1" name=""/>
+        <p:cNvGrpSpPr/>
+        <p:nvPr/>
+      </p:nvGrpSpPr>
+      <p:grpSpPr>
+        <a:xfrm>
+          <a:off x="0" y="0"/>
+          <a:ext cx="0" cy="0"/>
+          <a:chOff x="0" y="0"/>
+          <a:chExt cx="0" cy="0"/>
+        </a:xfrm>
+      </p:grpSpPr>
+      <p:sp>
+        <p:nvSpPr>
+          <p:cNvPr id="3" name="Rectangle 2"/>
+          <p:cNvSpPr/>
+          <p:nvPr/>
+        </p:nvSpPr>
+        <p:spPr>
+          <a:xfrm>
+            <a:off x="251520" y="3136613"/>
+            <a:ext cx="8640960" cy="584775"/>
+          </a:xfrm>
+          <a:prstGeom prst="rect">
+            <a:avLst/>
+          </a:prstGeom>
+        </p:spPr>
+        <p:txBody>
+          <a:bodyPr wrap="square">
+            <a:spAutoFit/>
+          </a:bodyPr>
+          <a:lstStyle/>
+          <a:p>
+            <a:pPr lvl="0" algn="ctr"/>
+            <a:r>
+              <a:rPr lang="en-US" sz="3200" dirty="0">
+                <a:solidFill>
+                  <a:schemeClr val="bg1"/>
+                </a:solidFill>
+              </a:rPr>
+              <a:t>https://github.com/bazile/Training</a:t>
+            </a:r>
+            <a:endParaRPr lang="en-US" sz="3200" dirty="0" smtClean="0">
+              <a:solidFill>
+                <a:schemeClr val="bg1"/>
+              </a:solidFill>
+            </a:endParaRPr>
+          </a:p>
+        </p:txBody>
+      </p:sp>
+    </p:spTree>
+    <p:extLst>
+      <p:ext uri="{BB962C8B-B14F-4D97-AF65-F5344CB8AC3E}">
+        <p14:creationId xmlns:p14="http://schemas.microsoft.com/office/powerpoint/2010/main" val="2091497149"/>
+      </p:ext>
+    </p:extLst>
+  </p:cSld>
+  <p:clrMapOvr>
+    <a:masterClrMapping/>
+  </p:clrMapOvr>
+  <p:timing>
+    <p:tnLst>
+      <p:par>
+        <p:cTn id="1" dur="indefinite" restart="never" nodeType="tmRoot"/>
+      </p:par>
+    </p:tnLst>
+  </p:timing>
+</p:sld>
+</file>
+
+<file path=ppt/slides/slide20.xml><?xml version="1.0" encoding="utf-8"?>
 <p:sld xmlns:a="http://schemas.openxmlformats.org/drawingml/2006/main" xmlns:r="http://schemas.openxmlformats.org/officeDocument/2006/relationships" xmlns:p="http://schemas.openxmlformats.org/presentationml/2006/main">
   <p:cSld>
     <p:spTree>
@@ -6486,82 +6692,7 @@
 </p:sld>
 </file>
 
-<file path=ppt/slides/slide2.xml><?xml version="1.0" encoding="utf-8"?>
-<p:sld xmlns:a="http://schemas.openxmlformats.org/drawingml/2006/main" xmlns:r="http://schemas.openxmlformats.org/officeDocument/2006/relationships" xmlns:p="http://schemas.openxmlformats.org/presentationml/2006/main">
-  <p:cSld>
-    <p:spTree>
-      <p:nvGrpSpPr>
-        <p:cNvPr id="1" name=""/>
-        <p:cNvGrpSpPr/>
-        <p:nvPr/>
-      </p:nvGrpSpPr>
-      <p:grpSpPr>
-        <a:xfrm>
-          <a:off x="0" y="0"/>
-          <a:ext cx="0" cy="0"/>
-          <a:chOff x="0" y="0"/>
-          <a:chExt cx="0" cy="0"/>
-        </a:xfrm>
-      </p:grpSpPr>
-      <p:sp>
-        <p:nvSpPr>
-          <p:cNvPr id="3" name="Rectangle 2"/>
-          <p:cNvSpPr/>
-          <p:nvPr/>
-        </p:nvSpPr>
-        <p:spPr>
-          <a:xfrm>
-            <a:off x="251520" y="3136613"/>
-            <a:ext cx="8640960" cy="584775"/>
-          </a:xfrm>
-          <a:prstGeom prst="rect">
-            <a:avLst/>
-          </a:prstGeom>
-        </p:spPr>
-        <p:txBody>
-          <a:bodyPr wrap="square">
-            <a:spAutoFit/>
-          </a:bodyPr>
-          <a:lstStyle/>
-          <a:p>
-            <a:pPr lvl="0" algn="ctr"/>
-            <a:r>
-              <a:rPr lang="en-US" sz="3200" dirty="0">
-                <a:solidFill>
-                  <a:schemeClr val="bg1"/>
-                </a:solidFill>
-              </a:rPr>
-              <a:t>https://github.com/bazile/Training</a:t>
-            </a:r>
-            <a:endParaRPr lang="en-US" sz="3200" dirty="0" smtClean="0">
-              <a:solidFill>
-                <a:schemeClr val="bg1"/>
-              </a:solidFill>
-            </a:endParaRPr>
-          </a:p>
-        </p:txBody>
-      </p:sp>
-    </p:spTree>
-    <p:extLst>
-      <p:ext uri="{BB962C8B-B14F-4D97-AF65-F5344CB8AC3E}">
-        <p14:creationId xmlns:p14="http://schemas.microsoft.com/office/powerpoint/2010/main" val="2091497149"/>
-      </p:ext>
-    </p:extLst>
-  </p:cSld>
-  <p:clrMapOvr>
-    <a:masterClrMapping/>
-  </p:clrMapOvr>
-  <p:timing>
-    <p:tnLst>
-      <p:par>
-        <p:cTn id="1" dur="indefinite" restart="never" nodeType="tmRoot"/>
-      </p:par>
-    </p:tnLst>
-  </p:timing>
-</p:sld>
-</file>
-
-<file path=ppt/slides/slide20.xml><?xml version="1.0" encoding="utf-8"?>
+<file path=ppt/slides/slide21.xml><?xml version="1.0" encoding="utf-8"?>
 <p:sld xmlns:a="http://schemas.openxmlformats.org/drawingml/2006/main" xmlns:r="http://schemas.openxmlformats.org/officeDocument/2006/relationships" xmlns:p="http://schemas.openxmlformats.org/presentationml/2006/main">
   <p:cSld>
     <p:spTree>
@@ -6969,7 +7100,7 @@
 </p:sld>
 </file>
 
-<file path=ppt/slides/slide21.xml><?xml version="1.0" encoding="utf-8"?>
+<file path=ppt/slides/slide22.xml><?xml version="1.0" encoding="utf-8"?>
 <p:sld xmlns:a="http://schemas.openxmlformats.org/drawingml/2006/main" xmlns:r="http://schemas.openxmlformats.org/officeDocument/2006/relationships" xmlns:p="http://schemas.openxmlformats.org/presentationml/2006/main">
   <p:cSld>
     <p:spTree>
@@ -7392,114 +7523,6 @@
 </p:sld>
 </file>
 
-<file path=ppt/slides/slide22.xml><?xml version="1.0" encoding="utf-8"?>
-<p:sld xmlns:a="http://schemas.openxmlformats.org/drawingml/2006/main" xmlns:r="http://schemas.openxmlformats.org/officeDocument/2006/relationships" xmlns:p="http://schemas.openxmlformats.org/presentationml/2006/main">
-  <p:cSld>
-    <p:spTree>
-      <p:nvGrpSpPr>
-        <p:cNvPr id="1" name=""/>
-        <p:cNvGrpSpPr/>
-        <p:nvPr/>
-      </p:nvGrpSpPr>
-      <p:grpSpPr>
-        <a:xfrm>
-          <a:off x="0" y="0"/>
-          <a:ext cx="0" cy="0"/>
-          <a:chOff x="0" y="0"/>
-          <a:chExt cx="0" cy="0"/>
-        </a:xfrm>
-      </p:grpSpPr>
-      <p:sp>
-        <p:nvSpPr>
-          <p:cNvPr id="2" name="Title 1"/>
-          <p:cNvSpPr>
-            <a:spLocks noGrp="1"/>
-          </p:cNvSpPr>
-          <p:nvPr>
-            <p:ph type="title"/>
-          </p:nvPr>
-        </p:nvSpPr>
-        <p:spPr/>
-        <p:txBody>
-          <a:bodyPr/>
-          <a:lstStyle/>
-          <a:p>
-            <a:r>
-              <a:rPr lang="ru-RU" dirty="0" smtClean="0"/>
-              <a:t>Ограничения </a:t>
-            </a:r>
-            <a:r>
-              <a:rPr lang="en-US" dirty="0" smtClean="0"/>
-              <a:t>(constraints)</a:t>
-            </a:r>
-            <a:endParaRPr lang="en-US" dirty="0"/>
-          </a:p>
-        </p:txBody>
-      </p:sp>
-      <p:sp>
-        <p:nvSpPr>
-          <p:cNvPr id="3" name="Content Placeholder 2"/>
-          <p:cNvSpPr>
-            <a:spLocks noGrp="1"/>
-          </p:cNvSpPr>
-          <p:nvPr>
-            <p:ph idx="1"/>
-          </p:nvPr>
-        </p:nvSpPr>
-        <p:spPr/>
-        <p:txBody>
-          <a:bodyPr/>
-          <a:lstStyle/>
-          <a:p>
-            <a:r>
-              <a:rPr lang="en-US" dirty="0" smtClean="0"/>
-              <a:t>NOT NULL</a:t>
-            </a:r>
-          </a:p>
-          <a:p>
-            <a:r>
-              <a:rPr lang="en-US" dirty="0" smtClean="0"/>
-              <a:t>CHECK</a:t>
-            </a:r>
-          </a:p>
-          <a:p>
-            <a:r>
-              <a:rPr lang="en-US" dirty="0" smtClean="0"/>
-              <a:t>UNIQUE</a:t>
-            </a:r>
-          </a:p>
-          <a:p>
-            <a:r>
-              <a:rPr lang="en-US" dirty="0" smtClean="0"/>
-              <a:t>PRIMARY KEY</a:t>
-            </a:r>
-          </a:p>
-          <a:p>
-            <a:r>
-              <a:rPr lang="en-US" dirty="0" smtClean="0"/>
-              <a:t> FOREIGN </a:t>
-            </a:r>
-            <a:r>
-              <a:rPr lang="en-US" dirty="0"/>
-              <a:t>KEY</a:t>
-            </a:r>
-            <a:endParaRPr lang="en-US" dirty="0"/>
-          </a:p>
-        </p:txBody>
-      </p:sp>
-    </p:spTree>
-    <p:extLst>
-      <p:ext uri="{BB962C8B-B14F-4D97-AF65-F5344CB8AC3E}">
-        <p14:creationId xmlns:p14="http://schemas.microsoft.com/office/powerpoint/2010/main" val="1003551259"/>
-      </p:ext>
-    </p:extLst>
-  </p:cSld>
-  <p:clrMapOvr>
-    <a:masterClrMapping/>
-  </p:clrMapOvr>
-</p:sld>
-</file>
-
 <file path=ppt/slides/slide23.xml><?xml version="1.0" encoding="utf-8"?>
 <p:sld xmlns:a="http://schemas.openxmlformats.org/drawingml/2006/main" xmlns:r="http://schemas.openxmlformats.org/officeDocument/2006/relationships" xmlns:p="http://schemas.openxmlformats.org/presentationml/2006/main">
   <p:cSld>
@@ -7534,7 +7557,11 @@
           <a:p>
             <a:r>
               <a:rPr lang="ru-RU" dirty="0" smtClean="0"/>
-              <a:t>Хранимые процедуры</a:t>
+              <a:t>Ограничения </a:t>
+            </a:r>
+            <a:r>
+              <a:rPr lang="en-US" dirty="0" smtClean="0"/>
+              <a:t>(constraints)</a:t>
             </a:r>
             <a:endParaRPr lang="en-US" dirty="0"/>
           </a:p>
@@ -7557,16 +7584,43 @@
           <a:p>
             <a:r>
               <a:rPr lang="en-US" dirty="0" smtClean="0"/>
-              <a:t>CREATE PROC</a:t>
-            </a:r>
-            <a:endParaRPr lang="en-US" dirty="0"/>
+              <a:t>NOT NULL</a:t>
+            </a:r>
+          </a:p>
+          <a:p>
+            <a:r>
+              <a:rPr lang="en-US" dirty="0" smtClean="0"/>
+              <a:t>CHECK</a:t>
+            </a:r>
+          </a:p>
+          <a:p>
+            <a:r>
+              <a:rPr lang="en-US" dirty="0" smtClean="0"/>
+              <a:t>UNIQUE</a:t>
+            </a:r>
+          </a:p>
+          <a:p>
+            <a:r>
+              <a:rPr lang="en-US" dirty="0" smtClean="0"/>
+              <a:t>PRIMARY KEY</a:t>
+            </a:r>
+          </a:p>
+          <a:p>
+            <a:r>
+              <a:rPr lang="en-US" dirty="0" smtClean="0"/>
+              <a:t> FOREIGN </a:t>
+            </a:r>
+            <a:r>
+              <a:rPr lang="en-US" dirty="0"/>
+              <a:t>KEY</a:t>
+            </a:r>
           </a:p>
         </p:txBody>
       </p:sp>
     </p:spTree>
     <p:extLst>
       <p:ext uri="{BB962C8B-B14F-4D97-AF65-F5344CB8AC3E}">
-        <p14:creationId xmlns:p14="http://schemas.microsoft.com/office/powerpoint/2010/main" val="2533733971"/>
+        <p14:creationId xmlns:p14="http://schemas.microsoft.com/office/powerpoint/2010/main" val="1003551259"/>
       </p:ext>
     </p:extLst>
   </p:cSld>
@@ -7610,6 +7664,82 @@
           <a:p>
             <a:r>
               <a:rPr lang="ru-RU" dirty="0" smtClean="0"/>
+              <a:t>Хранимые процедуры</a:t>
+            </a:r>
+            <a:endParaRPr lang="en-US" dirty="0"/>
+          </a:p>
+        </p:txBody>
+      </p:sp>
+      <p:sp>
+        <p:nvSpPr>
+          <p:cNvPr id="3" name="Content Placeholder 2"/>
+          <p:cNvSpPr>
+            <a:spLocks noGrp="1"/>
+          </p:cNvSpPr>
+          <p:nvPr>
+            <p:ph idx="1"/>
+          </p:nvPr>
+        </p:nvSpPr>
+        <p:spPr/>
+        <p:txBody>
+          <a:bodyPr/>
+          <a:lstStyle/>
+          <a:p>
+            <a:r>
+              <a:rPr lang="en-US" dirty="0" smtClean="0"/>
+              <a:t>CREATE PROC</a:t>
+            </a:r>
+            <a:endParaRPr lang="en-US" dirty="0"/>
+          </a:p>
+        </p:txBody>
+      </p:sp>
+    </p:spTree>
+    <p:extLst>
+      <p:ext uri="{BB962C8B-B14F-4D97-AF65-F5344CB8AC3E}">
+        <p14:creationId xmlns:p14="http://schemas.microsoft.com/office/powerpoint/2010/main" val="2533733971"/>
+      </p:ext>
+    </p:extLst>
+  </p:cSld>
+  <p:clrMapOvr>
+    <a:masterClrMapping/>
+  </p:clrMapOvr>
+</p:sld>
+</file>
+
+<file path=ppt/slides/slide25.xml><?xml version="1.0" encoding="utf-8"?>
+<p:sld xmlns:a="http://schemas.openxmlformats.org/drawingml/2006/main" xmlns:r="http://schemas.openxmlformats.org/officeDocument/2006/relationships" xmlns:p="http://schemas.openxmlformats.org/presentationml/2006/main">
+  <p:cSld>
+    <p:spTree>
+      <p:nvGrpSpPr>
+        <p:cNvPr id="1" name=""/>
+        <p:cNvGrpSpPr/>
+        <p:nvPr/>
+      </p:nvGrpSpPr>
+      <p:grpSpPr>
+        <a:xfrm>
+          <a:off x="0" y="0"/>
+          <a:ext cx="0" cy="0"/>
+          <a:chOff x="0" y="0"/>
+          <a:chExt cx="0" cy="0"/>
+        </a:xfrm>
+      </p:grpSpPr>
+      <p:sp>
+        <p:nvSpPr>
+          <p:cNvPr id="2" name="Title 1"/>
+          <p:cNvSpPr>
+            <a:spLocks noGrp="1"/>
+          </p:cNvSpPr>
+          <p:nvPr>
+            <p:ph type="title"/>
+          </p:nvPr>
+        </p:nvSpPr>
+        <p:spPr/>
+        <p:txBody>
+          <a:bodyPr/>
+          <a:lstStyle/>
+          <a:p>
+            <a:r>
+              <a:rPr lang="ru-RU" dirty="0" smtClean="0"/>
               <a:t>Триггеры</a:t>
             </a:r>
             <a:endParaRPr lang="en-US" dirty="0"/>
@@ -7671,19 +7801,7 @@
             <a:pPr lvl="1"/>
             <a:r>
               <a:rPr lang="ru-RU" dirty="0" smtClean="0"/>
-              <a:t>Полезно для проверок безопасности, дополнительной </a:t>
-            </a:r>
-            <a:r>
-              <a:rPr lang="ru-RU" dirty="0" smtClean="0"/>
-              <a:t>целостности </a:t>
-            </a:r>
-            <a:r>
-              <a:rPr lang="ru-RU" dirty="0" smtClean="0"/>
-              <a:t>данных, протоколирования, аудита и т.п</a:t>
-            </a:r>
-            <a:r>
-              <a:rPr lang="ru-RU" dirty="0" smtClean="0"/>
-              <a:t>.</a:t>
+              <a:t>Полезно для проверок безопасности, дополнительной целостности данных, протоколирования, аудита и т.п.</a:t>
             </a:r>
             <a:endParaRPr lang="en-US" dirty="0" smtClean="0"/>
           </a:p>
@@ -7795,7 +7913,7 @@
 </p:sld>
 </file>
 
-<file path=ppt/slides/slide25.xml><?xml version="1.0" encoding="utf-8"?>
+<file path=ppt/slides/slide26.xml><?xml version="1.0" encoding="utf-8"?>
 <p:sld xmlns:a="http://schemas.openxmlformats.org/drawingml/2006/main" xmlns:r="http://schemas.openxmlformats.org/officeDocument/2006/relationships" xmlns:p="http://schemas.openxmlformats.org/presentationml/2006/main">
   <p:cSld>
     <p:spTree>

</xml_diff>